<commit_message>
Aggiunte slide fino a 4.2.2
</commit_message>
<xml_diff>
--- a/Presentazione/Presentazione relazione.pptx
+++ b/Presentazione/Presentazione relazione.pptx
@@ -10,6 +10,12 @@
     <p:sldId id="258" r:id="rId4"/>
     <p:sldId id="259" r:id="rId5"/>
     <p:sldId id="260" r:id="rId6"/>
+    <p:sldId id="261" r:id="rId7"/>
+    <p:sldId id="263" r:id="rId8"/>
+    <p:sldId id="264" r:id="rId9"/>
+    <p:sldId id="265" r:id="rId10"/>
+    <p:sldId id="266" r:id="rId11"/>
+    <p:sldId id="267" r:id="rId12"/>
   </p:sldIdLst>
   <p:sldSz cx="12192000" cy="6858000"/>
   <p:notesSz cx="6858000" cy="9144000"/>
@@ -263,7 +269,7 @@
           <a:p>
             <a:fld id="{A6FD4720-B9C0-4F47-AA5B-4FF5D3586A21}" type="datetimeFigureOut">
               <a:rPr lang="it-IT" smtClean="0"/>
-              <a:t>04/07/2023</a:t>
+              <a:t>05/07/2023</a:t>
             </a:fld>
             <a:endParaRPr lang="it-IT"/>
           </a:p>
@@ -461,7 +467,7 @@
           <a:p>
             <a:fld id="{A6FD4720-B9C0-4F47-AA5B-4FF5D3586A21}" type="datetimeFigureOut">
               <a:rPr lang="it-IT" smtClean="0"/>
-              <a:t>04/07/2023</a:t>
+              <a:t>05/07/2023</a:t>
             </a:fld>
             <a:endParaRPr lang="it-IT"/>
           </a:p>
@@ -669,7 +675,7 @@
           <a:p>
             <a:fld id="{A6FD4720-B9C0-4F47-AA5B-4FF5D3586A21}" type="datetimeFigureOut">
               <a:rPr lang="it-IT" smtClean="0"/>
-              <a:t>04/07/2023</a:t>
+              <a:t>05/07/2023</a:t>
             </a:fld>
             <a:endParaRPr lang="it-IT"/>
           </a:p>
@@ -867,7 +873,7 @@
           <a:p>
             <a:fld id="{A6FD4720-B9C0-4F47-AA5B-4FF5D3586A21}" type="datetimeFigureOut">
               <a:rPr lang="it-IT" smtClean="0"/>
-              <a:t>04/07/2023</a:t>
+              <a:t>05/07/2023</a:t>
             </a:fld>
             <a:endParaRPr lang="it-IT"/>
           </a:p>
@@ -1142,7 +1148,7 @@
           <a:p>
             <a:fld id="{A6FD4720-B9C0-4F47-AA5B-4FF5D3586A21}" type="datetimeFigureOut">
               <a:rPr lang="it-IT" smtClean="0"/>
-              <a:t>04/07/2023</a:t>
+              <a:t>05/07/2023</a:t>
             </a:fld>
             <a:endParaRPr lang="it-IT"/>
           </a:p>
@@ -1407,7 +1413,7 @@
           <a:p>
             <a:fld id="{A6FD4720-B9C0-4F47-AA5B-4FF5D3586A21}" type="datetimeFigureOut">
               <a:rPr lang="it-IT" smtClean="0"/>
-              <a:t>04/07/2023</a:t>
+              <a:t>05/07/2023</a:t>
             </a:fld>
             <a:endParaRPr lang="it-IT"/>
           </a:p>
@@ -1819,7 +1825,7 @@
           <a:p>
             <a:fld id="{A6FD4720-B9C0-4F47-AA5B-4FF5D3586A21}" type="datetimeFigureOut">
               <a:rPr lang="it-IT" smtClean="0"/>
-              <a:t>04/07/2023</a:t>
+              <a:t>05/07/2023</a:t>
             </a:fld>
             <a:endParaRPr lang="it-IT"/>
           </a:p>
@@ -1960,7 +1966,7 @@
           <a:p>
             <a:fld id="{A6FD4720-B9C0-4F47-AA5B-4FF5D3586A21}" type="datetimeFigureOut">
               <a:rPr lang="it-IT" smtClean="0"/>
-              <a:t>04/07/2023</a:t>
+              <a:t>05/07/2023</a:t>
             </a:fld>
             <a:endParaRPr lang="it-IT"/>
           </a:p>
@@ -2073,7 +2079,7 @@
           <a:p>
             <a:fld id="{A6FD4720-B9C0-4F47-AA5B-4FF5D3586A21}" type="datetimeFigureOut">
               <a:rPr lang="it-IT" smtClean="0"/>
-              <a:t>04/07/2023</a:t>
+              <a:t>05/07/2023</a:t>
             </a:fld>
             <a:endParaRPr lang="it-IT"/>
           </a:p>
@@ -2384,7 +2390,7 @@
           <a:p>
             <a:fld id="{A6FD4720-B9C0-4F47-AA5B-4FF5D3586A21}" type="datetimeFigureOut">
               <a:rPr lang="it-IT" smtClean="0"/>
-              <a:t>04/07/2023</a:t>
+              <a:t>05/07/2023</a:t>
             </a:fld>
             <a:endParaRPr lang="it-IT"/>
           </a:p>
@@ -2672,7 +2678,7 @@
           <a:p>
             <a:fld id="{A6FD4720-B9C0-4F47-AA5B-4FF5D3586A21}" type="datetimeFigureOut">
               <a:rPr lang="it-IT" smtClean="0"/>
-              <a:t>04/07/2023</a:t>
+              <a:t>05/07/2023</a:t>
             </a:fld>
             <a:endParaRPr lang="it-IT"/>
           </a:p>
@@ -2913,7 +2919,7 @@
           <a:p>
             <a:fld id="{A6FD4720-B9C0-4F47-AA5B-4FF5D3586A21}" type="datetimeFigureOut">
               <a:rPr lang="it-IT" smtClean="0"/>
-              <a:t>04/07/2023</a:t>
+              <a:t>05/07/2023</a:t>
             </a:fld>
             <a:endParaRPr lang="it-IT"/>
           </a:p>
@@ -3640,6 +3646,573 @@
 </p:sld>
 </file>
 
+<file path=ppt/slides/slide10.xml><?xml version="1.0" encoding="utf-8"?>
+<p:sld xmlns:a="http://schemas.openxmlformats.org/drawingml/2006/main" xmlns:r="http://schemas.openxmlformats.org/officeDocument/2006/relationships" xmlns:p="http://schemas.openxmlformats.org/presentationml/2006/main">
+  <p:cSld>
+    <p:spTree>
+      <p:nvGrpSpPr>
+        <p:cNvPr id="1" name=""/>
+        <p:cNvGrpSpPr/>
+        <p:nvPr/>
+      </p:nvGrpSpPr>
+      <p:grpSpPr>
+        <a:xfrm>
+          <a:off x="0" y="0"/>
+          <a:ext cx="0" cy="0"/>
+          <a:chOff x="0" y="0"/>
+          <a:chExt cx="0" cy="0"/>
+        </a:xfrm>
+      </p:grpSpPr>
+      <p:pic>
+        <p:nvPicPr>
+          <p:cNvPr id="4" name="Immagine 3" descr="Immagine che contiene testo, Carattere, Elementi grafici, logo">
+            <a:extLst>
+              <a:ext uri="{FF2B5EF4-FFF2-40B4-BE49-F238E27FC236}">
+                <a16:creationId xmlns:a16="http://schemas.microsoft.com/office/drawing/2014/main" id="{B6812EB3-284C-CD2B-D39B-7E068E84B778}"/>
+              </a:ext>
+            </a:extLst>
+          </p:cNvPr>
+          <p:cNvPicPr>
+            <a:picLocks noChangeAspect="1"/>
+          </p:cNvPicPr>
+          <p:nvPr/>
+        </p:nvPicPr>
+        <p:blipFill>
+          <a:blip r:embed="rId2">
+            <a:extLst>
+              <a:ext uri="{28A0092B-C50C-407E-A947-70E740481C1C}">
+                <a14:useLocalDpi xmlns:a14="http://schemas.microsoft.com/office/drawing/2010/main" val="0"/>
+              </a:ext>
+            </a:extLst>
+          </a:blip>
+          <a:stretch>
+            <a:fillRect/>
+          </a:stretch>
+        </p:blipFill>
+        <p:spPr>
+          <a:xfrm>
+            <a:off x="900000" y="540001"/>
+            <a:ext cx="2076591" cy="938572"/>
+          </a:xfrm>
+          <a:prstGeom prst="rect">
+            <a:avLst/>
+          </a:prstGeom>
+        </p:spPr>
+      </p:pic>
+      <p:sp>
+        <p:nvSpPr>
+          <p:cNvPr id="9" name="CasellaDiTesto 8">
+            <a:extLst>
+              <a:ext uri="{FF2B5EF4-FFF2-40B4-BE49-F238E27FC236}">
+                <a16:creationId xmlns:a16="http://schemas.microsoft.com/office/drawing/2014/main" id="{6BBA43B8-57EC-EC7D-B79C-094BABBFFDF4}"/>
+              </a:ext>
+            </a:extLst>
+          </p:cNvPr>
+          <p:cNvSpPr txBox="1"/>
+          <p:nvPr/>
+        </p:nvSpPr>
+        <p:spPr>
+          <a:xfrm>
+            <a:off x="900002" y="1923897"/>
+            <a:ext cx="10391998" cy="1323439"/>
+          </a:xfrm>
+          <a:prstGeom prst="rect">
+            <a:avLst/>
+          </a:prstGeom>
+          <a:noFill/>
+        </p:spPr>
+        <p:txBody>
+          <a:bodyPr wrap="square" rtlCol="0">
+            <a:spAutoFit/>
+          </a:bodyPr>
+          <a:lstStyle/>
+          <a:p>
+            <a:pPr algn="just"/>
+            <a:r>
+              <a:rPr lang="it-IT" sz="2000" dirty="0">
+                <a:latin typeface="Cmu serif" panose="02000603000000000000" pitchFamily="2" charset="0"/>
+                <a:ea typeface="Cmu serif" panose="02000603000000000000" pitchFamily="2" charset="0"/>
+                <a:cs typeface="Cmu serif" panose="02000603000000000000" pitchFamily="2" charset="0"/>
+              </a:rPr>
+              <a:t>Per verificare l’accettabilità dell’ipotesi, si è confrontata la sola forza propulsiva (T), ovvero l’unica considerata durante il dimensionamento, nota in funzione della velocità dai test condotti in galleria del vento, con la forza risultante (R), ottenibile anch’essa in funzione della velocità dai dati di massa e accelerazione del velivolo al decollo.</a:t>
+            </a:r>
+          </a:p>
+        </p:txBody>
+      </p:sp>
+      <p:sp>
+        <p:nvSpPr>
+          <p:cNvPr id="7" name="Titolo 1">
+            <a:extLst>
+              <a:ext uri="{FF2B5EF4-FFF2-40B4-BE49-F238E27FC236}">
+                <a16:creationId xmlns:a16="http://schemas.microsoft.com/office/drawing/2014/main" id="{FC6D212B-F062-2C61-2A86-D946A609F9D9}"/>
+              </a:ext>
+            </a:extLst>
+          </p:cNvPr>
+          <p:cNvSpPr txBox="1">
+            <a:spLocks/>
+          </p:cNvSpPr>
+          <p:nvPr/>
+        </p:nvSpPr>
+        <p:spPr>
+          <a:xfrm>
+            <a:off x="3524921" y="569936"/>
+            <a:ext cx="7767079" cy="878702"/>
+          </a:xfrm>
+          <a:prstGeom prst="rect">
+            <a:avLst/>
+          </a:prstGeom>
+        </p:spPr>
+        <p:txBody>
+          <a:bodyPr vert="horz" wrap="square" lIns="91440" tIns="45720" rIns="91440" bIns="45720" rtlCol="0" anchor="ctr">
+            <a:spAutoFit/>
+          </a:bodyPr>
+          <a:lstStyle>
+            <a:lvl1pPr algn="l" defTabSz="914400" rtl="0" eaLnBrk="1" latinLnBrk="0" hangingPunct="1">
+              <a:lnSpc>
+                <a:spcPct val="90000"/>
+              </a:lnSpc>
+              <a:spcBef>
+                <a:spcPct val="0"/>
+              </a:spcBef>
+              <a:buNone/>
+              <a:defRPr sz="4400" kern="1200">
+                <a:solidFill>
+                  <a:schemeClr val="tx1"/>
+                </a:solidFill>
+                <a:latin typeface="+mj-lt"/>
+                <a:ea typeface="+mj-ea"/>
+                <a:cs typeface="+mj-cs"/>
+              </a:defRPr>
+            </a:lvl1pPr>
+          </a:lstStyle>
+          <a:p>
+            <a:r>
+              <a:rPr lang="it-IT" sz="2800" dirty="0">
+                <a:latin typeface="Cmu serif" panose="02000603000000000000" pitchFamily="2" charset="0"/>
+                <a:ea typeface="Cmu serif" panose="02000603000000000000" pitchFamily="2" charset="0"/>
+                <a:cs typeface="Cmu serif" panose="02000603000000000000" pitchFamily="2" charset="0"/>
+              </a:rPr>
+              <a:t>4.2.2. Verifica delle ipotesi di forze resistenti nulle</a:t>
+            </a:r>
+          </a:p>
+        </p:txBody>
+      </p:sp>
+      <p:pic>
+        <p:nvPicPr>
+          <p:cNvPr id="5" name="Immagine 4">
+            <a:extLst>
+              <a:ext uri="{FF2B5EF4-FFF2-40B4-BE49-F238E27FC236}">
+                <a16:creationId xmlns:a16="http://schemas.microsoft.com/office/drawing/2014/main" id="{C1E09374-937E-62C2-9742-306D6156BE02}"/>
+              </a:ext>
+            </a:extLst>
+          </p:cNvPr>
+          <p:cNvPicPr>
+            <a:picLocks noChangeAspect="1"/>
+          </p:cNvPicPr>
+          <p:nvPr/>
+        </p:nvPicPr>
+        <p:blipFill>
+          <a:blip r:embed="rId3">
+            <a:extLst>
+              <a:ext uri="{28A0092B-C50C-407E-A947-70E740481C1C}">
+                <a14:useLocalDpi xmlns:a14="http://schemas.microsoft.com/office/drawing/2010/main" val="0"/>
+              </a:ext>
+            </a:extLst>
+          </a:blip>
+          <a:stretch>
+            <a:fillRect/>
+          </a:stretch>
+        </p:blipFill>
+        <p:spPr>
+          <a:xfrm>
+            <a:off x="3875012" y="3545934"/>
+            <a:ext cx="4441975" cy="534474"/>
+          </a:xfrm>
+          <a:prstGeom prst="rect">
+            <a:avLst/>
+          </a:prstGeom>
+        </p:spPr>
+      </p:pic>
+      <p:sp>
+        <p:nvSpPr>
+          <p:cNvPr id="6" name="CasellaDiTesto 5">
+            <a:extLst>
+              <a:ext uri="{FF2B5EF4-FFF2-40B4-BE49-F238E27FC236}">
+                <a16:creationId xmlns:a16="http://schemas.microsoft.com/office/drawing/2014/main" id="{BF0FD376-498A-BC6D-15C8-0ADA6E47E3A3}"/>
+              </a:ext>
+            </a:extLst>
+          </p:cNvPr>
+          <p:cNvSpPr txBox="1"/>
+          <p:nvPr/>
+        </p:nvSpPr>
+        <p:spPr>
+          <a:xfrm>
+            <a:off x="900002" y="4379007"/>
+            <a:ext cx="10391998" cy="1938992"/>
+          </a:xfrm>
+          <a:prstGeom prst="rect">
+            <a:avLst/>
+          </a:prstGeom>
+          <a:noFill/>
+        </p:spPr>
+        <p:txBody>
+          <a:bodyPr wrap="square" rtlCol="0">
+            <a:spAutoFit/>
+          </a:bodyPr>
+          <a:lstStyle/>
+          <a:p>
+            <a:pPr algn="just"/>
+            <a:r>
+              <a:rPr lang="it-IT" sz="2000" dirty="0">
+                <a:latin typeface="Cmu serif" panose="02000603000000000000" pitchFamily="2" charset="0"/>
+                <a:ea typeface="Cmu serif" panose="02000603000000000000" pitchFamily="2" charset="0"/>
+                <a:cs typeface="Cmu serif" panose="02000603000000000000" pitchFamily="2" charset="0"/>
+              </a:rPr>
+              <a:t>Per una maggiore affidabilità dei dati di accelerazione, si sono utilizzati due misure di origine diversa, in particolare:</a:t>
+            </a:r>
+          </a:p>
+          <a:p>
+            <a:pPr algn="just"/>
+            <a:endParaRPr lang="it-IT" sz="2000" dirty="0">
+              <a:latin typeface="Cmu serif" panose="02000603000000000000" pitchFamily="2" charset="0"/>
+              <a:ea typeface="Cmu serif" panose="02000603000000000000" pitchFamily="2" charset="0"/>
+              <a:cs typeface="Cmu serif" panose="02000603000000000000" pitchFamily="2" charset="0"/>
+            </a:endParaRPr>
+          </a:p>
+          <a:p>
+            <a:pPr marL="800100" lvl="1" indent="-342900" algn="just">
+              <a:buFont typeface="Arial" panose="020B0604020202020204" pitchFamily="34" charset="0"/>
+              <a:buChar char="•"/>
+            </a:pPr>
+            <a:r>
+              <a:rPr lang="it-IT" sz="2000" dirty="0">
+                <a:latin typeface="Cmu serif" panose="02000603000000000000" pitchFamily="2" charset="0"/>
+                <a:ea typeface="Cmu serif" panose="02000603000000000000" pitchFamily="2" charset="0"/>
+                <a:cs typeface="Cmu serif" panose="02000603000000000000" pitchFamily="2" charset="0"/>
+              </a:rPr>
+              <a:t>La variazione di velocità nel tempo, misurata dal modulo GNSS a partire dai dati di posizione satellitari.</a:t>
+            </a:r>
+          </a:p>
+          <a:p>
+            <a:pPr marL="800100" lvl="1" indent="-342900" algn="just">
+              <a:buFont typeface="Arial" panose="020B0604020202020204" pitchFamily="34" charset="0"/>
+              <a:buChar char="•"/>
+            </a:pPr>
+            <a:r>
+              <a:rPr lang="it-IT" sz="2000" dirty="0">
+                <a:latin typeface="Cmu serif" panose="02000603000000000000" pitchFamily="2" charset="0"/>
+                <a:ea typeface="Cmu serif" panose="02000603000000000000" pitchFamily="2" charset="0"/>
+                <a:cs typeface="Cmu serif" panose="02000603000000000000" pitchFamily="2" charset="0"/>
+              </a:rPr>
+              <a:t>I dati dell’accelerometro.</a:t>
+            </a:r>
+          </a:p>
+        </p:txBody>
+      </p:sp>
+    </p:spTree>
+    <p:extLst>
+      <p:ext uri="{BB962C8B-B14F-4D97-AF65-F5344CB8AC3E}">
+        <p14:creationId xmlns:p14="http://schemas.microsoft.com/office/powerpoint/2010/main" val="3220123056"/>
+      </p:ext>
+    </p:extLst>
+  </p:cSld>
+  <p:clrMapOvr>
+    <a:masterClrMapping/>
+  </p:clrMapOvr>
+</p:sld>
+</file>
+
+<file path=ppt/slides/slide11.xml><?xml version="1.0" encoding="utf-8"?>
+<p:sld xmlns:a="http://schemas.openxmlformats.org/drawingml/2006/main" xmlns:r="http://schemas.openxmlformats.org/officeDocument/2006/relationships" xmlns:p="http://schemas.openxmlformats.org/presentationml/2006/main">
+  <p:cSld>
+    <p:spTree>
+      <p:nvGrpSpPr>
+        <p:cNvPr id="1" name=""/>
+        <p:cNvGrpSpPr/>
+        <p:nvPr/>
+      </p:nvGrpSpPr>
+      <p:grpSpPr>
+        <a:xfrm>
+          <a:off x="0" y="0"/>
+          <a:ext cx="0" cy="0"/>
+          <a:chOff x="0" y="0"/>
+          <a:chExt cx="0" cy="0"/>
+        </a:xfrm>
+      </p:grpSpPr>
+      <p:pic>
+        <p:nvPicPr>
+          <p:cNvPr id="4" name="Immagine 3" descr="Immagine che contiene testo, Carattere, Elementi grafici, logo">
+            <a:extLst>
+              <a:ext uri="{FF2B5EF4-FFF2-40B4-BE49-F238E27FC236}">
+                <a16:creationId xmlns:a16="http://schemas.microsoft.com/office/drawing/2014/main" id="{B6812EB3-284C-CD2B-D39B-7E068E84B778}"/>
+              </a:ext>
+            </a:extLst>
+          </p:cNvPr>
+          <p:cNvPicPr>
+            <a:picLocks noChangeAspect="1"/>
+          </p:cNvPicPr>
+          <p:nvPr/>
+        </p:nvPicPr>
+        <p:blipFill>
+          <a:blip r:embed="rId2">
+            <a:extLst>
+              <a:ext uri="{28A0092B-C50C-407E-A947-70E740481C1C}">
+                <a14:useLocalDpi xmlns:a14="http://schemas.microsoft.com/office/drawing/2010/main" val="0"/>
+              </a:ext>
+            </a:extLst>
+          </a:blip>
+          <a:stretch>
+            <a:fillRect/>
+          </a:stretch>
+        </p:blipFill>
+        <p:spPr>
+          <a:xfrm>
+            <a:off x="900000" y="540001"/>
+            <a:ext cx="2076591" cy="938572"/>
+          </a:xfrm>
+          <a:prstGeom prst="rect">
+            <a:avLst/>
+          </a:prstGeom>
+        </p:spPr>
+      </p:pic>
+      <p:sp>
+        <p:nvSpPr>
+          <p:cNvPr id="9" name="CasellaDiTesto 8">
+            <a:extLst>
+              <a:ext uri="{FF2B5EF4-FFF2-40B4-BE49-F238E27FC236}">
+                <a16:creationId xmlns:a16="http://schemas.microsoft.com/office/drawing/2014/main" id="{6BBA43B8-57EC-EC7D-B79C-094BABBFFDF4}"/>
+              </a:ext>
+            </a:extLst>
+          </p:cNvPr>
+          <p:cNvSpPr txBox="1"/>
+          <p:nvPr/>
+        </p:nvSpPr>
+        <p:spPr>
+          <a:xfrm>
+            <a:off x="900002" y="1923897"/>
+            <a:ext cx="10391998" cy="1631216"/>
+          </a:xfrm>
+          <a:prstGeom prst="rect">
+            <a:avLst/>
+          </a:prstGeom>
+          <a:noFill/>
+        </p:spPr>
+        <p:txBody>
+          <a:bodyPr wrap="square" rtlCol="0">
+            <a:spAutoFit/>
+          </a:bodyPr>
+          <a:lstStyle/>
+          <a:p>
+            <a:pPr algn="just"/>
+            <a:r>
+              <a:rPr lang="it-IT" sz="2000" dirty="0">
+                <a:latin typeface="Cmu serif" panose="02000603000000000000" pitchFamily="2" charset="0"/>
+                <a:ea typeface="Cmu serif" panose="02000603000000000000" pitchFamily="2" charset="0"/>
+                <a:cs typeface="Cmu serif" panose="02000603000000000000" pitchFamily="2" charset="0"/>
+              </a:rPr>
+              <a:t>Il calcolo dei tre set di dati è stato eseguito da un secondo script Python e ha prodotto per ogni volo diagrammi tutti simili tra loro, con un andamento analogo a quello riportato.</a:t>
+            </a:r>
+          </a:p>
+          <a:p>
+            <a:pPr algn="just"/>
+            <a:endParaRPr lang="it-IT" sz="2000" dirty="0">
+              <a:latin typeface="Cmu serif" panose="02000603000000000000" pitchFamily="2" charset="0"/>
+              <a:ea typeface="Cmu serif" panose="02000603000000000000" pitchFamily="2" charset="0"/>
+              <a:cs typeface="Cmu serif" panose="02000603000000000000" pitchFamily="2" charset="0"/>
+            </a:endParaRPr>
+          </a:p>
+          <a:p>
+            <a:pPr algn="just"/>
+            <a:r>
+              <a:rPr lang="it-IT" sz="2000" dirty="0">
+                <a:latin typeface="Cmu serif" panose="02000603000000000000" pitchFamily="2" charset="0"/>
+                <a:ea typeface="Cmu serif" panose="02000603000000000000" pitchFamily="2" charset="0"/>
+                <a:cs typeface="Cmu serif" panose="02000603000000000000" pitchFamily="2" charset="0"/>
+              </a:rPr>
+              <a:t>Si osserva come la forza risultante abbia un valore vicino al 50% della forza propulsiva. Di conseguenza le forze resistenti non possono essere considerate trascurabili.</a:t>
+            </a:r>
+          </a:p>
+        </p:txBody>
+      </p:sp>
+      <p:sp>
+        <p:nvSpPr>
+          <p:cNvPr id="7" name="Titolo 1">
+            <a:extLst>
+              <a:ext uri="{FF2B5EF4-FFF2-40B4-BE49-F238E27FC236}">
+                <a16:creationId xmlns:a16="http://schemas.microsoft.com/office/drawing/2014/main" id="{FC6D212B-F062-2C61-2A86-D946A609F9D9}"/>
+              </a:ext>
+            </a:extLst>
+          </p:cNvPr>
+          <p:cNvSpPr txBox="1">
+            <a:spLocks/>
+          </p:cNvSpPr>
+          <p:nvPr/>
+        </p:nvSpPr>
+        <p:spPr>
+          <a:xfrm>
+            <a:off x="3524921" y="569936"/>
+            <a:ext cx="7767079" cy="878702"/>
+          </a:xfrm>
+          <a:prstGeom prst="rect">
+            <a:avLst/>
+          </a:prstGeom>
+        </p:spPr>
+        <p:txBody>
+          <a:bodyPr vert="horz" wrap="square" lIns="91440" tIns="45720" rIns="91440" bIns="45720" rtlCol="0" anchor="ctr">
+            <a:spAutoFit/>
+          </a:bodyPr>
+          <a:lstStyle>
+            <a:lvl1pPr algn="l" defTabSz="914400" rtl="0" eaLnBrk="1" latinLnBrk="0" hangingPunct="1">
+              <a:lnSpc>
+                <a:spcPct val="90000"/>
+              </a:lnSpc>
+              <a:spcBef>
+                <a:spcPct val="0"/>
+              </a:spcBef>
+              <a:buNone/>
+              <a:defRPr sz="4400" kern="1200">
+                <a:solidFill>
+                  <a:schemeClr val="tx1"/>
+                </a:solidFill>
+                <a:latin typeface="+mj-lt"/>
+                <a:ea typeface="+mj-ea"/>
+                <a:cs typeface="+mj-cs"/>
+              </a:defRPr>
+            </a:lvl1pPr>
+          </a:lstStyle>
+          <a:p>
+            <a:r>
+              <a:rPr lang="it-IT" sz="2800" dirty="0">
+                <a:latin typeface="Cmu serif" panose="02000603000000000000" pitchFamily="2" charset="0"/>
+                <a:ea typeface="Cmu serif" panose="02000603000000000000" pitchFamily="2" charset="0"/>
+                <a:cs typeface="Cmu serif" panose="02000603000000000000" pitchFamily="2" charset="0"/>
+              </a:rPr>
+              <a:t>4.2.2. Verifica delle ipotesi di forze resistenti nulle</a:t>
+            </a:r>
+          </a:p>
+        </p:txBody>
+      </p:sp>
+      <p:pic>
+        <p:nvPicPr>
+          <p:cNvPr id="10" name="Immagine 9" descr="Immagine che contiene testo, diagramma, linea, Diagramma&#10;&#10;Descrizione generata automaticamente">
+            <a:extLst>
+              <a:ext uri="{FF2B5EF4-FFF2-40B4-BE49-F238E27FC236}">
+                <a16:creationId xmlns:a16="http://schemas.microsoft.com/office/drawing/2014/main" id="{55B6CB4E-5F7A-668F-E757-295DC1BCCFA3}"/>
+              </a:ext>
+            </a:extLst>
+          </p:cNvPr>
+          <p:cNvPicPr>
+            <a:picLocks noChangeAspect="1"/>
+          </p:cNvPicPr>
+          <p:nvPr/>
+        </p:nvPicPr>
+        <p:blipFill>
+          <a:blip r:embed="rId3">
+            <a:extLst>
+              <a:ext uri="{28A0092B-C50C-407E-A947-70E740481C1C}">
+                <a14:useLocalDpi xmlns:a14="http://schemas.microsoft.com/office/drawing/2010/main" val="0"/>
+              </a:ext>
+            </a:extLst>
+          </a:blip>
+          <a:stretch>
+            <a:fillRect/>
+          </a:stretch>
+        </p:blipFill>
+        <p:spPr>
+          <a:xfrm>
+            <a:off x="7741287" y="3601407"/>
+            <a:ext cx="3622121" cy="2716591"/>
+          </a:xfrm>
+          <a:prstGeom prst="rect">
+            <a:avLst/>
+          </a:prstGeom>
+        </p:spPr>
+      </p:pic>
+      <p:pic>
+        <p:nvPicPr>
+          <p:cNvPr id="12" name="Immagine 11" descr="Immagine che contiene testo, diagramma, linea, Diagramma&#10;&#10;Descrizione generata automaticamente">
+            <a:extLst>
+              <a:ext uri="{FF2B5EF4-FFF2-40B4-BE49-F238E27FC236}">
+                <a16:creationId xmlns:a16="http://schemas.microsoft.com/office/drawing/2014/main" id="{105ABA4B-AE3E-C0FA-4DA6-6A97B3393E29}"/>
+              </a:ext>
+            </a:extLst>
+          </p:cNvPr>
+          <p:cNvPicPr>
+            <a:picLocks noChangeAspect="1"/>
+          </p:cNvPicPr>
+          <p:nvPr/>
+        </p:nvPicPr>
+        <p:blipFill>
+          <a:blip r:embed="rId4">
+            <a:extLst>
+              <a:ext uri="{28A0092B-C50C-407E-A947-70E740481C1C}">
+                <a14:useLocalDpi xmlns:a14="http://schemas.microsoft.com/office/drawing/2010/main" val="0"/>
+              </a:ext>
+            </a:extLst>
+          </a:blip>
+          <a:stretch>
+            <a:fillRect/>
+          </a:stretch>
+        </p:blipFill>
+        <p:spPr>
+          <a:xfrm>
+            <a:off x="4284939" y="3601408"/>
+            <a:ext cx="3622121" cy="2716591"/>
+          </a:xfrm>
+          <a:prstGeom prst="rect">
+            <a:avLst/>
+          </a:prstGeom>
+        </p:spPr>
+      </p:pic>
+      <p:pic>
+        <p:nvPicPr>
+          <p:cNvPr id="14" name="Immagine 13" descr="Immagine che contiene testo, diagramma, linea, Diagramma">
+            <a:extLst>
+              <a:ext uri="{FF2B5EF4-FFF2-40B4-BE49-F238E27FC236}">
+                <a16:creationId xmlns:a16="http://schemas.microsoft.com/office/drawing/2014/main" id="{101990A3-537E-46C2-CF95-FC7D59394183}"/>
+              </a:ext>
+            </a:extLst>
+          </p:cNvPr>
+          <p:cNvPicPr>
+            <a:picLocks noChangeAspect="1"/>
+          </p:cNvPicPr>
+          <p:nvPr/>
+        </p:nvPicPr>
+        <p:blipFill>
+          <a:blip r:embed="rId5">
+            <a:extLst>
+              <a:ext uri="{28A0092B-C50C-407E-A947-70E740481C1C}">
+                <a14:useLocalDpi xmlns:a14="http://schemas.microsoft.com/office/drawing/2010/main" val="0"/>
+              </a:ext>
+            </a:extLst>
+          </a:blip>
+          <a:stretch>
+            <a:fillRect/>
+          </a:stretch>
+        </p:blipFill>
+        <p:spPr>
+          <a:xfrm>
+            <a:off x="828591" y="3601407"/>
+            <a:ext cx="3622121" cy="2716591"/>
+          </a:xfrm>
+          <a:prstGeom prst="rect">
+            <a:avLst/>
+          </a:prstGeom>
+        </p:spPr>
+      </p:pic>
+    </p:spTree>
+    <p:extLst>
+      <p:ext uri="{BB962C8B-B14F-4D97-AF65-F5344CB8AC3E}">
+        <p14:creationId xmlns:p14="http://schemas.microsoft.com/office/powerpoint/2010/main" val="3354236346"/>
+      </p:ext>
+    </p:extLst>
+  </p:cSld>
+  <p:clrMapOvr>
+    <a:masterClrMapping/>
+  </p:clrMapOvr>
+</p:sld>
+</file>
+
 <file path=ppt/slides/slide2.xml><?xml version="1.0" encoding="utf-8"?>
 <p:sld xmlns:a="http://schemas.openxmlformats.org/drawingml/2006/main" xmlns:r="http://schemas.openxmlformats.org/officeDocument/2006/relationships" xmlns:p="http://schemas.openxmlformats.org/presentationml/2006/main">
   <p:cSld>
@@ -3760,6 +4333,7 @@
           </a:bodyPr>
           <a:lstStyle/>
           <a:p>
+            <a:pPr algn="just"/>
             <a:r>
               <a:rPr lang="it-IT" sz="2000" dirty="0">
                 <a:latin typeface="Cmu serif" panose="02000603000000000000" pitchFamily="2" charset="0"/>
@@ -3770,6 +4344,7 @@
             </a:r>
           </a:p>
           <a:p>
+            <a:pPr algn="just"/>
             <a:endParaRPr lang="it-IT" sz="2000" dirty="0">
               <a:latin typeface="Cmu serif" panose="02000603000000000000" pitchFamily="2" charset="0"/>
               <a:ea typeface="Cmu serif" panose="02000603000000000000" pitchFamily="2" charset="0"/>
@@ -3777,7 +4352,7 @@
             </a:endParaRPr>
           </a:p>
           <a:p>
-            <a:pPr marL="800100" lvl="1" indent="-342900">
+            <a:pPr marL="800100" lvl="1" indent="-342900" algn="just">
               <a:buFont typeface="Arial" panose="020B0604020202020204" pitchFamily="34" charset="0"/>
               <a:buChar char="•"/>
             </a:pPr>
@@ -3791,7 +4366,7 @@
             </a:r>
           </a:p>
           <a:p>
-            <a:pPr marL="800100" lvl="1" indent="-342900">
+            <a:pPr marL="800100" lvl="1" indent="-342900" algn="just">
               <a:buFont typeface="Arial" panose="020B0604020202020204" pitchFamily="34" charset="0"/>
               <a:buChar char="•"/>
             </a:pPr>
@@ -3805,7 +4380,7 @@
             </a:r>
           </a:p>
           <a:p>
-            <a:pPr marL="800100" lvl="1" indent="-342900">
+            <a:pPr marL="800100" lvl="1" indent="-342900" algn="just">
               <a:buFont typeface="Arial" panose="020B0604020202020204" pitchFamily="34" charset="0"/>
               <a:buChar char="•"/>
             </a:pPr>
@@ -3819,7 +4394,7 @@
             </a:r>
           </a:p>
           <a:p>
-            <a:pPr marL="800100" lvl="1" indent="-342900">
+            <a:pPr marL="800100" lvl="1" indent="-342900" algn="just">
               <a:buFont typeface="Arial" panose="020B0604020202020204" pitchFamily="34" charset="0"/>
               <a:buChar char="•"/>
             </a:pPr>
@@ -3833,7 +4408,7 @@
             </a:r>
           </a:p>
           <a:p>
-            <a:pPr marL="800100" lvl="1" indent="-342900">
+            <a:pPr marL="800100" lvl="1" indent="-342900" algn="just">
               <a:buFont typeface="Arial" panose="020B0604020202020204" pitchFamily="34" charset="0"/>
               <a:buChar char="•"/>
             </a:pPr>
@@ -3844,6 +4419,7 @@
             </a:endParaRPr>
           </a:p>
           <a:p>
+            <a:pPr algn="just"/>
             <a:r>
               <a:rPr lang="it-IT" sz="2000" dirty="0">
                 <a:latin typeface="Cmu serif" panose="02000603000000000000" pitchFamily="2" charset="0"/>
@@ -3988,6 +4564,7 @@
           </a:bodyPr>
           <a:lstStyle/>
           <a:p>
+            <a:pPr algn="just"/>
             <a:r>
               <a:rPr lang="it-IT" sz="2000" dirty="0">
                 <a:latin typeface="Cmu serif" panose="02000603000000000000" pitchFamily="2" charset="0"/>
@@ -3998,6 +4575,7 @@
             </a:r>
           </a:p>
           <a:p>
+            <a:pPr algn="just"/>
             <a:endParaRPr lang="it-IT" sz="2000" dirty="0">
               <a:latin typeface="Cmu serif" panose="02000603000000000000" pitchFamily="2" charset="0"/>
               <a:ea typeface="Cmu serif" panose="02000603000000000000" pitchFamily="2" charset="0"/>
@@ -4005,6 +4583,7 @@
             </a:endParaRPr>
           </a:p>
           <a:p>
+            <a:pPr algn="just"/>
             <a:r>
               <a:rPr lang="it-IT" sz="2000" dirty="0">
                 <a:latin typeface="Cmu serif" panose="02000603000000000000" pitchFamily="2" charset="0"/>
@@ -4031,6 +4610,7 @@
             </a:r>
           </a:p>
           <a:p>
+            <a:pPr algn="just"/>
             <a:endParaRPr lang="it-IT" sz="2000" dirty="0">
               <a:latin typeface="Cmu serif" panose="02000603000000000000" pitchFamily="2" charset="0"/>
               <a:ea typeface="Cmu serif" panose="02000603000000000000" pitchFamily="2" charset="0"/>
@@ -4038,6 +4618,7 @@
             </a:endParaRPr>
           </a:p>
           <a:p>
+            <a:pPr algn="just"/>
             <a:r>
               <a:rPr lang="it-IT" sz="2000" dirty="0">
                 <a:latin typeface="Cmu serif" panose="02000603000000000000" pitchFamily="2" charset="0"/>
@@ -4359,6 +4940,7 @@
           </a:bodyPr>
           <a:lstStyle/>
           <a:p>
+            <a:pPr algn="just"/>
             <a:r>
               <a:rPr lang="it-IT" sz="2000" dirty="0">
                 <a:latin typeface="Cmu serif" panose="02000603000000000000" pitchFamily="2" charset="0"/>
@@ -4369,6 +4951,7 @@
             </a:r>
           </a:p>
           <a:p>
+            <a:pPr algn="just"/>
             <a:endParaRPr lang="it-IT" sz="2000" dirty="0">
               <a:latin typeface="Cmu serif" panose="02000603000000000000" pitchFamily="2" charset="0"/>
               <a:ea typeface="Cmu serif" panose="02000603000000000000" pitchFamily="2" charset="0"/>
@@ -4376,6 +4959,7 @@
             </a:endParaRPr>
           </a:p>
           <a:p>
+            <a:pPr algn="just"/>
             <a:r>
               <a:rPr lang="it-IT" sz="2000" dirty="0">
                 <a:latin typeface="Cmu serif" panose="02000603000000000000" pitchFamily="2" charset="0"/>
@@ -4402,6 +4986,7 @@
             </a:r>
           </a:p>
           <a:p>
+            <a:pPr algn="just"/>
             <a:endParaRPr lang="it-IT" sz="2000" dirty="0">
               <a:latin typeface="Cmu serif" panose="02000603000000000000" pitchFamily="2" charset="0"/>
               <a:ea typeface="Cmu serif" panose="02000603000000000000" pitchFamily="2" charset="0"/>
@@ -4409,6 +4994,7 @@
             </a:endParaRPr>
           </a:p>
           <a:p>
+            <a:pPr algn="just"/>
             <a:r>
               <a:rPr lang="it-IT" sz="2000" dirty="0">
                 <a:latin typeface="Cmu serif" panose="02000603000000000000" pitchFamily="2" charset="0"/>
@@ -4460,6 +5046,932 @@
     <p:extLst>
       <p:ext uri="{BB962C8B-B14F-4D97-AF65-F5344CB8AC3E}">
         <p14:creationId xmlns:p14="http://schemas.microsoft.com/office/powerpoint/2010/main" val="1983732649"/>
+      </p:ext>
+    </p:extLst>
+  </p:cSld>
+  <p:clrMapOvr>
+    <a:masterClrMapping/>
+  </p:clrMapOvr>
+</p:sld>
+</file>
+
+<file path=ppt/slides/slide6.xml><?xml version="1.0" encoding="utf-8"?>
+<p:sld xmlns:a="http://schemas.openxmlformats.org/drawingml/2006/main" xmlns:r="http://schemas.openxmlformats.org/officeDocument/2006/relationships" xmlns:p="http://schemas.openxmlformats.org/presentationml/2006/main">
+  <p:cSld>
+    <p:spTree>
+      <p:nvGrpSpPr>
+        <p:cNvPr id="1" name=""/>
+        <p:cNvGrpSpPr/>
+        <p:nvPr/>
+      </p:nvGrpSpPr>
+      <p:grpSpPr>
+        <a:xfrm>
+          <a:off x="0" y="0"/>
+          <a:ext cx="0" cy="0"/>
+          <a:chOff x="0" y="0"/>
+          <a:chExt cx="0" cy="0"/>
+        </a:xfrm>
+      </p:grpSpPr>
+      <p:sp>
+        <p:nvSpPr>
+          <p:cNvPr id="2" name="Titolo 1">
+            <a:extLst>
+              <a:ext uri="{FF2B5EF4-FFF2-40B4-BE49-F238E27FC236}">
+                <a16:creationId xmlns:a16="http://schemas.microsoft.com/office/drawing/2014/main" id="{F0CF7BC8-005C-3011-F93D-428C3AC94D28}"/>
+              </a:ext>
+            </a:extLst>
+          </p:cNvPr>
+          <p:cNvSpPr>
+            <a:spLocks noGrp="1"/>
+          </p:cNvSpPr>
+          <p:nvPr>
+            <p:ph type="title"/>
+          </p:nvPr>
+        </p:nvSpPr>
+        <p:spPr>
+          <a:xfrm>
+            <a:off x="3524921" y="708655"/>
+            <a:ext cx="7767079" cy="661720"/>
+          </a:xfrm>
+        </p:spPr>
+        <p:txBody>
+          <a:bodyPr wrap="square">
+            <a:spAutoFit/>
+          </a:bodyPr>
+          <a:lstStyle/>
+          <a:p>
+            <a:r>
+              <a:rPr lang="it-IT" sz="4000" dirty="0">
+                <a:latin typeface="Cmu serif" panose="02000603000000000000" pitchFamily="2" charset="0"/>
+                <a:ea typeface="Cmu serif" panose="02000603000000000000" pitchFamily="2" charset="0"/>
+                <a:cs typeface="Cmu serif" panose="02000603000000000000" pitchFamily="2" charset="0"/>
+              </a:rPr>
+              <a:t>3. Previsione dei punteggi</a:t>
+            </a:r>
+          </a:p>
+        </p:txBody>
+      </p:sp>
+      <p:pic>
+        <p:nvPicPr>
+          <p:cNvPr id="4" name="Immagine 3" descr="Immagine che contiene testo, Carattere, Elementi grafici, logo">
+            <a:extLst>
+              <a:ext uri="{FF2B5EF4-FFF2-40B4-BE49-F238E27FC236}">
+                <a16:creationId xmlns:a16="http://schemas.microsoft.com/office/drawing/2014/main" id="{B6812EB3-284C-CD2B-D39B-7E068E84B778}"/>
+              </a:ext>
+            </a:extLst>
+          </p:cNvPr>
+          <p:cNvPicPr>
+            <a:picLocks noChangeAspect="1"/>
+          </p:cNvPicPr>
+          <p:nvPr/>
+        </p:nvPicPr>
+        <p:blipFill>
+          <a:blip r:embed="rId2">
+            <a:extLst>
+              <a:ext uri="{28A0092B-C50C-407E-A947-70E740481C1C}">
+                <a14:useLocalDpi xmlns:a14="http://schemas.microsoft.com/office/drawing/2010/main" val="0"/>
+              </a:ext>
+            </a:extLst>
+          </a:blip>
+          <a:stretch>
+            <a:fillRect/>
+          </a:stretch>
+        </p:blipFill>
+        <p:spPr>
+          <a:xfrm>
+            <a:off x="900000" y="540001"/>
+            <a:ext cx="2076591" cy="938572"/>
+          </a:xfrm>
+          <a:prstGeom prst="rect">
+            <a:avLst/>
+          </a:prstGeom>
+        </p:spPr>
+      </p:pic>
+      <p:sp>
+        <p:nvSpPr>
+          <p:cNvPr id="9" name="CasellaDiTesto 8">
+            <a:extLst>
+              <a:ext uri="{FF2B5EF4-FFF2-40B4-BE49-F238E27FC236}">
+                <a16:creationId xmlns:a16="http://schemas.microsoft.com/office/drawing/2014/main" id="{6BBA43B8-57EC-EC7D-B79C-094BABBFFDF4}"/>
+              </a:ext>
+            </a:extLst>
+          </p:cNvPr>
+          <p:cNvSpPr txBox="1"/>
+          <p:nvPr/>
+        </p:nvSpPr>
+        <p:spPr>
+          <a:xfrm>
+            <a:off x="900001" y="1923897"/>
+            <a:ext cx="5606816" cy="4093428"/>
+          </a:xfrm>
+          <a:prstGeom prst="rect">
+            <a:avLst/>
+          </a:prstGeom>
+          <a:noFill/>
+        </p:spPr>
+        <p:txBody>
+          <a:bodyPr wrap="square" rtlCol="0">
+            <a:spAutoFit/>
+          </a:bodyPr>
+          <a:lstStyle/>
+          <a:p>
+            <a:pPr algn="just"/>
+            <a:r>
+              <a:rPr lang="it-IT" sz="2000" dirty="0">
+                <a:latin typeface="Cmu serif" panose="02000603000000000000" pitchFamily="2" charset="0"/>
+                <a:ea typeface="Cmu serif" panose="02000603000000000000" pitchFamily="2" charset="0"/>
+                <a:cs typeface="Cmu serif" panose="02000603000000000000" pitchFamily="2" charset="0"/>
+              </a:rPr>
+              <a:t>E’ stata eseguita elaborando i log del modulo GNSS per mezzo di uno script Python apposito. In particolare quest’ultimo permette di determinare l’istante di decollo nominale, distinguendolo dai falsi positivi.</a:t>
+            </a:r>
+          </a:p>
+          <a:p>
+            <a:pPr algn="just"/>
+            <a:endParaRPr lang="it-IT" sz="2000" dirty="0">
+              <a:latin typeface="Cmu serif" panose="02000603000000000000" pitchFamily="2" charset="0"/>
+              <a:ea typeface="Cmu serif" panose="02000603000000000000" pitchFamily="2" charset="0"/>
+              <a:cs typeface="Cmu serif" panose="02000603000000000000" pitchFamily="2" charset="0"/>
+            </a:endParaRPr>
+          </a:p>
+          <a:p>
+            <a:pPr algn="just"/>
+            <a:r>
+              <a:rPr lang="it-IT" sz="2000" dirty="0">
+                <a:latin typeface="Cmu serif" panose="02000603000000000000" pitchFamily="2" charset="0"/>
+                <a:ea typeface="Cmu serif" panose="02000603000000000000" pitchFamily="2" charset="0"/>
+                <a:cs typeface="Cmu serif" panose="02000603000000000000" pitchFamily="2" charset="0"/>
+              </a:rPr>
+              <a:t>Noto l’istante di decollo nominale, lo script calcola i valori dei fattori da considerare per l’attribuzione del punteggio:</a:t>
+            </a:r>
+          </a:p>
+          <a:p>
+            <a:pPr algn="just"/>
+            <a:endParaRPr lang="it-IT" sz="2000" dirty="0">
+              <a:latin typeface="Cmu serif" panose="02000603000000000000" pitchFamily="2" charset="0"/>
+              <a:ea typeface="Cmu serif" panose="02000603000000000000" pitchFamily="2" charset="0"/>
+              <a:cs typeface="Cmu serif" panose="02000603000000000000" pitchFamily="2" charset="0"/>
+            </a:endParaRPr>
+          </a:p>
+          <a:p>
+            <a:pPr marL="800100" lvl="1" indent="-342900" algn="just">
+              <a:buFont typeface="Arial" panose="020B0604020202020204" pitchFamily="34" charset="0"/>
+              <a:buChar char="•"/>
+            </a:pPr>
+            <a:r>
+              <a:rPr lang="it-IT" sz="2000" b="1" dirty="0">
+                <a:latin typeface="Cmu serif" panose="02000603000000000000" pitchFamily="2" charset="0"/>
+                <a:ea typeface="Cmu serif" panose="02000603000000000000" pitchFamily="2" charset="0"/>
+                <a:cs typeface="Cmu serif" panose="02000603000000000000" pitchFamily="2" charset="0"/>
+              </a:rPr>
+              <a:t>Payload</a:t>
+            </a:r>
+            <a:r>
+              <a:rPr lang="it-IT" sz="2000" dirty="0">
+                <a:latin typeface="Cmu serif" panose="02000603000000000000" pitchFamily="2" charset="0"/>
+                <a:ea typeface="Cmu serif" panose="02000603000000000000" pitchFamily="2" charset="0"/>
+                <a:cs typeface="Cmu serif" panose="02000603000000000000" pitchFamily="2" charset="0"/>
+              </a:rPr>
+              <a:t> in termini di massa.</a:t>
+            </a:r>
+          </a:p>
+          <a:p>
+            <a:pPr marL="800100" lvl="1" indent="-342900" algn="just">
+              <a:buFont typeface="Arial" panose="020B0604020202020204" pitchFamily="34" charset="0"/>
+              <a:buChar char="•"/>
+            </a:pPr>
+            <a:r>
+              <a:rPr lang="it-IT" sz="2000" b="1" dirty="0">
+                <a:latin typeface="Cmu serif" panose="02000603000000000000" pitchFamily="2" charset="0"/>
+                <a:ea typeface="Cmu serif" panose="02000603000000000000" pitchFamily="2" charset="0"/>
+                <a:cs typeface="Cmu serif" panose="02000603000000000000" pitchFamily="2" charset="0"/>
+              </a:rPr>
+              <a:t>Altitudine</a:t>
+            </a:r>
+            <a:r>
+              <a:rPr lang="it-IT" sz="2000" dirty="0">
+                <a:latin typeface="Cmu serif" panose="02000603000000000000" pitchFamily="2" charset="0"/>
+                <a:ea typeface="Cmu serif" panose="02000603000000000000" pitchFamily="2" charset="0"/>
+                <a:cs typeface="Cmu serif" panose="02000603000000000000" pitchFamily="2" charset="0"/>
+              </a:rPr>
+              <a:t> a t+60s</a:t>
+            </a:r>
+          </a:p>
+          <a:p>
+            <a:pPr marL="800100" lvl="1" indent="-342900" algn="just">
+              <a:buFont typeface="Arial" panose="020B0604020202020204" pitchFamily="34" charset="0"/>
+              <a:buChar char="•"/>
+            </a:pPr>
+            <a:r>
+              <a:rPr lang="it-IT" sz="2000" b="1" dirty="0">
+                <a:latin typeface="Cmu serif" panose="02000603000000000000" pitchFamily="2" charset="0"/>
+                <a:ea typeface="Cmu serif" panose="02000603000000000000" pitchFamily="2" charset="0"/>
+                <a:cs typeface="Cmu serif" panose="02000603000000000000" pitchFamily="2" charset="0"/>
+              </a:rPr>
+              <a:t>Distanza</a:t>
+            </a:r>
+            <a:r>
+              <a:rPr lang="it-IT" sz="2000" dirty="0">
+                <a:latin typeface="Cmu serif" panose="02000603000000000000" pitchFamily="2" charset="0"/>
+                <a:ea typeface="Cmu serif" panose="02000603000000000000" pitchFamily="2" charset="0"/>
+                <a:cs typeface="Cmu serif" panose="02000603000000000000" pitchFamily="2" charset="0"/>
+              </a:rPr>
+              <a:t> tra t+60s e t+180s</a:t>
+            </a:r>
+          </a:p>
+        </p:txBody>
+      </p:sp>
+      <p:pic>
+        <p:nvPicPr>
+          <p:cNvPr id="8" name="Immagine 7" descr="Immagine che contiene testo, schermata, software, computer&#10;&#10;Descrizione generata automaticamente">
+            <a:extLst>
+              <a:ext uri="{FF2B5EF4-FFF2-40B4-BE49-F238E27FC236}">
+                <a16:creationId xmlns:a16="http://schemas.microsoft.com/office/drawing/2014/main" id="{61EFD6EF-3F8E-63B6-BA23-D2F4C2C6BDC9}"/>
+              </a:ext>
+            </a:extLst>
+          </p:cNvPr>
+          <p:cNvPicPr>
+            <a:picLocks noChangeAspect="1"/>
+          </p:cNvPicPr>
+          <p:nvPr/>
+        </p:nvPicPr>
+        <p:blipFill>
+          <a:blip r:embed="rId3">
+            <a:extLst>
+              <a:ext uri="{28A0092B-C50C-407E-A947-70E740481C1C}">
+                <a14:useLocalDpi xmlns:a14="http://schemas.microsoft.com/office/drawing/2010/main" val="0"/>
+              </a:ext>
+            </a:extLst>
+          </a:blip>
+          <a:stretch>
+            <a:fillRect/>
+          </a:stretch>
+        </p:blipFill>
+        <p:spPr>
+          <a:xfrm>
+            <a:off x="7036903" y="1702645"/>
+            <a:ext cx="4255096" cy="4535932"/>
+          </a:xfrm>
+          <a:prstGeom prst="rect">
+            <a:avLst/>
+          </a:prstGeom>
+        </p:spPr>
+      </p:pic>
+    </p:spTree>
+    <p:extLst>
+      <p:ext uri="{BB962C8B-B14F-4D97-AF65-F5344CB8AC3E}">
+        <p14:creationId xmlns:p14="http://schemas.microsoft.com/office/powerpoint/2010/main" val="2038037390"/>
+      </p:ext>
+    </p:extLst>
+  </p:cSld>
+  <p:clrMapOvr>
+    <a:masterClrMapping/>
+  </p:clrMapOvr>
+</p:sld>
+</file>
+
+<file path=ppt/slides/slide7.xml><?xml version="1.0" encoding="utf-8"?>
+<p:sld xmlns:a="http://schemas.openxmlformats.org/drawingml/2006/main" xmlns:r="http://schemas.openxmlformats.org/officeDocument/2006/relationships" xmlns:p="http://schemas.openxmlformats.org/presentationml/2006/main">
+  <p:cSld>
+    <p:spTree>
+      <p:nvGrpSpPr>
+        <p:cNvPr id="1" name=""/>
+        <p:cNvGrpSpPr/>
+        <p:nvPr/>
+      </p:nvGrpSpPr>
+      <p:grpSpPr>
+        <a:xfrm>
+          <a:off x="0" y="0"/>
+          <a:ext cx="0" cy="0"/>
+          <a:chOff x="0" y="0"/>
+          <a:chExt cx="0" cy="0"/>
+        </a:xfrm>
+      </p:grpSpPr>
+      <p:sp>
+        <p:nvSpPr>
+          <p:cNvPr id="2" name="Titolo 1">
+            <a:extLst>
+              <a:ext uri="{FF2B5EF4-FFF2-40B4-BE49-F238E27FC236}">
+                <a16:creationId xmlns:a16="http://schemas.microsoft.com/office/drawing/2014/main" id="{F0CF7BC8-005C-3011-F93D-428C3AC94D28}"/>
+              </a:ext>
+            </a:extLst>
+          </p:cNvPr>
+          <p:cNvSpPr>
+            <a:spLocks noGrp="1"/>
+          </p:cNvSpPr>
+          <p:nvPr>
+            <p:ph type="title"/>
+          </p:nvPr>
+        </p:nvSpPr>
+        <p:spPr>
+          <a:xfrm>
+            <a:off x="3524921" y="569936"/>
+            <a:ext cx="7767079" cy="878702"/>
+          </a:xfrm>
+        </p:spPr>
+        <p:txBody>
+          <a:bodyPr wrap="square">
+            <a:spAutoFit/>
+          </a:bodyPr>
+          <a:lstStyle/>
+          <a:p>
+            <a:r>
+              <a:rPr lang="it-IT" sz="2800" dirty="0">
+                <a:latin typeface="Cmu serif" panose="02000603000000000000" pitchFamily="2" charset="0"/>
+                <a:ea typeface="Cmu serif" panose="02000603000000000000" pitchFamily="2" charset="0"/>
+                <a:cs typeface="Cmu serif" panose="02000603000000000000" pitchFamily="2" charset="0"/>
+              </a:rPr>
+              <a:t>4. Verifica del processo di dimensionamento del velivolo</a:t>
+            </a:r>
+          </a:p>
+        </p:txBody>
+      </p:sp>
+      <p:pic>
+        <p:nvPicPr>
+          <p:cNvPr id="4" name="Immagine 3" descr="Immagine che contiene testo, Carattere, Elementi grafici, logo">
+            <a:extLst>
+              <a:ext uri="{FF2B5EF4-FFF2-40B4-BE49-F238E27FC236}">
+                <a16:creationId xmlns:a16="http://schemas.microsoft.com/office/drawing/2014/main" id="{B6812EB3-284C-CD2B-D39B-7E068E84B778}"/>
+              </a:ext>
+            </a:extLst>
+          </p:cNvPr>
+          <p:cNvPicPr>
+            <a:picLocks noChangeAspect="1"/>
+          </p:cNvPicPr>
+          <p:nvPr/>
+        </p:nvPicPr>
+        <p:blipFill>
+          <a:blip r:embed="rId2">
+            <a:extLst>
+              <a:ext uri="{28A0092B-C50C-407E-A947-70E740481C1C}">
+                <a14:useLocalDpi xmlns:a14="http://schemas.microsoft.com/office/drawing/2010/main" val="0"/>
+              </a:ext>
+            </a:extLst>
+          </a:blip>
+          <a:stretch>
+            <a:fillRect/>
+          </a:stretch>
+        </p:blipFill>
+        <p:spPr>
+          <a:xfrm>
+            <a:off x="900000" y="540001"/>
+            <a:ext cx="2076591" cy="938572"/>
+          </a:xfrm>
+          <a:prstGeom prst="rect">
+            <a:avLst/>
+          </a:prstGeom>
+        </p:spPr>
+      </p:pic>
+      <p:sp>
+        <p:nvSpPr>
+          <p:cNvPr id="9" name="CasellaDiTesto 8">
+            <a:extLst>
+              <a:ext uri="{FF2B5EF4-FFF2-40B4-BE49-F238E27FC236}">
+                <a16:creationId xmlns:a16="http://schemas.microsoft.com/office/drawing/2014/main" id="{6BBA43B8-57EC-EC7D-B79C-094BABBFFDF4}"/>
+              </a:ext>
+            </a:extLst>
+          </p:cNvPr>
+          <p:cNvSpPr txBox="1"/>
+          <p:nvPr/>
+        </p:nvSpPr>
+        <p:spPr>
+          <a:xfrm>
+            <a:off x="900001" y="1923897"/>
+            <a:ext cx="10392000" cy="1323439"/>
+          </a:xfrm>
+          <a:prstGeom prst="rect">
+            <a:avLst/>
+          </a:prstGeom>
+          <a:noFill/>
+        </p:spPr>
+        <p:txBody>
+          <a:bodyPr wrap="square" rtlCol="0">
+            <a:spAutoFit/>
+          </a:bodyPr>
+          <a:lstStyle/>
+          <a:p>
+            <a:pPr algn="just"/>
+            <a:r>
+              <a:rPr lang="it-IT" sz="2000" dirty="0">
+                <a:latin typeface="Cmu serif" panose="02000603000000000000" pitchFamily="2" charset="0"/>
+                <a:ea typeface="Cmu serif" panose="02000603000000000000" pitchFamily="2" charset="0"/>
+                <a:cs typeface="Cmu serif" panose="02000603000000000000" pitchFamily="2" charset="0"/>
+              </a:rPr>
+              <a:t>L’algoritmo utilizzato per ottenere i design preliminari dei velivoli del 2019 e 2022, per la sua elevata complessità ha comportato la necessità di fare svariate approssimazioni [4][5]. I dati empirici raccolti hanno permesso di verificare l’accettabilità di alcune di tali approssimazioni. Il processo di dimensionamento ha la struttura seguente:</a:t>
+            </a:r>
+          </a:p>
+        </p:txBody>
+      </p:sp>
+      <p:pic>
+        <p:nvPicPr>
+          <p:cNvPr id="5" name="Immagine 4" descr="Immagine che contiene testo, schermata, Carattere, linea">
+            <a:extLst>
+              <a:ext uri="{FF2B5EF4-FFF2-40B4-BE49-F238E27FC236}">
+                <a16:creationId xmlns:a16="http://schemas.microsoft.com/office/drawing/2014/main" id="{346679E3-ACC6-F7DC-8B7F-B74928A943A0}"/>
+              </a:ext>
+            </a:extLst>
+          </p:cNvPr>
+          <p:cNvPicPr>
+            <a:picLocks noChangeAspect="1"/>
+          </p:cNvPicPr>
+          <p:nvPr/>
+        </p:nvPicPr>
+        <p:blipFill>
+          <a:blip r:embed="rId3">
+            <a:extLst>
+              <a:ext uri="{28A0092B-C50C-407E-A947-70E740481C1C}">
+                <a14:useLocalDpi xmlns:a14="http://schemas.microsoft.com/office/drawing/2010/main" val="0"/>
+              </a:ext>
+            </a:extLst>
+          </a:blip>
+          <a:stretch>
+            <a:fillRect/>
+          </a:stretch>
+        </p:blipFill>
+        <p:spPr>
+          <a:xfrm>
+            <a:off x="1488295" y="3692660"/>
+            <a:ext cx="9215409" cy="2308266"/>
+          </a:xfrm>
+          <a:prstGeom prst="rect">
+            <a:avLst/>
+          </a:prstGeom>
+        </p:spPr>
+      </p:pic>
+    </p:spTree>
+    <p:extLst>
+      <p:ext uri="{BB962C8B-B14F-4D97-AF65-F5344CB8AC3E}">
+        <p14:creationId xmlns:p14="http://schemas.microsoft.com/office/powerpoint/2010/main" val="3845500179"/>
+      </p:ext>
+    </p:extLst>
+  </p:cSld>
+  <p:clrMapOvr>
+    <a:masterClrMapping/>
+  </p:clrMapOvr>
+</p:sld>
+</file>
+
+<file path=ppt/slides/slide8.xml><?xml version="1.0" encoding="utf-8"?>
+<p:sld xmlns:a="http://schemas.openxmlformats.org/drawingml/2006/main" xmlns:r="http://schemas.openxmlformats.org/officeDocument/2006/relationships" xmlns:p="http://schemas.openxmlformats.org/presentationml/2006/main">
+  <p:cSld>
+    <p:spTree>
+      <p:nvGrpSpPr>
+        <p:cNvPr id="1" name=""/>
+        <p:cNvGrpSpPr/>
+        <p:nvPr/>
+      </p:nvGrpSpPr>
+      <p:grpSpPr>
+        <a:xfrm>
+          <a:off x="0" y="0"/>
+          <a:ext cx="0" cy="0"/>
+          <a:chOff x="0" y="0"/>
+          <a:chExt cx="0" cy="0"/>
+        </a:xfrm>
+      </p:grpSpPr>
+      <p:pic>
+        <p:nvPicPr>
+          <p:cNvPr id="4" name="Immagine 3" descr="Immagine che contiene testo, Carattere, Elementi grafici, logo">
+            <a:extLst>
+              <a:ext uri="{FF2B5EF4-FFF2-40B4-BE49-F238E27FC236}">
+                <a16:creationId xmlns:a16="http://schemas.microsoft.com/office/drawing/2014/main" id="{B6812EB3-284C-CD2B-D39B-7E068E84B778}"/>
+              </a:ext>
+            </a:extLst>
+          </p:cNvPr>
+          <p:cNvPicPr>
+            <a:picLocks noChangeAspect="1"/>
+          </p:cNvPicPr>
+          <p:nvPr/>
+        </p:nvPicPr>
+        <p:blipFill>
+          <a:blip r:embed="rId2">
+            <a:extLst>
+              <a:ext uri="{28A0092B-C50C-407E-A947-70E740481C1C}">
+                <a14:useLocalDpi xmlns:a14="http://schemas.microsoft.com/office/drawing/2010/main" val="0"/>
+              </a:ext>
+            </a:extLst>
+          </a:blip>
+          <a:stretch>
+            <a:fillRect/>
+          </a:stretch>
+        </p:blipFill>
+        <p:spPr>
+          <a:xfrm>
+            <a:off x="900000" y="540001"/>
+            <a:ext cx="2076591" cy="938572"/>
+          </a:xfrm>
+          <a:prstGeom prst="rect">
+            <a:avLst/>
+          </a:prstGeom>
+        </p:spPr>
+      </p:pic>
+      <p:sp>
+        <p:nvSpPr>
+          <p:cNvPr id="9" name="CasellaDiTesto 8">
+            <a:extLst>
+              <a:ext uri="{FF2B5EF4-FFF2-40B4-BE49-F238E27FC236}">
+                <a16:creationId xmlns:a16="http://schemas.microsoft.com/office/drawing/2014/main" id="{6BBA43B8-57EC-EC7D-B79C-094BABBFFDF4}"/>
+              </a:ext>
+            </a:extLst>
+          </p:cNvPr>
+          <p:cNvSpPr txBox="1"/>
+          <p:nvPr/>
+        </p:nvSpPr>
+        <p:spPr>
+          <a:xfrm>
+            <a:off x="900001" y="1923897"/>
+            <a:ext cx="10392000" cy="2554545"/>
+          </a:xfrm>
+          <a:prstGeom prst="rect">
+            <a:avLst/>
+          </a:prstGeom>
+          <a:noFill/>
+        </p:spPr>
+        <p:txBody>
+          <a:bodyPr wrap="square" rtlCol="0">
+            <a:spAutoFit/>
+          </a:bodyPr>
+          <a:lstStyle/>
+          <a:p>
+            <a:pPr algn="just"/>
+            <a:r>
+              <a:rPr lang="it-IT" sz="2000" dirty="0">
+                <a:latin typeface="Cmu serif" panose="02000603000000000000" pitchFamily="2" charset="0"/>
+                <a:ea typeface="Cmu serif" panose="02000603000000000000" pitchFamily="2" charset="0"/>
+                <a:cs typeface="Cmu serif" panose="02000603000000000000" pitchFamily="2" charset="0"/>
+              </a:rPr>
+              <a:t>Con il collaudo si sono osservate delle forti discrepanze tra distanza e velocità di decollo reali e di progetto. Questo ha spinto ad indagare il secondo step del processo, presso il quale vengono considerate ipotesi e approssimazioni forti. In particolare:</a:t>
+            </a:r>
+          </a:p>
+          <a:p>
+            <a:pPr algn="just"/>
+            <a:endParaRPr lang="it-IT" sz="2000" dirty="0">
+              <a:latin typeface="Cmu serif" panose="02000603000000000000" pitchFamily="2" charset="0"/>
+              <a:ea typeface="Cmu serif" panose="02000603000000000000" pitchFamily="2" charset="0"/>
+              <a:cs typeface="Cmu serif" panose="02000603000000000000" pitchFamily="2" charset="0"/>
+            </a:endParaRPr>
+          </a:p>
+          <a:p>
+            <a:pPr marL="914400" lvl="1" indent="-457200" algn="just">
+              <a:buFont typeface="+mj-lt"/>
+              <a:buAutoNum type="arabicPeriod"/>
+            </a:pPr>
+            <a:r>
+              <a:rPr lang="it-IT" sz="2000" dirty="0">
+                <a:latin typeface="Cmu serif" panose="02000603000000000000" pitchFamily="2" charset="0"/>
+                <a:ea typeface="Cmu serif" panose="02000603000000000000" pitchFamily="2" charset="0"/>
+                <a:cs typeface="Cmu serif" panose="02000603000000000000" pitchFamily="2" charset="0"/>
+              </a:rPr>
+              <a:t>La potenza disponibile fornita dal sistema propulsivo viene prevista attraverso un modello che combina i dati </a:t>
+            </a:r>
+            <a:r>
+              <a:rPr lang="it-IT" sz="2000" dirty="0" err="1">
+                <a:latin typeface="Cmu serif" panose="02000603000000000000" pitchFamily="2" charset="0"/>
+                <a:ea typeface="Cmu serif" panose="02000603000000000000" pitchFamily="2" charset="0"/>
+                <a:cs typeface="Cmu serif" panose="02000603000000000000" pitchFamily="2" charset="0"/>
+              </a:rPr>
+              <a:t>eCalc</a:t>
+            </a:r>
+            <a:r>
+              <a:rPr lang="it-IT" sz="2000" dirty="0">
+                <a:latin typeface="Cmu serif" panose="02000603000000000000" pitchFamily="2" charset="0"/>
+                <a:ea typeface="Cmu serif" panose="02000603000000000000" pitchFamily="2" charset="0"/>
+                <a:cs typeface="Cmu serif" panose="02000603000000000000" pitchFamily="2" charset="0"/>
+              </a:rPr>
+              <a:t> sul motore, con quelli del datasheet dell’elica.</a:t>
+            </a:r>
+          </a:p>
+          <a:p>
+            <a:pPr marL="914400" lvl="1" indent="-457200" algn="just">
+              <a:buFont typeface="+mj-lt"/>
+              <a:buAutoNum type="arabicPeriod"/>
+            </a:pPr>
+            <a:r>
+              <a:rPr lang="it-IT" sz="2000" dirty="0">
+                <a:latin typeface="Cmu serif" panose="02000603000000000000" pitchFamily="2" charset="0"/>
+                <a:ea typeface="Cmu serif" panose="02000603000000000000" pitchFamily="2" charset="0"/>
+                <a:cs typeface="Cmu serif" panose="02000603000000000000" pitchFamily="2" charset="0"/>
+              </a:rPr>
+              <a:t>Vengono assunte tutte le forze resistenti trascurabili, assumendo che tutta la potenza propulsiva disponibile sia impiegata per accelerare il velivolo.</a:t>
+            </a:r>
+          </a:p>
+        </p:txBody>
+      </p:sp>
+      <p:sp>
+        <p:nvSpPr>
+          <p:cNvPr id="7" name="Titolo 1">
+            <a:extLst>
+              <a:ext uri="{FF2B5EF4-FFF2-40B4-BE49-F238E27FC236}">
+                <a16:creationId xmlns:a16="http://schemas.microsoft.com/office/drawing/2014/main" id="{FC6D212B-F062-2C61-2A86-D946A609F9D9}"/>
+              </a:ext>
+            </a:extLst>
+          </p:cNvPr>
+          <p:cNvSpPr txBox="1">
+            <a:spLocks/>
+          </p:cNvSpPr>
+          <p:nvPr/>
+        </p:nvSpPr>
+        <p:spPr>
+          <a:xfrm>
+            <a:off x="3524921" y="569936"/>
+            <a:ext cx="7767079" cy="878702"/>
+          </a:xfrm>
+          <a:prstGeom prst="rect">
+            <a:avLst/>
+          </a:prstGeom>
+        </p:spPr>
+        <p:txBody>
+          <a:bodyPr vert="horz" wrap="square" lIns="91440" tIns="45720" rIns="91440" bIns="45720" rtlCol="0" anchor="ctr">
+            <a:spAutoFit/>
+          </a:bodyPr>
+          <a:lstStyle>
+            <a:lvl1pPr algn="l" defTabSz="914400" rtl="0" eaLnBrk="1" latinLnBrk="0" hangingPunct="1">
+              <a:lnSpc>
+                <a:spcPct val="90000"/>
+              </a:lnSpc>
+              <a:spcBef>
+                <a:spcPct val="0"/>
+              </a:spcBef>
+              <a:buNone/>
+              <a:defRPr sz="4400" kern="1200">
+                <a:solidFill>
+                  <a:schemeClr val="tx1"/>
+                </a:solidFill>
+                <a:latin typeface="+mj-lt"/>
+                <a:ea typeface="+mj-ea"/>
+                <a:cs typeface="+mj-cs"/>
+              </a:defRPr>
+            </a:lvl1pPr>
+          </a:lstStyle>
+          <a:p>
+            <a:r>
+              <a:rPr lang="it-IT" sz="2800" dirty="0">
+                <a:latin typeface="Cmu serif" panose="02000603000000000000" pitchFamily="2" charset="0"/>
+                <a:ea typeface="Cmu serif" panose="02000603000000000000" pitchFamily="2" charset="0"/>
+                <a:cs typeface="Cmu serif" panose="02000603000000000000" pitchFamily="2" charset="0"/>
+              </a:rPr>
+              <a:t>4.2. Verifica del processo di dimensionamento del velivolo – criticità del secondo step</a:t>
+            </a:r>
+          </a:p>
+        </p:txBody>
+      </p:sp>
+      <p:pic>
+        <p:nvPicPr>
+          <p:cNvPr id="10" name="Immagine 9" descr="Immagine che contiene diagramma">
+            <a:extLst>
+              <a:ext uri="{FF2B5EF4-FFF2-40B4-BE49-F238E27FC236}">
+                <a16:creationId xmlns:a16="http://schemas.microsoft.com/office/drawing/2014/main" id="{66339F29-3CA2-27E5-1048-F0E5CFF8D4B4}"/>
+              </a:ext>
+            </a:extLst>
+          </p:cNvPr>
+          <p:cNvPicPr>
+            <a:picLocks noChangeAspect="1"/>
+          </p:cNvPicPr>
+          <p:nvPr/>
+        </p:nvPicPr>
+        <p:blipFill>
+          <a:blip r:embed="rId3">
+            <a:extLst>
+              <a:ext uri="{28A0092B-C50C-407E-A947-70E740481C1C}">
+                <a14:useLocalDpi xmlns:a14="http://schemas.microsoft.com/office/drawing/2010/main" val="0"/>
+              </a:ext>
+            </a:extLst>
+          </a:blip>
+          <a:stretch>
+            <a:fillRect/>
+          </a:stretch>
+        </p:blipFill>
+        <p:spPr>
+          <a:xfrm>
+            <a:off x="2976591" y="4642941"/>
+            <a:ext cx="6148811" cy="1645123"/>
+          </a:xfrm>
+          <a:prstGeom prst="rect">
+            <a:avLst/>
+          </a:prstGeom>
+        </p:spPr>
+      </p:pic>
+    </p:spTree>
+    <p:extLst>
+      <p:ext uri="{BB962C8B-B14F-4D97-AF65-F5344CB8AC3E}">
+        <p14:creationId xmlns:p14="http://schemas.microsoft.com/office/powerpoint/2010/main" val="3572440774"/>
+      </p:ext>
+    </p:extLst>
+  </p:cSld>
+  <p:clrMapOvr>
+    <a:masterClrMapping/>
+  </p:clrMapOvr>
+</p:sld>
+</file>
+
+<file path=ppt/slides/slide9.xml><?xml version="1.0" encoding="utf-8"?>
+<p:sld xmlns:a="http://schemas.openxmlformats.org/drawingml/2006/main" xmlns:r="http://schemas.openxmlformats.org/officeDocument/2006/relationships" xmlns:p="http://schemas.openxmlformats.org/presentationml/2006/main">
+  <p:cSld>
+    <p:spTree>
+      <p:nvGrpSpPr>
+        <p:cNvPr id="1" name=""/>
+        <p:cNvGrpSpPr/>
+        <p:nvPr/>
+      </p:nvGrpSpPr>
+      <p:grpSpPr>
+        <a:xfrm>
+          <a:off x="0" y="0"/>
+          <a:ext cx="0" cy="0"/>
+          <a:chOff x="0" y="0"/>
+          <a:chExt cx="0" cy="0"/>
+        </a:xfrm>
+      </p:grpSpPr>
+      <p:pic>
+        <p:nvPicPr>
+          <p:cNvPr id="4" name="Immagine 3" descr="Immagine che contiene testo, Carattere, Elementi grafici, logo">
+            <a:extLst>
+              <a:ext uri="{FF2B5EF4-FFF2-40B4-BE49-F238E27FC236}">
+                <a16:creationId xmlns:a16="http://schemas.microsoft.com/office/drawing/2014/main" id="{B6812EB3-284C-CD2B-D39B-7E068E84B778}"/>
+              </a:ext>
+            </a:extLst>
+          </p:cNvPr>
+          <p:cNvPicPr>
+            <a:picLocks noChangeAspect="1"/>
+          </p:cNvPicPr>
+          <p:nvPr/>
+        </p:nvPicPr>
+        <p:blipFill>
+          <a:blip r:embed="rId2">
+            <a:extLst>
+              <a:ext uri="{28A0092B-C50C-407E-A947-70E740481C1C}">
+                <a14:useLocalDpi xmlns:a14="http://schemas.microsoft.com/office/drawing/2010/main" val="0"/>
+              </a:ext>
+            </a:extLst>
+          </a:blip>
+          <a:stretch>
+            <a:fillRect/>
+          </a:stretch>
+        </p:blipFill>
+        <p:spPr>
+          <a:xfrm>
+            <a:off x="900000" y="540001"/>
+            <a:ext cx="2076591" cy="938572"/>
+          </a:xfrm>
+          <a:prstGeom prst="rect">
+            <a:avLst/>
+          </a:prstGeom>
+        </p:spPr>
+      </p:pic>
+      <p:sp>
+        <p:nvSpPr>
+          <p:cNvPr id="9" name="CasellaDiTesto 8">
+            <a:extLst>
+              <a:ext uri="{FF2B5EF4-FFF2-40B4-BE49-F238E27FC236}">
+                <a16:creationId xmlns:a16="http://schemas.microsoft.com/office/drawing/2014/main" id="{6BBA43B8-57EC-EC7D-B79C-094BABBFFDF4}"/>
+              </a:ext>
+            </a:extLst>
+          </p:cNvPr>
+          <p:cNvSpPr txBox="1"/>
+          <p:nvPr/>
+        </p:nvSpPr>
+        <p:spPr>
+          <a:xfrm>
+            <a:off x="900002" y="1923897"/>
+            <a:ext cx="4484751" cy="4093428"/>
+          </a:xfrm>
+          <a:prstGeom prst="rect">
+            <a:avLst/>
+          </a:prstGeom>
+          <a:noFill/>
+        </p:spPr>
+        <p:txBody>
+          <a:bodyPr wrap="square" rtlCol="0">
+            <a:spAutoFit/>
+          </a:bodyPr>
+          <a:lstStyle/>
+          <a:p>
+            <a:pPr algn="just"/>
+            <a:r>
+              <a:rPr lang="it-IT" sz="2000" dirty="0">
+                <a:latin typeface="Cmu serif" panose="02000603000000000000" pitchFamily="2" charset="0"/>
+                <a:ea typeface="Cmu serif" panose="02000603000000000000" pitchFamily="2" charset="0"/>
+                <a:cs typeface="Cmu serif" panose="02000603000000000000" pitchFamily="2" charset="0"/>
+              </a:rPr>
+              <a:t>A partire dai dati resi disponibili sui test condotti in galleria del vento [6], della stessa configurazione elica-motore a throttle massimo, è stato operato, tramite script MATLAB, un confronto tra dati empirici e previsti.</a:t>
+            </a:r>
+          </a:p>
+          <a:p>
+            <a:pPr algn="just"/>
+            <a:endParaRPr lang="it-IT" sz="2000" dirty="0">
+              <a:latin typeface="Cmu serif" panose="02000603000000000000" pitchFamily="2" charset="0"/>
+              <a:ea typeface="Cmu serif" panose="02000603000000000000" pitchFamily="2" charset="0"/>
+              <a:cs typeface="Cmu serif" panose="02000603000000000000" pitchFamily="2" charset="0"/>
+            </a:endParaRPr>
+          </a:p>
+          <a:p>
+            <a:pPr algn="just"/>
+            <a:r>
+              <a:rPr lang="it-IT" sz="2000" dirty="0">
+                <a:latin typeface="Cmu serif" panose="02000603000000000000" pitchFamily="2" charset="0"/>
+                <a:ea typeface="Cmu serif" panose="02000603000000000000" pitchFamily="2" charset="0"/>
+                <a:cs typeface="Cmu serif" panose="02000603000000000000" pitchFamily="2" charset="0"/>
+              </a:rPr>
+              <a:t>Si osserva che il modello utilizzato per la previsione commette un errore relativo che arriva al 30%. Questo evidenzia l’importanza di partire da dati empirici della potenza disponibile nei dimensionamenti futuri.</a:t>
+            </a:r>
+          </a:p>
+        </p:txBody>
+      </p:sp>
+      <p:sp>
+        <p:nvSpPr>
+          <p:cNvPr id="7" name="Titolo 1">
+            <a:extLst>
+              <a:ext uri="{FF2B5EF4-FFF2-40B4-BE49-F238E27FC236}">
+                <a16:creationId xmlns:a16="http://schemas.microsoft.com/office/drawing/2014/main" id="{FC6D212B-F062-2C61-2A86-D946A609F9D9}"/>
+              </a:ext>
+            </a:extLst>
+          </p:cNvPr>
+          <p:cNvSpPr txBox="1">
+            <a:spLocks/>
+          </p:cNvSpPr>
+          <p:nvPr/>
+        </p:nvSpPr>
+        <p:spPr>
+          <a:xfrm>
+            <a:off x="3524921" y="569936"/>
+            <a:ext cx="7767079" cy="878702"/>
+          </a:xfrm>
+          <a:prstGeom prst="rect">
+            <a:avLst/>
+          </a:prstGeom>
+        </p:spPr>
+        <p:txBody>
+          <a:bodyPr vert="horz" wrap="square" lIns="91440" tIns="45720" rIns="91440" bIns="45720" rtlCol="0" anchor="ctr">
+            <a:spAutoFit/>
+          </a:bodyPr>
+          <a:lstStyle>
+            <a:lvl1pPr algn="l" defTabSz="914400" rtl="0" eaLnBrk="1" latinLnBrk="0" hangingPunct="1">
+              <a:lnSpc>
+                <a:spcPct val="90000"/>
+              </a:lnSpc>
+              <a:spcBef>
+                <a:spcPct val="0"/>
+              </a:spcBef>
+              <a:buNone/>
+              <a:defRPr sz="4400" kern="1200">
+                <a:solidFill>
+                  <a:schemeClr val="tx1"/>
+                </a:solidFill>
+                <a:latin typeface="+mj-lt"/>
+                <a:ea typeface="+mj-ea"/>
+                <a:cs typeface="+mj-cs"/>
+              </a:defRPr>
+            </a:lvl1pPr>
+          </a:lstStyle>
+          <a:p>
+            <a:r>
+              <a:rPr lang="it-IT" sz="2800" dirty="0">
+                <a:latin typeface="Cmu serif" panose="02000603000000000000" pitchFamily="2" charset="0"/>
+                <a:ea typeface="Cmu serif" panose="02000603000000000000" pitchFamily="2" charset="0"/>
+                <a:cs typeface="Cmu serif" panose="02000603000000000000" pitchFamily="2" charset="0"/>
+              </a:rPr>
+              <a:t>4.2.1 Verifica dei risultati di potenza propulsiva disponibile</a:t>
+            </a:r>
+          </a:p>
+        </p:txBody>
+      </p:sp>
+      <p:pic>
+        <p:nvPicPr>
+          <p:cNvPr id="3" name="Immagine 2" descr="Immagine che contiene testo, diagramma, linea, Diagramma&#10;&#10;Descrizione generata automaticamente">
+            <a:extLst>
+              <a:ext uri="{FF2B5EF4-FFF2-40B4-BE49-F238E27FC236}">
+                <a16:creationId xmlns:a16="http://schemas.microsoft.com/office/drawing/2014/main" id="{C58805BF-C513-7F68-31E5-43E3A7545BAE}"/>
+              </a:ext>
+            </a:extLst>
+          </p:cNvPr>
+          <p:cNvPicPr>
+            <a:picLocks noChangeAspect="1"/>
+          </p:cNvPicPr>
+          <p:nvPr/>
+        </p:nvPicPr>
+        <p:blipFill>
+          <a:blip r:embed="rId3">
+            <a:extLst>
+              <a:ext uri="{28A0092B-C50C-407E-A947-70E740481C1C}">
+                <a14:useLocalDpi xmlns:a14="http://schemas.microsoft.com/office/drawing/2010/main" val="0"/>
+              </a:ext>
+            </a:extLst>
+          </a:blip>
+          <a:stretch>
+            <a:fillRect/>
+          </a:stretch>
+        </p:blipFill>
+        <p:spPr>
+          <a:xfrm>
+            <a:off x="5384752" y="1788527"/>
+            <a:ext cx="5907246" cy="4364167"/>
+          </a:xfrm>
+          <a:prstGeom prst="rect">
+            <a:avLst/>
+          </a:prstGeom>
+        </p:spPr>
+      </p:pic>
+    </p:spTree>
+    <p:extLst>
+      <p:ext uri="{BB962C8B-B14F-4D97-AF65-F5344CB8AC3E}">
+        <p14:creationId xmlns:p14="http://schemas.microsoft.com/office/powerpoint/2010/main" val="2845049172"/>
       </p:ext>
     </p:extLst>
   </p:cSld>

</xml_diff>

<commit_message>
Presentazione conclusa. Da revisionare.
</commit_message>
<xml_diff>
--- a/Presentazione/Presentazione relazione.pptx
+++ b/Presentazione/Presentazione relazione.pptx
@@ -15,7 +15,11 @@
     <p:sldId id="264" r:id="rId9"/>
     <p:sldId id="265" r:id="rId10"/>
     <p:sldId id="266" r:id="rId11"/>
-    <p:sldId id="267" r:id="rId12"/>
+    <p:sldId id="268" r:id="rId12"/>
+    <p:sldId id="267" r:id="rId13"/>
+    <p:sldId id="269" r:id="rId14"/>
+    <p:sldId id="270" r:id="rId15"/>
+    <p:sldId id="271" r:id="rId16"/>
   </p:sldIdLst>
   <p:sldSz cx="12192000" cy="6858000"/>
   <p:notesSz cx="6858000" cy="9144000"/>
@@ -3868,7 +3872,7 @@
                 <a:ea typeface="Cmu serif" panose="02000603000000000000" pitchFamily="2" charset="0"/>
                 <a:cs typeface="Cmu serif" panose="02000603000000000000" pitchFamily="2" charset="0"/>
               </a:rPr>
-              <a:t>Per una maggiore affidabilità dei dati di accelerazione, si sono utilizzati due misure di origine diversa, in particolare:</a:t>
+              <a:t>Per una maggiore affidabilità dei dati di accelerazione, si sono utilizzate due misure di origine diversa, in particolare:</a:t>
             </a:r>
           </a:p>
           <a:p>
@@ -3990,7 +3994,7 @@
         <p:spPr>
           <a:xfrm>
             <a:off x="900002" y="1923897"/>
-            <a:ext cx="10391998" cy="1631216"/>
+            <a:ext cx="10391998" cy="1323439"/>
           </a:xfrm>
           <a:prstGeom prst="rect">
             <a:avLst/>
@@ -4010,26 +4014,7 @@
                 <a:ea typeface="Cmu serif" panose="02000603000000000000" pitchFamily="2" charset="0"/>
                 <a:cs typeface="Cmu serif" panose="02000603000000000000" pitchFamily="2" charset="0"/>
               </a:rPr>
-              <a:t>Il calcolo dei tre set di dati è stato eseguito da un secondo script Python e ha prodotto per ogni volo diagrammi tutti simili tra loro, con un andamento analogo a quello riportato.</a:t>
-            </a:r>
-          </a:p>
-          <a:p>
-            <a:pPr algn="just"/>
-            <a:endParaRPr lang="it-IT" sz="2000" dirty="0">
-              <a:latin typeface="Cmu serif" panose="02000603000000000000" pitchFamily="2" charset="0"/>
-              <a:ea typeface="Cmu serif" panose="02000603000000000000" pitchFamily="2" charset="0"/>
-              <a:cs typeface="Cmu serif" panose="02000603000000000000" pitchFamily="2" charset="0"/>
-            </a:endParaRPr>
-          </a:p>
-          <a:p>
-            <a:pPr algn="just"/>
-            <a:r>
-              <a:rPr lang="it-IT" sz="2000" dirty="0">
-                <a:latin typeface="Cmu serif" panose="02000603000000000000" pitchFamily="2" charset="0"/>
-                <a:ea typeface="Cmu serif" panose="02000603000000000000" pitchFamily="2" charset="0"/>
-                <a:cs typeface="Cmu serif" panose="02000603000000000000" pitchFamily="2" charset="0"/>
-              </a:rPr>
-              <a:t>Si osserva come la forza risultante abbia un valore vicino al 50% della forza propulsiva. Di conseguenza le forze resistenti non possono essere considerate trascurabili.</a:t>
+              <a:t>La validità delle considerazioni sul decollo (come il bilancio delle forze) è ristretta all’intervallo di accelerazione orizzontale del velivolo a contatto con la pista. Per questa ragione, lo script Python sviluppato per il calcolo e l’analisi dei tre set di dati, in primo luogo consente di individuare graficamente le sole misure riferite a tale intervallo.</a:t>
             </a:r>
           </a:p>
         </p:txBody>
@@ -4087,17 +4072,17 @@
                 <a:ea typeface="Cmu serif" panose="02000603000000000000" pitchFamily="2" charset="0"/>
                 <a:cs typeface="Cmu serif" panose="02000603000000000000" pitchFamily="2" charset="0"/>
               </a:rPr>
-              <a:t>4.2.2. Verifica delle ipotesi di forze resistenti nulle</a:t>
+              <a:t>4.2.2. Verifica delle ipotesi di forze resistenti nulle – individuazione dell’intervallo di misure</a:t>
             </a:r>
           </a:p>
         </p:txBody>
       </p:sp>
       <p:pic>
         <p:nvPicPr>
-          <p:cNvPr id="10" name="Immagine 9" descr="Immagine che contiene testo, diagramma, linea, Diagramma&#10;&#10;Descrizione generata automaticamente">
-            <a:extLst>
-              <a:ext uri="{FF2B5EF4-FFF2-40B4-BE49-F238E27FC236}">
-                <a16:creationId xmlns:a16="http://schemas.microsoft.com/office/drawing/2014/main" id="{55B6CB4E-5F7A-668F-E757-295DC1BCCFA3}"/>
+          <p:cNvPr id="3" name="Immagine 2" descr="Immagine che contiene testo, diagramma, Diagramma, linea">
+            <a:extLst>
+              <a:ext uri="{FF2B5EF4-FFF2-40B4-BE49-F238E27FC236}">
+                <a16:creationId xmlns:a16="http://schemas.microsoft.com/office/drawing/2014/main" id="{FDE24D0D-5B4F-2802-10A4-425F4CBB4CC0}"/>
               </a:ext>
             </a:extLst>
           </p:cNvPr>
@@ -4120,8 +4105,8 @@
         </p:blipFill>
         <p:spPr>
           <a:xfrm>
-            <a:off x="7741287" y="3601407"/>
-            <a:ext cx="3622121" cy="2716591"/>
+            <a:off x="2123749" y="3572274"/>
+            <a:ext cx="3972251" cy="2715789"/>
           </a:xfrm>
           <a:prstGeom prst="rect">
             <a:avLst/>
@@ -4130,10 +4115,10 @@
       </p:pic>
       <p:pic>
         <p:nvPicPr>
-          <p:cNvPr id="12" name="Immagine 11" descr="Immagine che contiene testo, diagramma, linea, Diagramma&#10;&#10;Descrizione generata automaticamente">
-            <a:extLst>
-              <a:ext uri="{FF2B5EF4-FFF2-40B4-BE49-F238E27FC236}">
-                <a16:creationId xmlns:a16="http://schemas.microsoft.com/office/drawing/2014/main" id="{105ABA4B-AE3E-C0FA-4DA6-6A97B3393E29}"/>
+          <p:cNvPr id="10" name="Immagine 9" descr="Immagine che contiene testo, Diagramma, schermata, linea&#10;&#10;Descrizione generata automaticamente">
+            <a:extLst>
+              <a:ext uri="{FF2B5EF4-FFF2-40B4-BE49-F238E27FC236}">
+                <a16:creationId xmlns:a16="http://schemas.microsoft.com/office/drawing/2014/main" id="{073DE8BC-A8A9-0C39-3581-6C810401F615}"/>
               </a:ext>
             </a:extLst>
           </p:cNvPr>
@@ -4156,6 +4141,242 @@
         </p:blipFill>
         <p:spPr>
           <a:xfrm>
+            <a:off x="6096000" y="3572275"/>
+            <a:ext cx="3972251" cy="2715789"/>
+          </a:xfrm>
+          <a:prstGeom prst="rect">
+            <a:avLst/>
+          </a:prstGeom>
+        </p:spPr>
+      </p:pic>
+    </p:spTree>
+    <p:extLst>
+      <p:ext uri="{BB962C8B-B14F-4D97-AF65-F5344CB8AC3E}">
+        <p14:creationId xmlns:p14="http://schemas.microsoft.com/office/powerpoint/2010/main" val="4103543013"/>
+      </p:ext>
+    </p:extLst>
+  </p:cSld>
+  <p:clrMapOvr>
+    <a:masterClrMapping/>
+  </p:clrMapOvr>
+</p:sld>
+</file>
+
+<file path=ppt/slides/slide12.xml><?xml version="1.0" encoding="utf-8"?>
+<p:sld xmlns:a="http://schemas.openxmlformats.org/drawingml/2006/main" xmlns:r="http://schemas.openxmlformats.org/officeDocument/2006/relationships" xmlns:p="http://schemas.openxmlformats.org/presentationml/2006/main">
+  <p:cSld>
+    <p:spTree>
+      <p:nvGrpSpPr>
+        <p:cNvPr id="1" name=""/>
+        <p:cNvGrpSpPr/>
+        <p:nvPr/>
+      </p:nvGrpSpPr>
+      <p:grpSpPr>
+        <a:xfrm>
+          <a:off x="0" y="0"/>
+          <a:ext cx="0" cy="0"/>
+          <a:chOff x="0" y="0"/>
+          <a:chExt cx="0" cy="0"/>
+        </a:xfrm>
+      </p:grpSpPr>
+      <p:pic>
+        <p:nvPicPr>
+          <p:cNvPr id="4" name="Immagine 3" descr="Immagine che contiene testo, Carattere, Elementi grafici, logo">
+            <a:extLst>
+              <a:ext uri="{FF2B5EF4-FFF2-40B4-BE49-F238E27FC236}">
+                <a16:creationId xmlns:a16="http://schemas.microsoft.com/office/drawing/2014/main" id="{B6812EB3-284C-CD2B-D39B-7E068E84B778}"/>
+              </a:ext>
+            </a:extLst>
+          </p:cNvPr>
+          <p:cNvPicPr>
+            <a:picLocks noChangeAspect="1"/>
+          </p:cNvPicPr>
+          <p:nvPr/>
+        </p:nvPicPr>
+        <p:blipFill>
+          <a:blip r:embed="rId2">
+            <a:extLst>
+              <a:ext uri="{28A0092B-C50C-407E-A947-70E740481C1C}">
+                <a14:useLocalDpi xmlns:a14="http://schemas.microsoft.com/office/drawing/2010/main" val="0"/>
+              </a:ext>
+            </a:extLst>
+          </a:blip>
+          <a:stretch>
+            <a:fillRect/>
+          </a:stretch>
+        </p:blipFill>
+        <p:spPr>
+          <a:xfrm>
+            <a:off x="900000" y="540001"/>
+            <a:ext cx="2076591" cy="938572"/>
+          </a:xfrm>
+          <a:prstGeom prst="rect">
+            <a:avLst/>
+          </a:prstGeom>
+        </p:spPr>
+      </p:pic>
+      <p:sp>
+        <p:nvSpPr>
+          <p:cNvPr id="9" name="CasellaDiTesto 8">
+            <a:extLst>
+              <a:ext uri="{FF2B5EF4-FFF2-40B4-BE49-F238E27FC236}">
+                <a16:creationId xmlns:a16="http://schemas.microsoft.com/office/drawing/2014/main" id="{6BBA43B8-57EC-EC7D-B79C-094BABBFFDF4}"/>
+              </a:ext>
+            </a:extLst>
+          </p:cNvPr>
+          <p:cNvSpPr txBox="1"/>
+          <p:nvPr/>
+        </p:nvSpPr>
+        <p:spPr>
+          <a:xfrm>
+            <a:off x="900002" y="1923897"/>
+            <a:ext cx="10391998" cy="1631216"/>
+          </a:xfrm>
+          <a:prstGeom prst="rect">
+            <a:avLst/>
+          </a:prstGeom>
+          <a:noFill/>
+        </p:spPr>
+        <p:txBody>
+          <a:bodyPr wrap="square" rtlCol="0">
+            <a:spAutoFit/>
+          </a:bodyPr>
+          <a:lstStyle/>
+          <a:p>
+            <a:pPr algn="just"/>
+            <a:r>
+              <a:rPr lang="it-IT" sz="2000" dirty="0">
+                <a:latin typeface="Cmu serif" panose="02000603000000000000" pitchFamily="2" charset="0"/>
+                <a:ea typeface="Cmu serif" panose="02000603000000000000" pitchFamily="2" charset="0"/>
+                <a:cs typeface="Cmu serif" panose="02000603000000000000" pitchFamily="2" charset="0"/>
+              </a:rPr>
+              <a:t>Dai diagrammi prodotti si osserva come: le due curve della forza risultante si dimostrano coerenti tra loro, pur essendo riferite a grandezze fisiche diverse; il loro andamento è mediamente decrescente e traslato verso il basso rispetto alla forza propulsiva; la forza risultante ha un valore vicino al 50% della forza propulsiva, di conseguenza le forze resistenti non possono essere considerate trascurabili.</a:t>
+            </a:r>
+          </a:p>
+        </p:txBody>
+      </p:sp>
+      <p:sp>
+        <p:nvSpPr>
+          <p:cNvPr id="7" name="Titolo 1">
+            <a:extLst>
+              <a:ext uri="{FF2B5EF4-FFF2-40B4-BE49-F238E27FC236}">
+                <a16:creationId xmlns:a16="http://schemas.microsoft.com/office/drawing/2014/main" id="{FC6D212B-F062-2C61-2A86-D946A609F9D9}"/>
+              </a:ext>
+            </a:extLst>
+          </p:cNvPr>
+          <p:cNvSpPr txBox="1">
+            <a:spLocks/>
+          </p:cNvSpPr>
+          <p:nvPr/>
+        </p:nvSpPr>
+        <p:spPr>
+          <a:xfrm>
+            <a:off x="3524921" y="569936"/>
+            <a:ext cx="7767079" cy="878702"/>
+          </a:xfrm>
+          <a:prstGeom prst="rect">
+            <a:avLst/>
+          </a:prstGeom>
+        </p:spPr>
+        <p:txBody>
+          <a:bodyPr vert="horz" wrap="square" lIns="91440" tIns="45720" rIns="91440" bIns="45720" rtlCol="0" anchor="ctr">
+            <a:spAutoFit/>
+          </a:bodyPr>
+          <a:lstStyle>
+            <a:lvl1pPr algn="l" defTabSz="914400" rtl="0" eaLnBrk="1" latinLnBrk="0" hangingPunct="1">
+              <a:lnSpc>
+                <a:spcPct val="90000"/>
+              </a:lnSpc>
+              <a:spcBef>
+                <a:spcPct val="0"/>
+              </a:spcBef>
+              <a:buNone/>
+              <a:defRPr sz="4400" kern="1200">
+                <a:solidFill>
+                  <a:schemeClr val="tx1"/>
+                </a:solidFill>
+                <a:latin typeface="+mj-lt"/>
+                <a:ea typeface="+mj-ea"/>
+                <a:cs typeface="+mj-cs"/>
+              </a:defRPr>
+            </a:lvl1pPr>
+          </a:lstStyle>
+          <a:p>
+            <a:r>
+              <a:rPr lang="it-IT" sz="2800" dirty="0">
+                <a:latin typeface="Cmu serif" panose="02000603000000000000" pitchFamily="2" charset="0"/>
+                <a:ea typeface="Cmu serif" panose="02000603000000000000" pitchFamily="2" charset="0"/>
+                <a:cs typeface="Cmu serif" panose="02000603000000000000" pitchFamily="2" charset="0"/>
+              </a:rPr>
+              <a:t>4.2.2. Verifica delle ipotesi di forze resistenti nulle</a:t>
+            </a:r>
+          </a:p>
+        </p:txBody>
+      </p:sp>
+      <p:pic>
+        <p:nvPicPr>
+          <p:cNvPr id="10" name="Immagine 9" descr="Immagine che contiene testo, diagramma, linea, Diagramma&#10;&#10;Descrizione generata automaticamente">
+            <a:extLst>
+              <a:ext uri="{FF2B5EF4-FFF2-40B4-BE49-F238E27FC236}">
+                <a16:creationId xmlns:a16="http://schemas.microsoft.com/office/drawing/2014/main" id="{55B6CB4E-5F7A-668F-E757-295DC1BCCFA3}"/>
+              </a:ext>
+            </a:extLst>
+          </p:cNvPr>
+          <p:cNvPicPr>
+            <a:picLocks noChangeAspect="1"/>
+          </p:cNvPicPr>
+          <p:nvPr/>
+        </p:nvPicPr>
+        <p:blipFill>
+          <a:blip r:embed="rId3">
+            <a:extLst>
+              <a:ext uri="{28A0092B-C50C-407E-A947-70E740481C1C}">
+                <a14:useLocalDpi xmlns:a14="http://schemas.microsoft.com/office/drawing/2010/main" val="0"/>
+              </a:ext>
+            </a:extLst>
+          </a:blip>
+          <a:stretch>
+            <a:fillRect/>
+          </a:stretch>
+        </p:blipFill>
+        <p:spPr>
+          <a:xfrm>
+            <a:off x="7741287" y="3601407"/>
+            <a:ext cx="3622121" cy="2716591"/>
+          </a:xfrm>
+          <a:prstGeom prst="rect">
+            <a:avLst/>
+          </a:prstGeom>
+        </p:spPr>
+      </p:pic>
+      <p:pic>
+        <p:nvPicPr>
+          <p:cNvPr id="12" name="Immagine 11" descr="Immagine che contiene testo, diagramma, linea, Diagramma&#10;&#10;Descrizione generata automaticamente">
+            <a:extLst>
+              <a:ext uri="{FF2B5EF4-FFF2-40B4-BE49-F238E27FC236}">
+                <a16:creationId xmlns:a16="http://schemas.microsoft.com/office/drawing/2014/main" id="{105ABA4B-AE3E-C0FA-4DA6-6A97B3393E29}"/>
+              </a:ext>
+            </a:extLst>
+          </p:cNvPr>
+          <p:cNvPicPr>
+            <a:picLocks noChangeAspect="1"/>
+          </p:cNvPicPr>
+          <p:nvPr/>
+        </p:nvPicPr>
+        <p:blipFill>
+          <a:blip r:embed="rId4">
+            <a:extLst>
+              <a:ext uri="{28A0092B-C50C-407E-A947-70E740481C1C}">
+                <a14:useLocalDpi xmlns:a14="http://schemas.microsoft.com/office/drawing/2010/main" val="0"/>
+              </a:ext>
+            </a:extLst>
+          </a:blip>
+          <a:stretch>
+            <a:fillRect/>
+          </a:stretch>
+        </p:blipFill>
+        <p:spPr>
+          <a:xfrm>
             <a:off x="4284939" y="3601408"/>
             <a:ext cx="3622121" cy="2716591"/>
           </a:xfrm>
@@ -4204,6 +4425,738 @@
     <p:extLst>
       <p:ext uri="{BB962C8B-B14F-4D97-AF65-F5344CB8AC3E}">
         <p14:creationId xmlns:p14="http://schemas.microsoft.com/office/powerpoint/2010/main" val="3354236346"/>
+      </p:ext>
+    </p:extLst>
+  </p:cSld>
+  <p:clrMapOvr>
+    <a:masterClrMapping/>
+  </p:clrMapOvr>
+</p:sld>
+</file>
+
+<file path=ppt/slides/slide13.xml><?xml version="1.0" encoding="utf-8"?>
+<p:sld xmlns:a="http://schemas.openxmlformats.org/drawingml/2006/main" xmlns:r="http://schemas.openxmlformats.org/officeDocument/2006/relationships" xmlns:p="http://schemas.openxmlformats.org/presentationml/2006/main">
+  <p:cSld>
+    <p:spTree>
+      <p:nvGrpSpPr>
+        <p:cNvPr id="1" name=""/>
+        <p:cNvGrpSpPr/>
+        <p:nvPr/>
+      </p:nvGrpSpPr>
+      <p:grpSpPr>
+        <a:xfrm>
+          <a:off x="0" y="0"/>
+          <a:ext cx="0" cy="0"/>
+          <a:chOff x="0" y="0"/>
+          <a:chExt cx="0" cy="0"/>
+        </a:xfrm>
+      </p:grpSpPr>
+      <p:pic>
+        <p:nvPicPr>
+          <p:cNvPr id="4" name="Immagine 3" descr="Immagine che contiene testo, Carattere, Elementi grafici, logo">
+            <a:extLst>
+              <a:ext uri="{FF2B5EF4-FFF2-40B4-BE49-F238E27FC236}">
+                <a16:creationId xmlns:a16="http://schemas.microsoft.com/office/drawing/2014/main" id="{B6812EB3-284C-CD2B-D39B-7E068E84B778}"/>
+              </a:ext>
+            </a:extLst>
+          </p:cNvPr>
+          <p:cNvPicPr>
+            <a:picLocks noChangeAspect="1"/>
+          </p:cNvPicPr>
+          <p:nvPr/>
+        </p:nvPicPr>
+        <p:blipFill>
+          <a:blip r:embed="rId2">
+            <a:extLst>
+              <a:ext uri="{28A0092B-C50C-407E-A947-70E740481C1C}">
+                <a14:useLocalDpi xmlns:a14="http://schemas.microsoft.com/office/drawing/2010/main" val="0"/>
+              </a:ext>
+            </a:extLst>
+          </a:blip>
+          <a:stretch>
+            <a:fillRect/>
+          </a:stretch>
+        </p:blipFill>
+        <p:spPr>
+          <a:xfrm>
+            <a:off x="900000" y="540001"/>
+            <a:ext cx="2076591" cy="938572"/>
+          </a:xfrm>
+          <a:prstGeom prst="rect">
+            <a:avLst/>
+          </a:prstGeom>
+        </p:spPr>
+      </p:pic>
+      <p:sp>
+        <p:nvSpPr>
+          <p:cNvPr id="9" name="CasellaDiTesto 8">
+            <a:extLst>
+              <a:ext uri="{FF2B5EF4-FFF2-40B4-BE49-F238E27FC236}">
+                <a16:creationId xmlns:a16="http://schemas.microsoft.com/office/drawing/2014/main" id="{6BBA43B8-57EC-EC7D-B79C-094BABBFFDF4}"/>
+              </a:ext>
+            </a:extLst>
+          </p:cNvPr>
+          <p:cNvSpPr txBox="1"/>
+          <p:nvPr/>
+        </p:nvSpPr>
+        <p:spPr>
+          <a:xfrm>
+            <a:off x="900001" y="1923897"/>
+            <a:ext cx="5434538" cy="3477875"/>
+          </a:xfrm>
+          <a:prstGeom prst="rect">
+            <a:avLst/>
+          </a:prstGeom>
+          <a:noFill/>
+        </p:spPr>
+        <p:txBody>
+          <a:bodyPr wrap="square" rtlCol="0">
+            <a:spAutoFit/>
+          </a:bodyPr>
+          <a:lstStyle/>
+          <a:p>
+            <a:pPr algn="just"/>
+            <a:r>
+              <a:rPr lang="it-IT" sz="2000" dirty="0">
+                <a:latin typeface="Cmu serif" panose="02000603000000000000" pitchFamily="2" charset="0"/>
+                <a:ea typeface="Cmu serif" panose="02000603000000000000" pitchFamily="2" charset="0"/>
+                <a:cs typeface="Cmu serif" panose="02000603000000000000" pitchFamily="2" charset="0"/>
+              </a:rPr>
+              <a:t>La velocità finora considerata è sempre stata rispetto al suolo. Per una valutazione più completa della velocità del flusso e quindi delle prestazioni, è stato necessario implementare un tubo di Pitot.</a:t>
+            </a:r>
+          </a:p>
+          <a:p>
+            <a:pPr algn="just"/>
+            <a:endParaRPr lang="it-IT" sz="2000" dirty="0">
+              <a:latin typeface="Cmu serif" panose="02000603000000000000" pitchFamily="2" charset="0"/>
+              <a:ea typeface="Cmu serif" panose="02000603000000000000" pitchFamily="2" charset="0"/>
+              <a:cs typeface="Cmu serif" panose="02000603000000000000" pitchFamily="2" charset="0"/>
+            </a:endParaRPr>
+          </a:p>
+          <a:p>
+            <a:pPr algn="just"/>
+            <a:r>
+              <a:rPr lang="it-IT" sz="2000" dirty="0">
+                <a:latin typeface="Cmu serif" panose="02000603000000000000" pitchFamily="2" charset="0"/>
+                <a:ea typeface="Cmu serif" panose="02000603000000000000" pitchFamily="2" charset="0"/>
+                <a:cs typeface="Cmu serif" panose="02000603000000000000" pitchFamily="2" charset="0"/>
+              </a:rPr>
+              <a:t>I risultati empirici, applicato un filtro digitale per attenuare il rumore, hanno delineato l’andamento che è rappresentato nel diagramma, insieme alle velocità rispetto al suolo.</a:t>
+            </a:r>
+          </a:p>
+        </p:txBody>
+      </p:sp>
+      <p:sp>
+        <p:nvSpPr>
+          <p:cNvPr id="7" name="Titolo 1">
+            <a:extLst>
+              <a:ext uri="{FF2B5EF4-FFF2-40B4-BE49-F238E27FC236}">
+                <a16:creationId xmlns:a16="http://schemas.microsoft.com/office/drawing/2014/main" id="{FC6D212B-F062-2C61-2A86-D946A609F9D9}"/>
+              </a:ext>
+            </a:extLst>
+          </p:cNvPr>
+          <p:cNvSpPr txBox="1">
+            <a:spLocks/>
+          </p:cNvSpPr>
+          <p:nvPr/>
+        </p:nvSpPr>
+        <p:spPr>
+          <a:xfrm>
+            <a:off x="3524921" y="763835"/>
+            <a:ext cx="7767079" cy="490904"/>
+          </a:xfrm>
+          <a:prstGeom prst="rect">
+            <a:avLst/>
+          </a:prstGeom>
+        </p:spPr>
+        <p:txBody>
+          <a:bodyPr vert="horz" wrap="square" lIns="91440" tIns="45720" rIns="91440" bIns="45720" rtlCol="0" anchor="ctr">
+            <a:spAutoFit/>
+          </a:bodyPr>
+          <a:lstStyle>
+            <a:lvl1pPr algn="l" defTabSz="914400" rtl="0" eaLnBrk="1" latinLnBrk="0" hangingPunct="1">
+              <a:lnSpc>
+                <a:spcPct val="90000"/>
+              </a:lnSpc>
+              <a:spcBef>
+                <a:spcPct val="0"/>
+              </a:spcBef>
+              <a:buNone/>
+              <a:defRPr sz="4400" kern="1200">
+                <a:solidFill>
+                  <a:schemeClr val="tx1"/>
+                </a:solidFill>
+                <a:latin typeface="+mj-lt"/>
+                <a:ea typeface="+mj-ea"/>
+                <a:cs typeface="+mj-cs"/>
+              </a:defRPr>
+            </a:lvl1pPr>
+          </a:lstStyle>
+          <a:p>
+            <a:r>
+              <a:rPr lang="it-IT" sz="2800" dirty="0">
+                <a:latin typeface="Cmu serif" panose="02000603000000000000" pitchFamily="2" charset="0"/>
+                <a:ea typeface="Cmu serif" panose="02000603000000000000" pitchFamily="2" charset="0"/>
+                <a:cs typeface="Cmu serif" panose="02000603000000000000" pitchFamily="2" charset="0"/>
+              </a:rPr>
+              <a:t>5. Misura della velocità del flusso indisturbato</a:t>
+            </a:r>
+          </a:p>
+        </p:txBody>
+      </p:sp>
+      <p:pic>
+        <p:nvPicPr>
+          <p:cNvPr id="11" name="Immagine 10" descr="Immagine che contiene testo, schermata, Carattere, Diagramma">
+            <a:extLst>
+              <a:ext uri="{FF2B5EF4-FFF2-40B4-BE49-F238E27FC236}">
+                <a16:creationId xmlns:a16="http://schemas.microsoft.com/office/drawing/2014/main" id="{48E5462F-E5EF-6B0A-F731-3AAFC3E39C6D}"/>
+              </a:ext>
+            </a:extLst>
+          </p:cNvPr>
+          <p:cNvPicPr>
+            <a:picLocks noChangeAspect="1"/>
+          </p:cNvPicPr>
+          <p:nvPr/>
+        </p:nvPicPr>
+        <p:blipFill>
+          <a:blip r:embed="rId3">
+            <a:extLst>
+              <a:ext uri="{28A0092B-C50C-407E-A947-70E740481C1C}">
+                <a14:useLocalDpi xmlns:a14="http://schemas.microsoft.com/office/drawing/2010/main" val="0"/>
+              </a:ext>
+            </a:extLst>
+          </a:blip>
+          <a:stretch>
+            <a:fillRect/>
+          </a:stretch>
+        </p:blipFill>
+        <p:spPr>
+          <a:xfrm>
+            <a:off x="6795798" y="1923897"/>
+            <a:ext cx="4496201" cy="3349952"/>
+          </a:xfrm>
+          <a:prstGeom prst="rect">
+            <a:avLst/>
+          </a:prstGeom>
+        </p:spPr>
+      </p:pic>
+      <p:sp>
+        <p:nvSpPr>
+          <p:cNvPr id="15" name="CasellaDiTesto 14">
+            <a:extLst>
+              <a:ext uri="{FF2B5EF4-FFF2-40B4-BE49-F238E27FC236}">
+                <a16:creationId xmlns:a16="http://schemas.microsoft.com/office/drawing/2014/main" id="{BE290C0D-FDA2-7BC4-E744-532028C0257E}"/>
+              </a:ext>
+            </a:extLst>
+          </p:cNvPr>
+          <p:cNvSpPr txBox="1"/>
+          <p:nvPr/>
+        </p:nvSpPr>
+        <p:spPr>
+          <a:xfrm>
+            <a:off x="900001" y="5542897"/>
+            <a:ext cx="10391998" cy="707886"/>
+          </a:xfrm>
+          <a:prstGeom prst="rect">
+            <a:avLst/>
+          </a:prstGeom>
+          <a:noFill/>
+        </p:spPr>
+        <p:txBody>
+          <a:bodyPr wrap="square" rtlCol="0">
+            <a:spAutoFit/>
+          </a:bodyPr>
+          <a:lstStyle/>
+          <a:p>
+            <a:pPr algn="just"/>
+            <a:r>
+              <a:rPr lang="it-IT" sz="2000" dirty="0">
+                <a:latin typeface="Cmu serif" panose="02000603000000000000" pitchFamily="2" charset="0"/>
+                <a:ea typeface="Cmu serif" panose="02000603000000000000" pitchFamily="2" charset="0"/>
+                <a:cs typeface="Cmu serif" panose="02000603000000000000" pitchFamily="2" charset="0"/>
+              </a:rPr>
+              <a:t>Si osserva che i due set di dati, differiscono per un offset pressocché costante, attribuibile a molteplici fattori come errori sistematici di misura del sensore, errori di postazione, </a:t>
+            </a:r>
+            <a:r>
+              <a:rPr lang="it-IT" sz="2000" i="1" dirty="0">
+                <a:latin typeface="Cmu serif" panose="02000603000000000000" pitchFamily="2" charset="0"/>
+                <a:ea typeface="Cmu serif" panose="02000603000000000000" pitchFamily="2" charset="0"/>
+                <a:cs typeface="Cmu serif" panose="02000603000000000000" pitchFamily="2" charset="0"/>
+              </a:rPr>
+              <a:t>ecc</a:t>
+            </a:r>
+            <a:r>
+              <a:rPr lang="it-IT" sz="2000" dirty="0">
+                <a:latin typeface="Cmu serif" panose="02000603000000000000" pitchFamily="2" charset="0"/>
+                <a:ea typeface="Cmu serif" panose="02000603000000000000" pitchFamily="2" charset="0"/>
+                <a:cs typeface="Cmu serif" panose="02000603000000000000" pitchFamily="2" charset="0"/>
+              </a:rPr>
+              <a:t>.</a:t>
+            </a:r>
+          </a:p>
+        </p:txBody>
+      </p:sp>
+    </p:spTree>
+    <p:extLst>
+      <p:ext uri="{BB962C8B-B14F-4D97-AF65-F5344CB8AC3E}">
+        <p14:creationId xmlns:p14="http://schemas.microsoft.com/office/powerpoint/2010/main" val="3420320617"/>
+      </p:ext>
+    </p:extLst>
+  </p:cSld>
+  <p:clrMapOvr>
+    <a:masterClrMapping/>
+  </p:clrMapOvr>
+</p:sld>
+</file>
+
+<file path=ppt/slides/slide14.xml><?xml version="1.0" encoding="utf-8"?>
+<p:sld xmlns:a="http://schemas.openxmlformats.org/drawingml/2006/main" xmlns:r="http://schemas.openxmlformats.org/officeDocument/2006/relationships" xmlns:p="http://schemas.openxmlformats.org/presentationml/2006/main">
+  <p:cSld>
+    <p:spTree>
+      <p:nvGrpSpPr>
+        <p:cNvPr id="1" name=""/>
+        <p:cNvGrpSpPr/>
+        <p:nvPr/>
+      </p:nvGrpSpPr>
+      <p:grpSpPr>
+        <a:xfrm>
+          <a:off x="0" y="0"/>
+          <a:ext cx="0" cy="0"/>
+          <a:chOff x="0" y="0"/>
+          <a:chExt cx="0" cy="0"/>
+        </a:xfrm>
+      </p:grpSpPr>
+      <p:pic>
+        <p:nvPicPr>
+          <p:cNvPr id="4" name="Immagine 3" descr="Immagine che contiene testo, Carattere, Elementi grafici, logo">
+            <a:extLst>
+              <a:ext uri="{FF2B5EF4-FFF2-40B4-BE49-F238E27FC236}">
+                <a16:creationId xmlns:a16="http://schemas.microsoft.com/office/drawing/2014/main" id="{B6812EB3-284C-CD2B-D39B-7E068E84B778}"/>
+              </a:ext>
+            </a:extLst>
+          </p:cNvPr>
+          <p:cNvPicPr>
+            <a:picLocks noChangeAspect="1"/>
+          </p:cNvPicPr>
+          <p:nvPr/>
+        </p:nvPicPr>
+        <p:blipFill>
+          <a:blip r:embed="rId2">
+            <a:extLst>
+              <a:ext uri="{28A0092B-C50C-407E-A947-70E740481C1C}">
+                <a14:useLocalDpi xmlns:a14="http://schemas.microsoft.com/office/drawing/2010/main" val="0"/>
+              </a:ext>
+            </a:extLst>
+          </a:blip>
+          <a:stretch>
+            <a:fillRect/>
+          </a:stretch>
+        </p:blipFill>
+        <p:spPr>
+          <a:xfrm>
+            <a:off x="900000" y="540001"/>
+            <a:ext cx="2076591" cy="938572"/>
+          </a:xfrm>
+          <a:prstGeom prst="rect">
+            <a:avLst/>
+          </a:prstGeom>
+        </p:spPr>
+      </p:pic>
+      <p:sp>
+        <p:nvSpPr>
+          <p:cNvPr id="9" name="CasellaDiTesto 8">
+            <a:extLst>
+              <a:ext uri="{FF2B5EF4-FFF2-40B4-BE49-F238E27FC236}">
+                <a16:creationId xmlns:a16="http://schemas.microsoft.com/office/drawing/2014/main" id="{6BBA43B8-57EC-EC7D-B79C-094BABBFFDF4}"/>
+              </a:ext>
+            </a:extLst>
+          </p:cNvPr>
+          <p:cNvSpPr txBox="1"/>
+          <p:nvPr/>
+        </p:nvSpPr>
+        <p:spPr>
+          <a:xfrm>
+            <a:off x="900000" y="1923897"/>
+            <a:ext cx="5792347" cy="4401205"/>
+          </a:xfrm>
+          <a:prstGeom prst="rect">
+            <a:avLst/>
+          </a:prstGeom>
+          <a:noFill/>
+        </p:spPr>
+        <p:txBody>
+          <a:bodyPr wrap="square" rtlCol="0">
+            <a:spAutoFit/>
+          </a:bodyPr>
+          <a:lstStyle/>
+          <a:p>
+            <a:pPr algn="just"/>
+            <a:r>
+              <a:rPr lang="it-IT" sz="2000" dirty="0">
+                <a:latin typeface="Cmu serif" panose="02000603000000000000" pitchFamily="2" charset="0"/>
+                <a:ea typeface="Cmu serif" panose="02000603000000000000" pitchFamily="2" charset="0"/>
+                <a:cs typeface="Cmu serif" panose="02000603000000000000" pitchFamily="2" charset="0"/>
+              </a:rPr>
+              <a:t>L’offset costante evidenzia come, al fine di disporre di dati utilizzabili, sia necessario eseguire una calibrazione di massima del dispositivo.</a:t>
+            </a:r>
+          </a:p>
+          <a:p>
+            <a:pPr algn="just"/>
+            <a:endParaRPr lang="it-IT" sz="2000" dirty="0">
+              <a:latin typeface="Cmu serif" panose="02000603000000000000" pitchFamily="2" charset="0"/>
+              <a:ea typeface="Cmu serif" panose="02000603000000000000" pitchFamily="2" charset="0"/>
+              <a:cs typeface="Cmu serif" panose="02000603000000000000" pitchFamily="2" charset="0"/>
+            </a:endParaRPr>
+          </a:p>
+          <a:p>
+            <a:pPr algn="just"/>
+            <a:r>
+              <a:rPr lang="it-IT" sz="2000" dirty="0">
+                <a:latin typeface="Cmu serif" panose="02000603000000000000" pitchFamily="2" charset="0"/>
+                <a:ea typeface="Cmu serif" panose="02000603000000000000" pitchFamily="2" charset="0"/>
+                <a:cs typeface="Cmu serif" panose="02000603000000000000" pitchFamily="2" charset="0"/>
+              </a:rPr>
+              <a:t>A tale fine, durante il volo, è stata eseguita una traiettoria allungata, per minimizzare gli effetti del vento reale e. l’impatto delle manovre di virata, pur rimanendo all’interno dello spazio aereo consentito. </a:t>
+            </a:r>
+          </a:p>
+          <a:p>
+            <a:pPr algn="just"/>
+            <a:endParaRPr lang="it-IT" sz="2000" dirty="0">
+              <a:latin typeface="Cmu serif" panose="02000603000000000000" pitchFamily="2" charset="0"/>
+              <a:ea typeface="Cmu serif" panose="02000603000000000000" pitchFamily="2" charset="0"/>
+              <a:cs typeface="Cmu serif" panose="02000603000000000000" pitchFamily="2" charset="0"/>
+            </a:endParaRPr>
+          </a:p>
+          <a:p>
+            <a:pPr algn="just"/>
+            <a:r>
+              <a:rPr lang="it-IT" sz="2000" dirty="0">
+                <a:latin typeface="Cmu serif" panose="02000603000000000000" pitchFamily="2" charset="0"/>
+                <a:ea typeface="Cmu serif" panose="02000603000000000000" pitchFamily="2" charset="0"/>
+                <a:cs typeface="Cmu serif" panose="02000603000000000000" pitchFamily="2" charset="0"/>
+              </a:rPr>
+              <a:t>Il set di dati di velocità del flusso viene dunque traslato di una costante, imponendo che il suo valore medio sia uguale a quello della velocità rispetto al suolo, durante l’ intervallo di manovra.</a:t>
+            </a:r>
+          </a:p>
+        </p:txBody>
+      </p:sp>
+      <p:sp>
+        <p:nvSpPr>
+          <p:cNvPr id="7" name="Titolo 1">
+            <a:extLst>
+              <a:ext uri="{FF2B5EF4-FFF2-40B4-BE49-F238E27FC236}">
+                <a16:creationId xmlns:a16="http://schemas.microsoft.com/office/drawing/2014/main" id="{FC6D212B-F062-2C61-2A86-D946A609F9D9}"/>
+              </a:ext>
+            </a:extLst>
+          </p:cNvPr>
+          <p:cNvSpPr txBox="1">
+            <a:spLocks/>
+          </p:cNvSpPr>
+          <p:nvPr/>
+        </p:nvSpPr>
+        <p:spPr>
+          <a:xfrm>
+            <a:off x="3524921" y="763835"/>
+            <a:ext cx="7767079" cy="490904"/>
+          </a:xfrm>
+          <a:prstGeom prst="rect">
+            <a:avLst/>
+          </a:prstGeom>
+        </p:spPr>
+        <p:txBody>
+          <a:bodyPr vert="horz" wrap="square" lIns="91440" tIns="45720" rIns="91440" bIns="45720" rtlCol="0" anchor="ctr">
+            <a:spAutoFit/>
+          </a:bodyPr>
+          <a:lstStyle>
+            <a:lvl1pPr algn="l" defTabSz="914400" rtl="0" eaLnBrk="1" latinLnBrk="0" hangingPunct="1">
+              <a:lnSpc>
+                <a:spcPct val="90000"/>
+              </a:lnSpc>
+              <a:spcBef>
+                <a:spcPct val="0"/>
+              </a:spcBef>
+              <a:buNone/>
+              <a:defRPr sz="4400" kern="1200">
+                <a:solidFill>
+                  <a:schemeClr val="tx1"/>
+                </a:solidFill>
+                <a:latin typeface="+mj-lt"/>
+                <a:ea typeface="+mj-ea"/>
+                <a:cs typeface="+mj-cs"/>
+              </a:defRPr>
+            </a:lvl1pPr>
+          </a:lstStyle>
+          <a:p>
+            <a:r>
+              <a:rPr lang="it-IT" sz="2800" dirty="0">
+                <a:latin typeface="Cmu serif" panose="02000603000000000000" pitchFamily="2" charset="0"/>
+                <a:ea typeface="Cmu serif" panose="02000603000000000000" pitchFamily="2" charset="0"/>
+                <a:cs typeface="Cmu serif" panose="02000603000000000000" pitchFamily="2" charset="0"/>
+              </a:rPr>
+              <a:t>5.1. Misura della velocità del flusso indisturbato</a:t>
+            </a:r>
+          </a:p>
+        </p:txBody>
+      </p:sp>
+      <p:pic>
+        <p:nvPicPr>
+          <p:cNvPr id="3" name="Immagine 2" descr="Immagine che contiene testo, schermata, linea&#10;&#10;Descrizione generata automaticamente">
+            <a:extLst>
+              <a:ext uri="{FF2B5EF4-FFF2-40B4-BE49-F238E27FC236}">
+                <a16:creationId xmlns:a16="http://schemas.microsoft.com/office/drawing/2014/main" id="{91DB3FB9-C570-6173-48AC-C26291388A08}"/>
+              </a:ext>
+            </a:extLst>
+          </p:cNvPr>
+          <p:cNvPicPr>
+            <a:picLocks noChangeAspect="1"/>
+          </p:cNvPicPr>
+          <p:nvPr/>
+        </p:nvPicPr>
+        <p:blipFill>
+          <a:blip r:embed="rId3">
+            <a:extLst>
+              <a:ext uri="{28A0092B-C50C-407E-A947-70E740481C1C}">
+                <a14:useLocalDpi xmlns:a14="http://schemas.microsoft.com/office/drawing/2010/main" val="0"/>
+              </a:ext>
+            </a:extLst>
+          </a:blip>
+          <a:stretch>
+            <a:fillRect/>
+          </a:stretch>
+        </p:blipFill>
+        <p:spPr>
+          <a:xfrm>
+            <a:off x="7121732" y="2039365"/>
+            <a:ext cx="4170268" cy="4170268"/>
+          </a:xfrm>
+          <a:prstGeom prst="rect">
+            <a:avLst/>
+          </a:prstGeom>
+        </p:spPr>
+      </p:pic>
+    </p:spTree>
+    <p:extLst>
+      <p:ext uri="{BB962C8B-B14F-4D97-AF65-F5344CB8AC3E}">
+        <p14:creationId xmlns:p14="http://schemas.microsoft.com/office/powerpoint/2010/main" val="1539335076"/>
+      </p:ext>
+    </p:extLst>
+  </p:cSld>
+  <p:clrMapOvr>
+    <a:masterClrMapping/>
+  </p:clrMapOvr>
+</p:sld>
+</file>
+
+<file path=ppt/slides/slide15.xml><?xml version="1.0" encoding="utf-8"?>
+<p:sld xmlns:a="http://schemas.openxmlformats.org/drawingml/2006/main" xmlns:r="http://schemas.openxmlformats.org/officeDocument/2006/relationships" xmlns:p="http://schemas.openxmlformats.org/presentationml/2006/main">
+  <p:cSld>
+    <p:spTree>
+      <p:nvGrpSpPr>
+        <p:cNvPr id="1" name=""/>
+        <p:cNvGrpSpPr/>
+        <p:nvPr/>
+      </p:nvGrpSpPr>
+      <p:grpSpPr>
+        <a:xfrm>
+          <a:off x="0" y="0"/>
+          <a:ext cx="0" cy="0"/>
+          <a:chOff x="0" y="0"/>
+          <a:chExt cx="0" cy="0"/>
+        </a:xfrm>
+      </p:grpSpPr>
+      <p:pic>
+        <p:nvPicPr>
+          <p:cNvPr id="4" name="Immagine 3" descr="Immagine che contiene testo, Carattere, Elementi grafici, logo">
+            <a:extLst>
+              <a:ext uri="{FF2B5EF4-FFF2-40B4-BE49-F238E27FC236}">
+                <a16:creationId xmlns:a16="http://schemas.microsoft.com/office/drawing/2014/main" id="{B6812EB3-284C-CD2B-D39B-7E068E84B778}"/>
+              </a:ext>
+            </a:extLst>
+          </p:cNvPr>
+          <p:cNvPicPr>
+            <a:picLocks noChangeAspect="1"/>
+          </p:cNvPicPr>
+          <p:nvPr/>
+        </p:nvPicPr>
+        <p:blipFill>
+          <a:blip r:embed="rId2">
+            <a:extLst>
+              <a:ext uri="{28A0092B-C50C-407E-A947-70E740481C1C}">
+                <a14:useLocalDpi xmlns:a14="http://schemas.microsoft.com/office/drawing/2010/main" val="0"/>
+              </a:ext>
+            </a:extLst>
+          </a:blip>
+          <a:stretch>
+            <a:fillRect/>
+          </a:stretch>
+        </p:blipFill>
+        <p:spPr>
+          <a:xfrm>
+            <a:off x="900000" y="540001"/>
+            <a:ext cx="2076591" cy="938572"/>
+          </a:xfrm>
+          <a:prstGeom prst="rect">
+            <a:avLst/>
+          </a:prstGeom>
+        </p:spPr>
+      </p:pic>
+      <p:sp>
+        <p:nvSpPr>
+          <p:cNvPr id="9" name="CasellaDiTesto 8">
+            <a:extLst>
+              <a:ext uri="{FF2B5EF4-FFF2-40B4-BE49-F238E27FC236}">
+                <a16:creationId xmlns:a16="http://schemas.microsoft.com/office/drawing/2014/main" id="{6BBA43B8-57EC-EC7D-B79C-094BABBFFDF4}"/>
+              </a:ext>
+            </a:extLst>
+          </p:cNvPr>
+          <p:cNvSpPr txBox="1"/>
+          <p:nvPr/>
+        </p:nvSpPr>
+        <p:spPr>
+          <a:xfrm>
+            <a:off x="900001" y="1923897"/>
+            <a:ext cx="4387615" cy="3785652"/>
+          </a:xfrm>
+          <a:prstGeom prst="rect">
+            <a:avLst/>
+          </a:prstGeom>
+          <a:noFill/>
+        </p:spPr>
+        <p:txBody>
+          <a:bodyPr wrap="square" rtlCol="0">
+            <a:spAutoFit/>
+          </a:bodyPr>
+          <a:lstStyle/>
+          <a:p>
+            <a:pPr algn="just"/>
+            <a:r>
+              <a:rPr lang="it-IT" sz="2000" dirty="0">
+                <a:latin typeface="Cmu serif" panose="02000603000000000000" pitchFamily="2" charset="0"/>
+                <a:ea typeface="Cmu serif" panose="02000603000000000000" pitchFamily="2" charset="0"/>
+                <a:cs typeface="Cmu serif" panose="02000603000000000000" pitchFamily="2" charset="0"/>
+              </a:rPr>
+              <a:t>Il diagramma delle velocità così calibrato è quello rappresentato.</a:t>
+            </a:r>
+          </a:p>
+          <a:p>
+            <a:pPr algn="just"/>
+            <a:endParaRPr lang="it-IT" sz="2000" dirty="0">
+              <a:latin typeface="Cmu serif" panose="02000603000000000000" pitchFamily="2" charset="0"/>
+              <a:ea typeface="Cmu serif" panose="02000603000000000000" pitchFamily="2" charset="0"/>
+              <a:cs typeface="Cmu serif" panose="02000603000000000000" pitchFamily="2" charset="0"/>
+            </a:endParaRPr>
+          </a:p>
+          <a:p>
+            <a:pPr algn="just"/>
+            <a:r>
+              <a:rPr lang="it-IT" sz="2000" dirty="0">
+                <a:latin typeface="Cmu serif" panose="02000603000000000000" pitchFamily="2" charset="0"/>
+                <a:ea typeface="Cmu serif" panose="02000603000000000000" pitchFamily="2" charset="0"/>
+                <a:cs typeface="Cmu serif" panose="02000603000000000000" pitchFamily="2" charset="0"/>
+              </a:rPr>
+              <a:t>Si possono osservare alcuni aspetti: il fatto che le curve abbiano inizialmente una differenza costante è un dato positivo trattandosi di grandezze fisiche completamente diverse, ed evidenzia la coerenza dei dati; inoltre, a calibrazione eseguita, si ottiene un’ottima sovrapposizione delle due curve.</a:t>
+            </a:r>
+          </a:p>
+        </p:txBody>
+      </p:sp>
+      <p:sp>
+        <p:nvSpPr>
+          <p:cNvPr id="7" name="Titolo 1">
+            <a:extLst>
+              <a:ext uri="{FF2B5EF4-FFF2-40B4-BE49-F238E27FC236}">
+                <a16:creationId xmlns:a16="http://schemas.microsoft.com/office/drawing/2014/main" id="{FC6D212B-F062-2C61-2A86-D946A609F9D9}"/>
+              </a:ext>
+            </a:extLst>
+          </p:cNvPr>
+          <p:cNvSpPr txBox="1">
+            <a:spLocks/>
+          </p:cNvSpPr>
+          <p:nvPr/>
+        </p:nvSpPr>
+        <p:spPr>
+          <a:xfrm>
+            <a:off x="3524921" y="763835"/>
+            <a:ext cx="7767079" cy="490904"/>
+          </a:xfrm>
+          <a:prstGeom prst="rect">
+            <a:avLst/>
+          </a:prstGeom>
+        </p:spPr>
+        <p:txBody>
+          <a:bodyPr vert="horz" wrap="square" lIns="91440" tIns="45720" rIns="91440" bIns="45720" rtlCol="0" anchor="ctr">
+            <a:spAutoFit/>
+          </a:bodyPr>
+          <a:lstStyle>
+            <a:lvl1pPr algn="l" defTabSz="914400" rtl="0" eaLnBrk="1" latinLnBrk="0" hangingPunct="1">
+              <a:lnSpc>
+                <a:spcPct val="90000"/>
+              </a:lnSpc>
+              <a:spcBef>
+                <a:spcPct val="0"/>
+              </a:spcBef>
+              <a:buNone/>
+              <a:defRPr sz="4400" kern="1200">
+                <a:solidFill>
+                  <a:schemeClr val="tx1"/>
+                </a:solidFill>
+                <a:latin typeface="+mj-lt"/>
+                <a:ea typeface="+mj-ea"/>
+                <a:cs typeface="+mj-cs"/>
+              </a:defRPr>
+            </a:lvl1pPr>
+          </a:lstStyle>
+          <a:p>
+            <a:r>
+              <a:rPr lang="it-IT" sz="2800" dirty="0">
+                <a:latin typeface="Cmu serif" panose="02000603000000000000" pitchFamily="2" charset="0"/>
+                <a:ea typeface="Cmu serif" panose="02000603000000000000" pitchFamily="2" charset="0"/>
+                <a:cs typeface="Cmu serif" panose="02000603000000000000" pitchFamily="2" charset="0"/>
+              </a:rPr>
+              <a:t>5.1. Misura della velocità del flusso indisturbato</a:t>
+            </a:r>
+          </a:p>
+        </p:txBody>
+      </p:sp>
+      <p:pic>
+        <p:nvPicPr>
+          <p:cNvPr id="3" name="Immagine 2" descr="Immagine che contiene testo, schermata, Diagramma, linea">
+            <a:extLst>
+              <a:ext uri="{FF2B5EF4-FFF2-40B4-BE49-F238E27FC236}">
+                <a16:creationId xmlns:a16="http://schemas.microsoft.com/office/drawing/2014/main" id="{59341973-9A28-75D8-FDB0-58808621652A}"/>
+              </a:ext>
+            </a:extLst>
+          </p:cNvPr>
+          <p:cNvPicPr>
+            <a:picLocks noChangeAspect="1"/>
+          </p:cNvPicPr>
+          <p:nvPr/>
+        </p:nvPicPr>
+        <p:blipFill>
+          <a:blip r:embed="rId3">
+            <a:extLst>
+              <a:ext uri="{28A0092B-C50C-407E-A947-70E740481C1C}">
+                <a14:useLocalDpi xmlns:a14="http://schemas.microsoft.com/office/drawing/2010/main" val="0"/>
+              </a:ext>
+            </a:extLst>
+          </a:blip>
+          <a:stretch>
+            <a:fillRect/>
+          </a:stretch>
+        </p:blipFill>
+        <p:spPr>
+          <a:xfrm>
+            <a:off x="5805332" y="1923897"/>
+            <a:ext cx="5486667" cy="4170268"/>
+          </a:xfrm>
+          <a:prstGeom prst="rect">
+            <a:avLst/>
+          </a:prstGeom>
+        </p:spPr>
+      </p:pic>
+    </p:spTree>
+    <p:extLst>
+      <p:ext uri="{BB962C8B-B14F-4D97-AF65-F5344CB8AC3E}">
+        <p14:creationId xmlns:p14="http://schemas.microsoft.com/office/powerpoint/2010/main" val="3861734969"/>
       </p:ext>
     </p:extLst>
   </p:cSld>
@@ -5497,6 +6450,112 @@
           </a:prstGeom>
         </p:spPr>
       </p:pic>
+      <p:sp>
+        <p:nvSpPr>
+          <p:cNvPr id="3" name="CasellaDiTesto 2">
+            <a:extLst>
+              <a:ext uri="{FF2B5EF4-FFF2-40B4-BE49-F238E27FC236}">
+                <a16:creationId xmlns:a16="http://schemas.microsoft.com/office/drawing/2014/main" id="{29C1F80B-7B14-4013-20A8-27E315C75292}"/>
+              </a:ext>
+            </a:extLst>
+          </p:cNvPr>
+          <p:cNvSpPr txBox="1"/>
+          <p:nvPr/>
+        </p:nvSpPr>
+        <p:spPr>
+          <a:xfrm>
+            <a:off x="1488295" y="6364289"/>
+            <a:ext cx="9215409" cy="230832"/>
+          </a:xfrm>
+          <a:prstGeom prst="rect">
+            <a:avLst/>
+          </a:prstGeom>
+          <a:noFill/>
+        </p:spPr>
+        <p:txBody>
+          <a:bodyPr wrap="square" rtlCol="0">
+            <a:spAutoFit/>
+          </a:bodyPr>
+          <a:lstStyle/>
+          <a:p>
+            <a:r>
+              <a:rPr lang="en-US" sz="900" dirty="0">
+                <a:solidFill>
+                  <a:schemeClr val="bg1">
+                    <a:lumMod val="75000"/>
+                  </a:schemeClr>
+                </a:solidFill>
+                <a:latin typeface="CMU Serif" panose="02000603000000000000" pitchFamily="2" charset="0"/>
+                <a:ea typeface="CMU Serif" panose="02000603000000000000" pitchFamily="2" charset="0"/>
+                <a:cs typeface="CMU Serif" panose="02000603000000000000" pitchFamily="2" charset="0"/>
+              </a:rPr>
+              <a:t>[4] Team </a:t>
+            </a:r>
+            <a:r>
+              <a:rPr lang="en-US" sz="900" dirty="0" err="1">
+                <a:solidFill>
+                  <a:schemeClr val="bg1">
+                    <a:lumMod val="75000"/>
+                  </a:schemeClr>
+                </a:solidFill>
+                <a:latin typeface="CMU Serif" panose="02000603000000000000" pitchFamily="2" charset="0"/>
+                <a:ea typeface="CMU Serif" panose="02000603000000000000" pitchFamily="2" charset="0"/>
+                <a:cs typeface="CMU Serif" panose="02000603000000000000" pitchFamily="2" charset="0"/>
+              </a:rPr>
+              <a:t>LiftUp</a:t>
+            </a:r>
+            <a:r>
+              <a:rPr lang="en-US" sz="900" dirty="0">
+                <a:solidFill>
+                  <a:schemeClr val="bg1">
+                    <a:lumMod val="75000"/>
+                  </a:schemeClr>
+                </a:solidFill>
+                <a:latin typeface="CMU Serif" panose="02000603000000000000" pitchFamily="2" charset="0"/>
+                <a:ea typeface="CMU Serif" panose="02000603000000000000" pitchFamily="2" charset="0"/>
+                <a:cs typeface="CMU Serif" panose="02000603000000000000" pitchFamily="2" charset="0"/>
+              </a:rPr>
+              <a:t>. Air cargo challenge 2019. Technical report, University of Padua, 2019.  [5] Team </a:t>
+            </a:r>
+            <a:r>
+              <a:rPr lang="en-US" sz="900" dirty="0" err="1">
+                <a:solidFill>
+                  <a:schemeClr val="bg1">
+                    <a:lumMod val="75000"/>
+                  </a:schemeClr>
+                </a:solidFill>
+                <a:latin typeface="CMU Serif" panose="02000603000000000000" pitchFamily="2" charset="0"/>
+                <a:ea typeface="CMU Serif" panose="02000603000000000000" pitchFamily="2" charset="0"/>
+                <a:cs typeface="CMU Serif" panose="02000603000000000000" pitchFamily="2" charset="0"/>
+              </a:rPr>
+              <a:t>LiftUp</a:t>
+            </a:r>
+            <a:r>
+              <a:rPr lang="en-US" sz="900" dirty="0">
+                <a:solidFill>
+                  <a:schemeClr val="bg1">
+                    <a:lumMod val="75000"/>
+                  </a:schemeClr>
+                </a:solidFill>
+                <a:latin typeface="CMU Serif" panose="02000603000000000000" pitchFamily="2" charset="0"/>
+                <a:ea typeface="CMU Serif" panose="02000603000000000000" pitchFamily="2" charset="0"/>
+                <a:cs typeface="CMU Serif" panose="02000603000000000000" pitchFamily="2" charset="0"/>
+              </a:rPr>
+              <a:t>. Air cargo challenge 2022. Technical report, University of Padua, 2022.</a:t>
+            </a:r>
+            <a:endParaRPr lang="it-IT" sz="900" dirty="0">
+              <a:solidFill>
+                <a:schemeClr val="bg1">
+                  <a:lumMod val="75000"/>
+                </a:schemeClr>
+              </a:solidFill>
+              <a:latin typeface="CMU Serif" panose="02000603000000000000" pitchFamily="2" charset="0"/>
+              <a:ea typeface="CMU Serif" panose="02000603000000000000" pitchFamily="2" charset="0"/>
+              <a:cs typeface="CMU Serif" panose="02000603000000000000" pitchFamily="2" charset="0"/>
+            </a:endParaRPr>
+          </a:p>
+        </p:txBody>
+      </p:sp>
     </p:spTree>
     <p:extLst>
       <p:ext uri="{BB962C8B-B14F-4D97-AF65-F5344CB8AC3E}">
@@ -5968,6 +7027,99 @@
           </a:prstGeom>
         </p:spPr>
       </p:pic>
+      <p:sp>
+        <p:nvSpPr>
+          <p:cNvPr id="2" name="CasellaDiTesto 1">
+            <a:extLst>
+              <a:ext uri="{FF2B5EF4-FFF2-40B4-BE49-F238E27FC236}">
+                <a16:creationId xmlns:a16="http://schemas.microsoft.com/office/drawing/2014/main" id="{31D9C755-F25C-F56F-2204-469E0B7EC8ED}"/>
+              </a:ext>
+            </a:extLst>
+          </p:cNvPr>
+          <p:cNvSpPr txBox="1"/>
+          <p:nvPr/>
+        </p:nvSpPr>
+        <p:spPr>
+          <a:xfrm>
+            <a:off x="1488295" y="6364289"/>
+            <a:ext cx="9215409" cy="230832"/>
+          </a:xfrm>
+          <a:prstGeom prst="rect">
+            <a:avLst/>
+          </a:prstGeom>
+          <a:noFill/>
+        </p:spPr>
+        <p:txBody>
+          <a:bodyPr wrap="square" rtlCol="0">
+            <a:spAutoFit/>
+          </a:bodyPr>
+          <a:lstStyle/>
+          <a:p>
+            <a:r>
+              <a:rPr lang="it-IT" sz="900" dirty="0">
+                <a:solidFill>
+                  <a:schemeClr val="bg1">
+                    <a:lumMod val="75000"/>
+                  </a:schemeClr>
+                </a:solidFill>
+                <a:latin typeface="CMU Serif" panose="02000603000000000000" pitchFamily="2" charset="0"/>
+                <a:ea typeface="CMU Serif" panose="02000603000000000000" pitchFamily="2" charset="0"/>
+                <a:cs typeface="CMU Serif" panose="02000603000000000000" pitchFamily="2" charset="0"/>
+              </a:rPr>
+              <a:t>[6] </a:t>
+            </a:r>
+            <a:r>
+              <a:rPr lang="en-US" sz="900" dirty="0">
+                <a:solidFill>
+                  <a:schemeClr val="bg1">
+                    <a:lumMod val="75000"/>
+                  </a:schemeClr>
+                </a:solidFill>
+                <a:latin typeface="CMU Serif" panose="02000603000000000000" pitchFamily="2" charset="0"/>
+                <a:ea typeface="CMU Serif" panose="02000603000000000000" pitchFamily="2" charset="0"/>
+                <a:cs typeface="CMU Serif" panose="02000603000000000000" pitchFamily="2" charset="0"/>
+              </a:rPr>
+              <a:t>Viktor </a:t>
+            </a:r>
+            <a:r>
+              <a:rPr lang="en-US" sz="900" dirty="0" err="1">
+                <a:solidFill>
+                  <a:schemeClr val="bg1">
+                    <a:lumMod val="75000"/>
+                  </a:schemeClr>
+                </a:solidFill>
+                <a:latin typeface="CMU Serif" panose="02000603000000000000" pitchFamily="2" charset="0"/>
+                <a:ea typeface="CMU Serif" panose="02000603000000000000" pitchFamily="2" charset="0"/>
+                <a:cs typeface="CMU Serif" panose="02000603000000000000" pitchFamily="2" charset="0"/>
+              </a:rPr>
+              <a:t>Zombori</a:t>
+            </a:r>
+            <a:r>
+              <a:rPr lang="en-US" sz="900" dirty="0">
+                <a:solidFill>
+                  <a:schemeClr val="bg1">
+                    <a:lumMod val="75000"/>
+                  </a:schemeClr>
+                </a:solidFill>
+                <a:latin typeface="CMU Serif" panose="02000603000000000000" pitchFamily="2" charset="0"/>
+                <a:ea typeface="CMU Serif" panose="02000603000000000000" pitchFamily="2" charset="0"/>
+                <a:cs typeface="CMU Serif" panose="02000603000000000000" pitchFamily="2" charset="0"/>
+              </a:rPr>
+              <a:t>. Study of electronic speed control strategies for a fixed battery, motor and propeller aircraft propulsion set. Master’s thesis, University of Beira Interior, 2021.</a:t>
+            </a:r>
+            <a:endParaRPr lang="it-IT" sz="900" dirty="0">
+              <a:solidFill>
+                <a:schemeClr val="bg1">
+                  <a:lumMod val="75000"/>
+                </a:schemeClr>
+              </a:solidFill>
+              <a:latin typeface="CMU Serif" panose="02000603000000000000" pitchFamily="2" charset="0"/>
+              <a:ea typeface="CMU Serif" panose="02000603000000000000" pitchFamily="2" charset="0"/>
+              <a:cs typeface="CMU Serif" panose="02000603000000000000" pitchFamily="2" charset="0"/>
+            </a:endParaRPr>
+          </a:p>
+        </p:txBody>
+      </p:sp>
     </p:spTree>
     <p:extLst>
       <p:ext uri="{BB962C8B-B14F-4D97-AF65-F5344CB8AC3E}">

</xml_diff>

<commit_message>
Presentazione revisionata - CONSEGNA Presentazione
</commit_message>
<xml_diff>
--- a/Presentazione/Presentazione relazione.pptx
+++ b/Presentazione/Presentazione relazione.pptx
@@ -273,7 +273,7 @@
           <a:p>
             <a:fld id="{A6FD4720-B9C0-4F47-AA5B-4FF5D3586A21}" type="datetimeFigureOut">
               <a:rPr lang="it-IT" smtClean="0"/>
-              <a:t>05/07/2023</a:t>
+              <a:t>06/07/2023</a:t>
             </a:fld>
             <a:endParaRPr lang="it-IT"/>
           </a:p>
@@ -471,7 +471,7 @@
           <a:p>
             <a:fld id="{A6FD4720-B9C0-4F47-AA5B-4FF5D3586A21}" type="datetimeFigureOut">
               <a:rPr lang="it-IT" smtClean="0"/>
-              <a:t>05/07/2023</a:t>
+              <a:t>06/07/2023</a:t>
             </a:fld>
             <a:endParaRPr lang="it-IT"/>
           </a:p>
@@ -679,7 +679,7 @@
           <a:p>
             <a:fld id="{A6FD4720-B9C0-4F47-AA5B-4FF5D3586A21}" type="datetimeFigureOut">
               <a:rPr lang="it-IT" smtClean="0"/>
-              <a:t>05/07/2023</a:t>
+              <a:t>06/07/2023</a:t>
             </a:fld>
             <a:endParaRPr lang="it-IT"/>
           </a:p>
@@ -877,7 +877,7 @@
           <a:p>
             <a:fld id="{A6FD4720-B9C0-4F47-AA5B-4FF5D3586A21}" type="datetimeFigureOut">
               <a:rPr lang="it-IT" smtClean="0"/>
-              <a:t>05/07/2023</a:t>
+              <a:t>06/07/2023</a:t>
             </a:fld>
             <a:endParaRPr lang="it-IT"/>
           </a:p>
@@ -1152,7 +1152,7 @@
           <a:p>
             <a:fld id="{A6FD4720-B9C0-4F47-AA5B-4FF5D3586A21}" type="datetimeFigureOut">
               <a:rPr lang="it-IT" smtClean="0"/>
-              <a:t>05/07/2023</a:t>
+              <a:t>06/07/2023</a:t>
             </a:fld>
             <a:endParaRPr lang="it-IT"/>
           </a:p>
@@ -1417,7 +1417,7 @@
           <a:p>
             <a:fld id="{A6FD4720-B9C0-4F47-AA5B-4FF5D3586A21}" type="datetimeFigureOut">
               <a:rPr lang="it-IT" smtClean="0"/>
-              <a:t>05/07/2023</a:t>
+              <a:t>06/07/2023</a:t>
             </a:fld>
             <a:endParaRPr lang="it-IT"/>
           </a:p>
@@ -1829,7 +1829,7 @@
           <a:p>
             <a:fld id="{A6FD4720-B9C0-4F47-AA5B-4FF5D3586A21}" type="datetimeFigureOut">
               <a:rPr lang="it-IT" smtClean="0"/>
-              <a:t>05/07/2023</a:t>
+              <a:t>06/07/2023</a:t>
             </a:fld>
             <a:endParaRPr lang="it-IT"/>
           </a:p>
@@ -1970,7 +1970,7 @@
           <a:p>
             <a:fld id="{A6FD4720-B9C0-4F47-AA5B-4FF5D3586A21}" type="datetimeFigureOut">
               <a:rPr lang="it-IT" smtClean="0"/>
-              <a:t>05/07/2023</a:t>
+              <a:t>06/07/2023</a:t>
             </a:fld>
             <a:endParaRPr lang="it-IT"/>
           </a:p>
@@ -2083,7 +2083,7 @@
           <a:p>
             <a:fld id="{A6FD4720-B9C0-4F47-AA5B-4FF5D3586A21}" type="datetimeFigureOut">
               <a:rPr lang="it-IT" smtClean="0"/>
-              <a:t>05/07/2023</a:t>
+              <a:t>06/07/2023</a:t>
             </a:fld>
             <a:endParaRPr lang="it-IT"/>
           </a:p>
@@ -2394,7 +2394,7 @@
           <a:p>
             <a:fld id="{A6FD4720-B9C0-4F47-AA5B-4FF5D3586A21}" type="datetimeFigureOut">
               <a:rPr lang="it-IT" smtClean="0"/>
-              <a:t>05/07/2023</a:t>
+              <a:t>06/07/2023</a:t>
             </a:fld>
             <a:endParaRPr lang="it-IT"/>
           </a:p>
@@ -2682,7 +2682,7 @@
           <a:p>
             <a:fld id="{A6FD4720-B9C0-4F47-AA5B-4FF5D3586A21}" type="datetimeFigureOut">
               <a:rPr lang="it-IT" smtClean="0"/>
-              <a:t>05/07/2023</a:t>
+              <a:t>06/07/2023</a:t>
             </a:fld>
             <a:endParaRPr lang="it-IT"/>
           </a:p>
@@ -2923,7 +2923,7 @@
           <a:p>
             <a:fld id="{A6FD4720-B9C0-4F47-AA5B-4FF5D3586A21}" type="datetimeFigureOut">
               <a:rPr lang="it-IT" smtClean="0"/>
-              <a:t>05/07/2023</a:t>
+              <a:t>06/07/2023</a:t>
             </a:fld>
             <a:endParaRPr lang="it-IT"/>
           </a:p>
@@ -3743,64 +3743,6 @@
           </a:p>
         </p:txBody>
       </p:sp>
-      <p:sp>
-        <p:nvSpPr>
-          <p:cNvPr id="7" name="Titolo 1">
-            <a:extLst>
-              <a:ext uri="{FF2B5EF4-FFF2-40B4-BE49-F238E27FC236}">
-                <a16:creationId xmlns:a16="http://schemas.microsoft.com/office/drawing/2014/main" id="{FC6D212B-F062-2C61-2A86-D946A609F9D9}"/>
-              </a:ext>
-            </a:extLst>
-          </p:cNvPr>
-          <p:cNvSpPr txBox="1">
-            <a:spLocks/>
-          </p:cNvSpPr>
-          <p:nvPr/>
-        </p:nvSpPr>
-        <p:spPr>
-          <a:xfrm>
-            <a:off x="3524921" y="569936"/>
-            <a:ext cx="7767079" cy="878702"/>
-          </a:xfrm>
-          <a:prstGeom prst="rect">
-            <a:avLst/>
-          </a:prstGeom>
-        </p:spPr>
-        <p:txBody>
-          <a:bodyPr vert="horz" wrap="square" lIns="91440" tIns="45720" rIns="91440" bIns="45720" rtlCol="0" anchor="ctr">
-            <a:spAutoFit/>
-          </a:bodyPr>
-          <a:lstStyle>
-            <a:lvl1pPr algn="l" defTabSz="914400" rtl="0" eaLnBrk="1" latinLnBrk="0" hangingPunct="1">
-              <a:lnSpc>
-                <a:spcPct val="90000"/>
-              </a:lnSpc>
-              <a:spcBef>
-                <a:spcPct val="0"/>
-              </a:spcBef>
-              <a:buNone/>
-              <a:defRPr sz="4400" kern="1200">
-                <a:solidFill>
-                  <a:schemeClr val="tx1"/>
-                </a:solidFill>
-                <a:latin typeface="+mj-lt"/>
-                <a:ea typeface="+mj-ea"/>
-                <a:cs typeface="+mj-cs"/>
-              </a:defRPr>
-            </a:lvl1pPr>
-          </a:lstStyle>
-          <a:p>
-            <a:r>
-              <a:rPr lang="it-IT" sz="2800" dirty="0">
-                <a:latin typeface="Cmu serif" panose="02000603000000000000" pitchFamily="2" charset="0"/>
-                <a:ea typeface="Cmu serif" panose="02000603000000000000" pitchFamily="2" charset="0"/>
-                <a:cs typeface="Cmu serif" panose="02000603000000000000" pitchFamily="2" charset="0"/>
-              </a:rPr>
-              <a:t>4.2.2. Verifica delle ipotesi di forze resistenti nulle</a:t>
-            </a:r>
-          </a:p>
-        </p:txBody>
-      </p:sp>
       <p:pic>
         <p:nvPicPr>
           <p:cNvPr id="5" name="Immagine 4">
@@ -3909,6 +3851,45 @@
                 <a:cs typeface="Cmu serif" panose="02000603000000000000" pitchFamily="2" charset="0"/>
               </a:rPr>
               <a:t>I dati dell’accelerometro.</a:t>
+            </a:r>
+          </a:p>
+        </p:txBody>
+      </p:sp>
+      <p:sp>
+        <p:nvSpPr>
+          <p:cNvPr id="2" name="Titolo 1">
+            <a:extLst>
+              <a:ext uri="{FF2B5EF4-FFF2-40B4-BE49-F238E27FC236}">
+                <a16:creationId xmlns:a16="http://schemas.microsoft.com/office/drawing/2014/main" id="{AC03E03A-1770-D51D-1821-6CFD90A397C1}"/>
+              </a:ext>
+            </a:extLst>
+          </p:cNvPr>
+          <p:cNvSpPr>
+            <a:spLocks noGrp="1"/>
+          </p:cNvSpPr>
+          <p:nvPr>
+            <p:ph type="title"/>
+          </p:nvPr>
+        </p:nvSpPr>
+        <p:spPr>
+          <a:xfrm>
+            <a:off x="3524921" y="634161"/>
+            <a:ext cx="7767079" cy="878702"/>
+          </a:xfrm>
+        </p:spPr>
+        <p:txBody>
+          <a:bodyPr wrap="square">
+            <a:spAutoFit/>
+          </a:bodyPr>
+          <a:lstStyle/>
+          <a:p>
+            <a:r>
+              <a:rPr lang="it-IT" sz="2800" dirty="0">
+                <a:latin typeface="Cmu serif" panose="02000603000000000000" pitchFamily="2" charset="0"/>
+                <a:ea typeface="Cmu serif" panose="02000603000000000000" pitchFamily="2" charset="0"/>
+                <a:cs typeface="Cmu serif" panose="02000603000000000000" pitchFamily="2" charset="0"/>
+              </a:rPr>
+              <a:t>4.2.2. Verifica delle ipotesi di forze resistenti nulle</a:t>
             </a:r>
           </a:p>
         </p:txBody>
@@ -4019,64 +4000,6 @@
           </a:p>
         </p:txBody>
       </p:sp>
-      <p:sp>
-        <p:nvSpPr>
-          <p:cNvPr id="7" name="Titolo 1">
-            <a:extLst>
-              <a:ext uri="{FF2B5EF4-FFF2-40B4-BE49-F238E27FC236}">
-                <a16:creationId xmlns:a16="http://schemas.microsoft.com/office/drawing/2014/main" id="{FC6D212B-F062-2C61-2A86-D946A609F9D9}"/>
-              </a:ext>
-            </a:extLst>
-          </p:cNvPr>
-          <p:cNvSpPr txBox="1">
-            <a:spLocks/>
-          </p:cNvSpPr>
-          <p:nvPr/>
-        </p:nvSpPr>
-        <p:spPr>
-          <a:xfrm>
-            <a:off x="3524921" y="569936"/>
-            <a:ext cx="7767079" cy="878702"/>
-          </a:xfrm>
-          <a:prstGeom prst="rect">
-            <a:avLst/>
-          </a:prstGeom>
-        </p:spPr>
-        <p:txBody>
-          <a:bodyPr vert="horz" wrap="square" lIns="91440" tIns="45720" rIns="91440" bIns="45720" rtlCol="0" anchor="ctr">
-            <a:spAutoFit/>
-          </a:bodyPr>
-          <a:lstStyle>
-            <a:lvl1pPr algn="l" defTabSz="914400" rtl="0" eaLnBrk="1" latinLnBrk="0" hangingPunct="1">
-              <a:lnSpc>
-                <a:spcPct val="90000"/>
-              </a:lnSpc>
-              <a:spcBef>
-                <a:spcPct val="0"/>
-              </a:spcBef>
-              <a:buNone/>
-              <a:defRPr sz="4400" kern="1200">
-                <a:solidFill>
-                  <a:schemeClr val="tx1"/>
-                </a:solidFill>
-                <a:latin typeface="+mj-lt"/>
-                <a:ea typeface="+mj-ea"/>
-                <a:cs typeface="+mj-cs"/>
-              </a:defRPr>
-            </a:lvl1pPr>
-          </a:lstStyle>
-          <a:p>
-            <a:r>
-              <a:rPr lang="it-IT" sz="2800" dirty="0">
-                <a:latin typeface="Cmu serif" panose="02000603000000000000" pitchFamily="2" charset="0"/>
-                <a:ea typeface="Cmu serif" panose="02000603000000000000" pitchFamily="2" charset="0"/>
-                <a:cs typeface="Cmu serif" panose="02000603000000000000" pitchFamily="2" charset="0"/>
-              </a:rPr>
-              <a:t>4.2.2. Verifica delle ipotesi di forze resistenti nulle – individuazione dell’intervallo di misure</a:t>
-            </a:r>
-          </a:p>
-        </p:txBody>
-      </p:sp>
       <p:pic>
         <p:nvPicPr>
           <p:cNvPr id="3" name="Immagine 2" descr="Immagine che contiene testo, diagramma, Diagramma, linea">
@@ -4149,6 +4072,45 @@
           </a:prstGeom>
         </p:spPr>
       </p:pic>
+      <p:sp>
+        <p:nvSpPr>
+          <p:cNvPr id="2" name="Titolo 1">
+            <a:extLst>
+              <a:ext uri="{FF2B5EF4-FFF2-40B4-BE49-F238E27FC236}">
+                <a16:creationId xmlns:a16="http://schemas.microsoft.com/office/drawing/2014/main" id="{1E2D871D-E150-0013-2633-F775F6E3F6B8}"/>
+              </a:ext>
+            </a:extLst>
+          </p:cNvPr>
+          <p:cNvSpPr>
+            <a:spLocks noGrp="1"/>
+          </p:cNvSpPr>
+          <p:nvPr>
+            <p:ph type="title"/>
+          </p:nvPr>
+        </p:nvSpPr>
+        <p:spPr>
+          <a:xfrm>
+            <a:off x="3524921" y="634161"/>
+            <a:ext cx="7767079" cy="878702"/>
+          </a:xfrm>
+        </p:spPr>
+        <p:txBody>
+          <a:bodyPr wrap="square">
+            <a:spAutoFit/>
+          </a:bodyPr>
+          <a:lstStyle/>
+          <a:p>
+            <a:r>
+              <a:rPr lang="it-IT" sz="2800" dirty="0">
+                <a:latin typeface="Cmu serif" panose="02000603000000000000" pitchFamily="2" charset="0"/>
+                <a:ea typeface="Cmu serif" panose="02000603000000000000" pitchFamily="2" charset="0"/>
+                <a:cs typeface="Cmu serif" panose="02000603000000000000" pitchFamily="2" charset="0"/>
+              </a:rPr>
+              <a:t>4.2.2. Verifica delle ipotesi di forze resistenti nulle – individuazione dell’intervallo di misure</a:t>
+            </a:r>
+          </a:p>
+        </p:txBody>
+      </p:sp>
     </p:spTree>
     <p:extLst>
       <p:ext uri="{BB962C8B-B14F-4D97-AF65-F5344CB8AC3E}">
@@ -4255,64 +4217,6 @@
           </a:p>
         </p:txBody>
       </p:sp>
-      <p:sp>
-        <p:nvSpPr>
-          <p:cNvPr id="7" name="Titolo 1">
-            <a:extLst>
-              <a:ext uri="{FF2B5EF4-FFF2-40B4-BE49-F238E27FC236}">
-                <a16:creationId xmlns:a16="http://schemas.microsoft.com/office/drawing/2014/main" id="{FC6D212B-F062-2C61-2A86-D946A609F9D9}"/>
-              </a:ext>
-            </a:extLst>
-          </p:cNvPr>
-          <p:cNvSpPr txBox="1">
-            <a:spLocks/>
-          </p:cNvSpPr>
-          <p:nvPr/>
-        </p:nvSpPr>
-        <p:spPr>
-          <a:xfrm>
-            <a:off x="3524921" y="569936"/>
-            <a:ext cx="7767079" cy="878702"/>
-          </a:xfrm>
-          <a:prstGeom prst="rect">
-            <a:avLst/>
-          </a:prstGeom>
-        </p:spPr>
-        <p:txBody>
-          <a:bodyPr vert="horz" wrap="square" lIns="91440" tIns="45720" rIns="91440" bIns="45720" rtlCol="0" anchor="ctr">
-            <a:spAutoFit/>
-          </a:bodyPr>
-          <a:lstStyle>
-            <a:lvl1pPr algn="l" defTabSz="914400" rtl="0" eaLnBrk="1" latinLnBrk="0" hangingPunct="1">
-              <a:lnSpc>
-                <a:spcPct val="90000"/>
-              </a:lnSpc>
-              <a:spcBef>
-                <a:spcPct val="0"/>
-              </a:spcBef>
-              <a:buNone/>
-              <a:defRPr sz="4400" kern="1200">
-                <a:solidFill>
-                  <a:schemeClr val="tx1"/>
-                </a:solidFill>
-                <a:latin typeface="+mj-lt"/>
-                <a:ea typeface="+mj-ea"/>
-                <a:cs typeface="+mj-cs"/>
-              </a:defRPr>
-            </a:lvl1pPr>
-          </a:lstStyle>
-          <a:p>
-            <a:r>
-              <a:rPr lang="it-IT" sz="2800" dirty="0">
-                <a:latin typeface="Cmu serif" panose="02000603000000000000" pitchFamily="2" charset="0"/>
-                <a:ea typeface="Cmu serif" panose="02000603000000000000" pitchFamily="2" charset="0"/>
-                <a:cs typeface="Cmu serif" panose="02000603000000000000" pitchFamily="2" charset="0"/>
-              </a:rPr>
-              <a:t>4.2.2. Verifica delle ipotesi di forze resistenti nulle</a:t>
-            </a:r>
-          </a:p>
-        </p:txBody>
-      </p:sp>
       <p:pic>
         <p:nvPicPr>
           <p:cNvPr id="10" name="Immagine 9" descr="Immagine che contiene testo, diagramma, linea, Diagramma&#10;&#10;Descrizione generata automaticamente">
@@ -4421,6 +4325,45 @@
           </a:prstGeom>
         </p:spPr>
       </p:pic>
+      <p:sp>
+        <p:nvSpPr>
+          <p:cNvPr id="2" name="Titolo 1">
+            <a:extLst>
+              <a:ext uri="{FF2B5EF4-FFF2-40B4-BE49-F238E27FC236}">
+                <a16:creationId xmlns:a16="http://schemas.microsoft.com/office/drawing/2014/main" id="{4CCBB036-AB40-5644-4518-EB018A4E1D13}"/>
+              </a:ext>
+            </a:extLst>
+          </p:cNvPr>
+          <p:cNvSpPr>
+            <a:spLocks noGrp="1"/>
+          </p:cNvSpPr>
+          <p:nvPr>
+            <p:ph type="title"/>
+          </p:nvPr>
+        </p:nvSpPr>
+        <p:spPr>
+          <a:xfrm>
+            <a:off x="3524921" y="634161"/>
+            <a:ext cx="7767079" cy="878702"/>
+          </a:xfrm>
+        </p:spPr>
+        <p:txBody>
+          <a:bodyPr wrap="square">
+            <a:spAutoFit/>
+          </a:bodyPr>
+          <a:lstStyle/>
+          <a:p>
+            <a:r>
+              <a:rPr lang="it-IT" sz="2800" dirty="0">
+                <a:latin typeface="Cmu serif" panose="02000603000000000000" pitchFamily="2" charset="0"/>
+                <a:ea typeface="Cmu serif" panose="02000603000000000000" pitchFamily="2" charset="0"/>
+                <a:cs typeface="Cmu serif" panose="02000603000000000000" pitchFamily="2" charset="0"/>
+              </a:rPr>
+              <a:t>4.2.2. Verifica delle ipotesi di forze resistenti nulle – risultati</a:t>
+            </a:r>
+          </a:p>
+        </p:txBody>
+      </p:sp>
     </p:spTree>
     <p:extLst>
       <p:ext uri="{BB962C8B-B14F-4D97-AF65-F5344CB8AC3E}">
@@ -4562,7 +4505,7 @@
         </p:nvSpPr>
         <p:spPr>
           <a:xfrm>
-            <a:off x="3524921" y="763835"/>
+            <a:off x="3524920" y="810538"/>
             <a:ext cx="7767079" cy="490904"/>
           </a:xfrm>
           <a:prstGeom prst="rect">
@@ -4816,7 +4759,7 @@
                 <a:ea typeface="Cmu serif" panose="02000603000000000000" pitchFamily="2" charset="0"/>
                 <a:cs typeface="Cmu serif" panose="02000603000000000000" pitchFamily="2" charset="0"/>
               </a:rPr>
-              <a:t>A tale fine, durante il volo, è stata eseguita una traiettoria allungata, per minimizzare gli effetti del vento reale e. l’impatto delle manovre di virata, pur rimanendo all’interno dello spazio aereo consentito. </a:t>
+              <a:t>A tale fine, durante il volo, è stata eseguita una traiettoria allungata, per minimizzare gli effetti del vento reale e l’impatto delle manovre di virata, pur rimanendo all’interno dello spazio aereo consentito. </a:t>
             </a:r>
           </a:p>
           <a:p>
@@ -4840,12 +4783,57 @@
           </a:p>
         </p:txBody>
       </p:sp>
-      <p:sp>
-        <p:nvSpPr>
-          <p:cNvPr id="7" name="Titolo 1">
-            <a:extLst>
-              <a:ext uri="{FF2B5EF4-FFF2-40B4-BE49-F238E27FC236}">
-                <a16:creationId xmlns:a16="http://schemas.microsoft.com/office/drawing/2014/main" id="{FC6D212B-F062-2C61-2A86-D946A609F9D9}"/>
+      <p:pic>
+        <p:nvPicPr>
+          <p:cNvPr id="3" name="Immagine 2" descr="Immagine che contiene testo, schermata, linea&#10;&#10;Descrizione generata automaticamente">
+            <a:extLst>
+              <a:ext uri="{FF2B5EF4-FFF2-40B4-BE49-F238E27FC236}">
+                <a16:creationId xmlns:a16="http://schemas.microsoft.com/office/drawing/2014/main" id="{91DB3FB9-C570-6173-48AC-C26291388A08}"/>
+              </a:ext>
+            </a:extLst>
+          </p:cNvPr>
+          <p:cNvPicPr>
+            <a:picLocks noChangeAspect="1"/>
+          </p:cNvPicPr>
+          <p:nvPr/>
+        </p:nvPicPr>
+        <p:blipFill>
+          <a:blip r:embed="rId3">
+            <a:extLst>
+              <a:ext uri="{BEBA8EAE-BF5A-486C-A8C5-ECC9F3942E4B}">
+                <a14:imgProps xmlns:a14="http://schemas.microsoft.com/office/drawing/2010/main">
+                  <a14:imgLayer r:embed="rId4">
+                    <a14:imgEffect>
+                      <a14:brightnessContrast bright="20000" contrast="20000"/>
+                    </a14:imgEffect>
+                  </a14:imgLayer>
+                </a14:imgProps>
+              </a:ext>
+              <a:ext uri="{28A0092B-C50C-407E-A947-70E740481C1C}">
+                <a14:useLocalDpi xmlns:a14="http://schemas.microsoft.com/office/drawing/2010/main" val="0"/>
+              </a:ext>
+            </a:extLst>
+          </a:blip>
+          <a:stretch>
+            <a:fillRect/>
+          </a:stretch>
+        </p:blipFill>
+        <p:spPr>
+          <a:xfrm>
+            <a:off x="7121732" y="2039365"/>
+            <a:ext cx="4170268" cy="4170268"/>
+          </a:xfrm>
+          <a:prstGeom prst="rect">
+            <a:avLst/>
+          </a:prstGeom>
+        </p:spPr>
+      </p:pic>
+      <p:sp>
+        <p:nvSpPr>
+          <p:cNvPr id="5" name="Titolo 1">
+            <a:extLst>
+              <a:ext uri="{FF2B5EF4-FFF2-40B4-BE49-F238E27FC236}">
+                <a16:creationId xmlns:a16="http://schemas.microsoft.com/office/drawing/2014/main" id="{70700D4E-33E7-B5FB-9EE7-6A02B3005122}"/>
               </a:ext>
             </a:extLst>
           </p:cNvPr>
@@ -4856,7 +4844,7 @@
         </p:nvSpPr>
         <p:spPr>
           <a:xfrm>
-            <a:off x="3524921" y="763835"/>
+            <a:off x="3524920" y="810538"/>
             <a:ext cx="7767079" cy="490904"/>
           </a:xfrm>
           <a:prstGeom prst="rect">
@@ -4898,42 +4886,6 @@
           </a:p>
         </p:txBody>
       </p:sp>
-      <p:pic>
-        <p:nvPicPr>
-          <p:cNvPr id="3" name="Immagine 2" descr="Immagine che contiene testo, schermata, linea&#10;&#10;Descrizione generata automaticamente">
-            <a:extLst>
-              <a:ext uri="{FF2B5EF4-FFF2-40B4-BE49-F238E27FC236}">
-                <a16:creationId xmlns:a16="http://schemas.microsoft.com/office/drawing/2014/main" id="{91DB3FB9-C570-6173-48AC-C26291388A08}"/>
-              </a:ext>
-            </a:extLst>
-          </p:cNvPr>
-          <p:cNvPicPr>
-            <a:picLocks noChangeAspect="1"/>
-          </p:cNvPicPr>
-          <p:nvPr/>
-        </p:nvPicPr>
-        <p:blipFill>
-          <a:blip r:embed="rId3">
-            <a:extLst>
-              <a:ext uri="{28A0092B-C50C-407E-A947-70E740481C1C}">
-                <a14:useLocalDpi xmlns:a14="http://schemas.microsoft.com/office/drawing/2010/main" val="0"/>
-              </a:ext>
-            </a:extLst>
-          </a:blip>
-          <a:stretch>
-            <a:fillRect/>
-          </a:stretch>
-        </p:blipFill>
-        <p:spPr>
-          <a:xfrm>
-            <a:off x="7121732" y="2039365"/>
-            <a:ext cx="4170268" cy="4170268"/>
-          </a:xfrm>
-          <a:prstGeom prst="rect">
-            <a:avLst/>
-          </a:prstGeom>
-        </p:spPr>
-      </p:pic>
     </p:spTree>
     <p:extLst>
       <p:ext uri="{BB962C8B-B14F-4D97-AF65-F5344CB8AC3E}">
@@ -5059,12 +5011,48 @@
           </a:p>
         </p:txBody>
       </p:sp>
-      <p:sp>
-        <p:nvSpPr>
-          <p:cNvPr id="7" name="Titolo 1">
-            <a:extLst>
-              <a:ext uri="{FF2B5EF4-FFF2-40B4-BE49-F238E27FC236}">
-                <a16:creationId xmlns:a16="http://schemas.microsoft.com/office/drawing/2014/main" id="{FC6D212B-F062-2C61-2A86-D946A609F9D9}"/>
+      <p:pic>
+        <p:nvPicPr>
+          <p:cNvPr id="3" name="Immagine 2" descr="Immagine che contiene testo, schermata, Diagramma, linea">
+            <a:extLst>
+              <a:ext uri="{FF2B5EF4-FFF2-40B4-BE49-F238E27FC236}">
+                <a16:creationId xmlns:a16="http://schemas.microsoft.com/office/drawing/2014/main" id="{59341973-9A28-75D8-FDB0-58808621652A}"/>
+              </a:ext>
+            </a:extLst>
+          </p:cNvPr>
+          <p:cNvPicPr>
+            <a:picLocks noChangeAspect="1"/>
+          </p:cNvPicPr>
+          <p:nvPr/>
+        </p:nvPicPr>
+        <p:blipFill>
+          <a:blip r:embed="rId3">
+            <a:extLst>
+              <a:ext uri="{28A0092B-C50C-407E-A947-70E740481C1C}">
+                <a14:useLocalDpi xmlns:a14="http://schemas.microsoft.com/office/drawing/2010/main" val="0"/>
+              </a:ext>
+            </a:extLst>
+          </a:blip>
+          <a:stretch>
+            <a:fillRect/>
+          </a:stretch>
+        </p:blipFill>
+        <p:spPr>
+          <a:xfrm>
+            <a:off x="5805332" y="1923897"/>
+            <a:ext cx="5486667" cy="4170268"/>
+          </a:xfrm>
+          <a:prstGeom prst="rect">
+            <a:avLst/>
+          </a:prstGeom>
+        </p:spPr>
+      </p:pic>
+      <p:sp>
+        <p:nvSpPr>
+          <p:cNvPr id="2" name="Titolo 1">
+            <a:extLst>
+              <a:ext uri="{FF2B5EF4-FFF2-40B4-BE49-F238E27FC236}">
+                <a16:creationId xmlns:a16="http://schemas.microsoft.com/office/drawing/2014/main" id="{7C9DCAFA-EB85-8596-F898-E6C5E5EB1CAA}"/>
               </a:ext>
             </a:extLst>
           </p:cNvPr>
@@ -5075,7 +5063,7 @@
         </p:nvSpPr>
         <p:spPr>
           <a:xfrm>
-            <a:off x="3524921" y="763835"/>
+            <a:off x="3524920" y="810538"/>
             <a:ext cx="7767079" cy="490904"/>
           </a:xfrm>
           <a:prstGeom prst="rect">
@@ -5117,42 +5105,6 @@
           </a:p>
         </p:txBody>
       </p:sp>
-      <p:pic>
-        <p:nvPicPr>
-          <p:cNvPr id="3" name="Immagine 2" descr="Immagine che contiene testo, schermata, Diagramma, linea">
-            <a:extLst>
-              <a:ext uri="{FF2B5EF4-FFF2-40B4-BE49-F238E27FC236}">
-                <a16:creationId xmlns:a16="http://schemas.microsoft.com/office/drawing/2014/main" id="{59341973-9A28-75D8-FDB0-58808621652A}"/>
-              </a:ext>
-            </a:extLst>
-          </p:cNvPr>
-          <p:cNvPicPr>
-            <a:picLocks noChangeAspect="1"/>
-          </p:cNvPicPr>
-          <p:nvPr/>
-        </p:nvPicPr>
-        <p:blipFill>
-          <a:blip r:embed="rId3">
-            <a:extLst>
-              <a:ext uri="{28A0092B-C50C-407E-A947-70E740481C1C}">
-                <a14:useLocalDpi xmlns:a14="http://schemas.microsoft.com/office/drawing/2010/main" val="0"/>
-              </a:ext>
-            </a:extLst>
-          </a:blip>
-          <a:stretch>
-            <a:fillRect/>
-          </a:stretch>
-        </p:blipFill>
-        <p:spPr>
-          <a:xfrm>
-            <a:off x="5805332" y="1923897"/>
-            <a:ext cx="5486667" cy="4170268"/>
-          </a:xfrm>
-          <a:prstGeom prst="rect">
-            <a:avLst/>
-          </a:prstGeom>
-        </p:spPr>
-      </p:pic>
     </p:spTree>
     <p:extLst>
       <p:ext uri="{BB962C8B-B14F-4D97-AF65-F5344CB8AC3E}">
@@ -5379,7 +5331,7 @@
                 <a:ea typeface="Cmu serif" panose="02000603000000000000" pitchFamily="2" charset="0"/>
                 <a:cs typeface="Cmu serif" panose="02000603000000000000" pitchFamily="2" charset="0"/>
               </a:rPr>
-              <a:t>In particolare, considerando vantaggi e svantaggi delle due possibilità, si è deciso di progettare, sviluppare ed integrare il sistema da zero, rinunciando ad alternative prefabbricate. </a:t>
+              <a:t>In particolare, considerando vantaggi e svantaggi delle due possibilità, si è deciso di progettare, sviluppare ed integrare il sistema da zero, invece di ricorrere ad alternative prefabbricate.</a:t>
             </a:r>
           </a:p>
         </p:txBody>
@@ -5559,7 +5511,7 @@
                 <a:ea typeface="Cmu serif" panose="02000603000000000000" pitchFamily="2" charset="0"/>
                 <a:cs typeface="Cmu serif" panose="02000603000000000000" pitchFamily="2" charset="0"/>
               </a:rPr>
-              <a:t>-trasmettitore li inoltra a terra in tempo reale.</a:t>
+              <a:t>-trasmettitore, li inoltra a terra in tempo reale.</a:t>
             </a:r>
           </a:p>
           <a:p>
@@ -6317,7 +6269,7 @@
         </p:nvSpPr>
         <p:spPr>
           <a:xfrm>
-            <a:off x="3524921" y="569936"/>
+            <a:off x="3524921" y="634161"/>
             <a:ext cx="7767079" cy="878702"/>
           </a:xfrm>
         </p:spPr>
@@ -6709,65 +6661,7 @@
                 <a:ea typeface="Cmu serif" panose="02000603000000000000" pitchFamily="2" charset="0"/>
                 <a:cs typeface="Cmu serif" panose="02000603000000000000" pitchFamily="2" charset="0"/>
               </a:rPr>
-              <a:t>Vengono assunte tutte le forze resistenti trascurabili, assumendo che tutta la potenza propulsiva disponibile sia impiegata per accelerare il velivolo.</a:t>
-            </a:r>
-          </a:p>
-        </p:txBody>
-      </p:sp>
-      <p:sp>
-        <p:nvSpPr>
-          <p:cNvPr id="7" name="Titolo 1">
-            <a:extLst>
-              <a:ext uri="{FF2B5EF4-FFF2-40B4-BE49-F238E27FC236}">
-                <a16:creationId xmlns:a16="http://schemas.microsoft.com/office/drawing/2014/main" id="{FC6D212B-F062-2C61-2A86-D946A609F9D9}"/>
-              </a:ext>
-            </a:extLst>
-          </p:cNvPr>
-          <p:cNvSpPr txBox="1">
-            <a:spLocks/>
-          </p:cNvSpPr>
-          <p:nvPr/>
-        </p:nvSpPr>
-        <p:spPr>
-          <a:xfrm>
-            <a:off x="3524921" y="569936"/>
-            <a:ext cx="7767079" cy="878702"/>
-          </a:xfrm>
-          <a:prstGeom prst="rect">
-            <a:avLst/>
-          </a:prstGeom>
-        </p:spPr>
-        <p:txBody>
-          <a:bodyPr vert="horz" wrap="square" lIns="91440" tIns="45720" rIns="91440" bIns="45720" rtlCol="0" anchor="ctr">
-            <a:spAutoFit/>
-          </a:bodyPr>
-          <a:lstStyle>
-            <a:lvl1pPr algn="l" defTabSz="914400" rtl="0" eaLnBrk="1" latinLnBrk="0" hangingPunct="1">
-              <a:lnSpc>
-                <a:spcPct val="90000"/>
-              </a:lnSpc>
-              <a:spcBef>
-                <a:spcPct val="0"/>
-              </a:spcBef>
-              <a:buNone/>
-              <a:defRPr sz="4400" kern="1200">
-                <a:solidFill>
-                  <a:schemeClr val="tx1"/>
-                </a:solidFill>
-                <a:latin typeface="+mj-lt"/>
-                <a:ea typeface="+mj-ea"/>
-                <a:cs typeface="+mj-cs"/>
-              </a:defRPr>
-            </a:lvl1pPr>
-          </a:lstStyle>
-          <a:p>
-            <a:r>
-              <a:rPr lang="it-IT" sz="2800" dirty="0">
-                <a:latin typeface="Cmu serif" panose="02000603000000000000" pitchFamily="2" charset="0"/>
-                <a:ea typeface="Cmu serif" panose="02000603000000000000" pitchFamily="2" charset="0"/>
-                <a:cs typeface="Cmu serif" panose="02000603000000000000" pitchFamily="2" charset="0"/>
-              </a:rPr>
-              <a:t>4.2. Verifica del processo di dimensionamento del velivolo – criticità del secondo step</a:t>
+              <a:t>Vengono assunte tutte le forze resistenti trascurabili, ipotizzando quindi che tutta la potenza propulsiva disponibile sia impiegata per accelerare il velivolo.</a:t>
             </a:r>
           </a:p>
         </p:txBody>
@@ -6808,6 +6702,45 @@
           </a:prstGeom>
         </p:spPr>
       </p:pic>
+      <p:sp>
+        <p:nvSpPr>
+          <p:cNvPr id="5" name="Titolo 1">
+            <a:extLst>
+              <a:ext uri="{FF2B5EF4-FFF2-40B4-BE49-F238E27FC236}">
+                <a16:creationId xmlns:a16="http://schemas.microsoft.com/office/drawing/2014/main" id="{60CDC380-196A-5104-6EAC-24946512ABE4}"/>
+              </a:ext>
+            </a:extLst>
+          </p:cNvPr>
+          <p:cNvSpPr>
+            <a:spLocks noGrp="1"/>
+          </p:cNvSpPr>
+          <p:nvPr>
+            <p:ph type="title"/>
+          </p:nvPr>
+        </p:nvSpPr>
+        <p:spPr>
+          <a:xfrm>
+            <a:off x="3524921" y="634161"/>
+            <a:ext cx="7767079" cy="878702"/>
+          </a:xfrm>
+        </p:spPr>
+        <p:txBody>
+          <a:bodyPr wrap="square">
+            <a:spAutoFit/>
+          </a:bodyPr>
+          <a:lstStyle/>
+          <a:p>
+            <a:r>
+              <a:rPr lang="it-IT" sz="2800" dirty="0">
+                <a:latin typeface="Cmu serif" panose="02000603000000000000" pitchFamily="2" charset="0"/>
+                <a:ea typeface="Cmu serif" panose="02000603000000000000" pitchFamily="2" charset="0"/>
+                <a:cs typeface="Cmu serif" panose="02000603000000000000" pitchFamily="2" charset="0"/>
+              </a:rPr>
+              <a:t>4.2. Verifica del processo di dimensionamento del velivolo – criticità del secondo step</a:t>
+            </a:r>
+          </a:p>
+        </p:txBody>
+      </p:sp>
     </p:spTree>
     <p:extLst>
       <p:ext uri="{BB962C8B-B14F-4D97-AF65-F5344CB8AC3E}">
@@ -6933,64 +6866,6 @@
           </a:p>
         </p:txBody>
       </p:sp>
-      <p:sp>
-        <p:nvSpPr>
-          <p:cNvPr id="7" name="Titolo 1">
-            <a:extLst>
-              <a:ext uri="{FF2B5EF4-FFF2-40B4-BE49-F238E27FC236}">
-                <a16:creationId xmlns:a16="http://schemas.microsoft.com/office/drawing/2014/main" id="{FC6D212B-F062-2C61-2A86-D946A609F9D9}"/>
-              </a:ext>
-            </a:extLst>
-          </p:cNvPr>
-          <p:cNvSpPr txBox="1">
-            <a:spLocks/>
-          </p:cNvSpPr>
-          <p:nvPr/>
-        </p:nvSpPr>
-        <p:spPr>
-          <a:xfrm>
-            <a:off x="3524921" y="569936"/>
-            <a:ext cx="7767079" cy="878702"/>
-          </a:xfrm>
-          <a:prstGeom prst="rect">
-            <a:avLst/>
-          </a:prstGeom>
-        </p:spPr>
-        <p:txBody>
-          <a:bodyPr vert="horz" wrap="square" lIns="91440" tIns="45720" rIns="91440" bIns="45720" rtlCol="0" anchor="ctr">
-            <a:spAutoFit/>
-          </a:bodyPr>
-          <a:lstStyle>
-            <a:lvl1pPr algn="l" defTabSz="914400" rtl="0" eaLnBrk="1" latinLnBrk="0" hangingPunct="1">
-              <a:lnSpc>
-                <a:spcPct val="90000"/>
-              </a:lnSpc>
-              <a:spcBef>
-                <a:spcPct val="0"/>
-              </a:spcBef>
-              <a:buNone/>
-              <a:defRPr sz="4400" kern="1200">
-                <a:solidFill>
-                  <a:schemeClr val="tx1"/>
-                </a:solidFill>
-                <a:latin typeface="+mj-lt"/>
-                <a:ea typeface="+mj-ea"/>
-                <a:cs typeface="+mj-cs"/>
-              </a:defRPr>
-            </a:lvl1pPr>
-          </a:lstStyle>
-          <a:p>
-            <a:r>
-              <a:rPr lang="it-IT" sz="2800" dirty="0">
-                <a:latin typeface="Cmu serif" panose="02000603000000000000" pitchFamily="2" charset="0"/>
-                <a:ea typeface="Cmu serif" panose="02000603000000000000" pitchFamily="2" charset="0"/>
-                <a:cs typeface="Cmu serif" panose="02000603000000000000" pitchFamily="2" charset="0"/>
-              </a:rPr>
-              <a:t>4.2.1 Verifica dei risultati di potenza propulsiva disponibile</a:t>
-            </a:r>
-          </a:p>
-        </p:txBody>
-      </p:sp>
       <p:pic>
         <p:nvPicPr>
           <p:cNvPr id="3" name="Immagine 2" descr="Immagine che contiene testo, diagramma, linea, Diagramma&#10;&#10;Descrizione generata automaticamente">
@@ -7117,6 +6992,45 @@
               <a:ea typeface="CMU Serif" panose="02000603000000000000" pitchFamily="2" charset="0"/>
               <a:cs typeface="CMU Serif" panose="02000603000000000000" pitchFamily="2" charset="0"/>
             </a:endParaRPr>
+          </a:p>
+        </p:txBody>
+      </p:sp>
+      <p:sp>
+        <p:nvSpPr>
+          <p:cNvPr id="5" name="Titolo 1">
+            <a:extLst>
+              <a:ext uri="{FF2B5EF4-FFF2-40B4-BE49-F238E27FC236}">
+                <a16:creationId xmlns:a16="http://schemas.microsoft.com/office/drawing/2014/main" id="{044B7A56-13FD-DBDC-8B0F-B1478D09A0FC}"/>
+              </a:ext>
+            </a:extLst>
+          </p:cNvPr>
+          <p:cNvSpPr>
+            <a:spLocks noGrp="1"/>
+          </p:cNvSpPr>
+          <p:nvPr>
+            <p:ph type="title"/>
+          </p:nvPr>
+        </p:nvSpPr>
+        <p:spPr>
+          <a:xfrm>
+            <a:off x="3524921" y="634161"/>
+            <a:ext cx="7767079" cy="878702"/>
+          </a:xfrm>
+        </p:spPr>
+        <p:txBody>
+          <a:bodyPr wrap="square">
+            <a:spAutoFit/>
+          </a:bodyPr>
+          <a:lstStyle/>
+          <a:p>
+            <a:r>
+              <a:rPr lang="it-IT" sz="2800" dirty="0">
+                <a:latin typeface="Cmu serif" panose="02000603000000000000" pitchFamily="2" charset="0"/>
+                <a:ea typeface="Cmu serif" panose="02000603000000000000" pitchFamily="2" charset="0"/>
+                <a:cs typeface="Cmu serif" panose="02000603000000000000" pitchFamily="2" charset="0"/>
+              </a:rPr>
+              <a:t>4.2.1. Verifica dei risultati di potenza propulsiva disponibile</a:t>
+            </a:r>
           </a:p>
         </p:txBody>
       </p:sp>

</xml_diff>

<commit_message>
Aggiunta ultima slide - CONSEGNATA Presentazione (2)
</commit_message>
<xml_diff>
--- a/Presentazione/Presentazione relazione.pptx
+++ b/Presentazione/Presentazione relazione.pptx
@@ -20,6 +20,7 @@
     <p:sldId id="269" r:id="rId14"/>
     <p:sldId id="270" r:id="rId15"/>
     <p:sldId id="271" r:id="rId16"/>
+    <p:sldId id="272" r:id="rId17"/>
   </p:sldIdLst>
   <p:sldSz cx="12192000" cy="6858000"/>
   <p:notesSz cx="6858000" cy="9144000"/>
@@ -5118,6 +5119,201 @@
 </p:sld>
 </file>
 
+<file path=ppt/slides/slide16.xml><?xml version="1.0" encoding="utf-8"?>
+<p:sld xmlns:a="http://schemas.openxmlformats.org/drawingml/2006/main" xmlns:r="http://schemas.openxmlformats.org/officeDocument/2006/relationships" xmlns:p="http://schemas.openxmlformats.org/presentationml/2006/main">
+  <p:cSld>
+    <p:spTree>
+      <p:nvGrpSpPr>
+        <p:cNvPr id="1" name=""/>
+        <p:cNvGrpSpPr/>
+        <p:nvPr/>
+      </p:nvGrpSpPr>
+      <p:grpSpPr>
+        <a:xfrm>
+          <a:off x="0" y="0"/>
+          <a:ext cx="0" cy="0"/>
+          <a:chOff x="0" y="0"/>
+          <a:chExt cx="0" cy="0"/>
+        </a:xfrm>
+      </p:grpSpPr>
+      <p:sp>
+        <p:nvSpPr>
+          <p:cNvPr id="2" name="Titolo 1">
+            <a:extLst>
+              <a:ext uri="{FF2B5EF4-FFF2-40B4-BE49-F238E27FC236}">
+                <a16:creationId xmlns:a16="http://schemas.microsoft.com/office/drawing/2014/main" id="{F0CF7BC8-005C-3011-F93D-428C3AC94D28}"/>
+              </a:ext>
+            </a:extLst>
+          </p:cNvPr>
+          <p:cNvSpPr>
+            <a:spLocks noGrp="1"/>
+          </p:cNvSpPr>
+          <p:nvPr>
+            <p:ph type="title"/>
+          </p:nvPr>
+        </p:nvSpPr>
+        <p:spPr>
+          <a:xfrm>
+            <a:off x="3524921" y="708655"/>
+            <a:ext cx="7767079" cy="661720"/>
+          </a:xfrm>
+        </p:spPr>
+        <p:txBody>
+          <a:bodyPr wrap="square">
+            <a:spAutoFit/>
+          </a:bodyPr>
+          <a:lstStyle/>
+          <a:p>
+            <a:r>
+              <a:rPr lang="it-IT" sz="4000" dirty="0">
+                <a:latin typeface="Cmu serif" panose="02000603000000000000" pitchFamily="2" charset="0"/>
+                <a:ea typeface="Cmu serif" panose="02000603000000000000" pitchFamily="2" charset="0"/>
+                <a:cs typeface="Cmu serif" panose="02000603000000000000" pitchFamily="2" charset="0"/>
+              </a:rPr>
+              <a:t>Osservazioni conclusive</a:t>
+            </a:r>
+          </a:p>
+        </p:txBody>
+      </p:sp>
+      <p:pic>
+        <p:nvPicPr>
+          <p:cNvPr id="4" name="Immagine 3" descr="Immagine che contiene testo, Carattere, Elementi grafici, logo">
+            <a:extLst>
+              <a:ext uri="{FF2B5EF4-FFF2-40B4-BE49-F238E27FC236}">
+                <a16:creationId xmlns:a16="http://schemas.microsoft.com/office/drawing/2014/main" id="{B6812EB3-284C-CD2B-D39B-7E068E84B778}"/>
+              </a:ext>
+            </a:extLst>
+          </p:cNvPr>
+          <p:cNvPicPr>
+            <a:picLocks noChangeAspect="1"/>
+          </p:cNvPicPr>
+          <p:nvPr/>
+        </p:nvPicPr>
+        <p:blipFill>
+          <a:blip r:embed="rId2">
+            <a:extLst>
+              <a:ext uri="{28A0092B-C50C-407E-A947-70E740481C1C}">
+                <a14:useLocalDpi xmlns:a14="http://schemas.microsoft.com/office/drawing/2010/main" val="0"/>
+              </a:ext>
+            </a:extLst>
+          </a:blip>
+          <a:stretch>
+            <a:fillRect/>
+          </a:stretch>
+        </p:blipFill>
+        <p:spPr>
+          <a:xfrm>
+            <a:off x="900000" y="540001"/>
+            <a:ext cx="2076591" cy="938572"/>
+          </a:xfrm>
+          <a:prstGeom prst="rect">
+            <a:avLst/>
+          </a:prstGeom>
+        </p:spPr>
+      </p:pic>
+      <p:sp>
+        <p:nvSpPr>
+          <p:cNvPr id="9" name="CasellaDiTesto 8">
+            <a:extLst>
+              <a:ext uri="{FF2B5EF4-FFF2-40B4-BE49-F238E27FC236}">
+                <a16:creationId xmlns:a16="http://schemas.microsoft.com/office/drawing/2014/main" id="{6BBA43B8-57EC-EC7D-B79C-094BABBFFDF4}"/>
+              </a:ext>
+            </a:extLst>
+          </p:cNvPr>
+          <p:cNvSpPr txBox="1"/>
+          <p:nvPr/>
+        </p:nvSpPr>
+        <p:spPr>
+          <a:xfrm>
+            <a:off x="900000" y="1923897"/>
+            <a:ext cx="10392000" cy="4401205"/>
+          </a:xfrm>
+          <a:prstGeom prst="rect">
+            <a:avLst/>
+          </a:prstGeom>
+          <a:noFill/>
+        </p:spPr>
+        <p:txBody>
+          <a:bodyPr wrap="square" rtlCol="0">
+            <a:spAutoFit/>
+          </a:bodyPr>
+          <a:lstStyle/>
+          <a:p>
+            <a:pPr algn="just"/>
+            <a:r>
+              <a:rPr lang="it-IT" sz="2000" dirty="0">
+                <a:latin typeface="Cmu serif" panose="02000603000000000000" pitchFamily="2" charset="0"/>
+                <a:ea typeface="Cmu serif" panose="02000603000000000000" pitchFamily="2" charset="0"/>
+                <a:cs typeface="Cmu serif" panose="02000603000000000000" pitchFamily="2" charset="0"/>
+              </a:rPr>
+              <a:t>Dai risultati delle analisi condotte quindi, si riassumono le principali conclusioni:</a:t>
+            </a:r>
+          </a:p>
+          <a:p>
+            <a:pPr algn="just"/>
+            <a:endParaRPr lang="it-IT" sz="2000" dirty="0">
+              <a:latin typeface="Cmu serif" panose="02000603000000000000" pitchFamily="2" charset="0"/>
+              <a:ea typeface="Cmu serif" panose="02000603000000000000" pitchFamily="2" charset="0"/>
+              <a:cs typeface="Cmu serif" panose="02000603000000000000" pitchFamily="2" charset="0"/>
+            </a:endParaRPr>
+          </a:p>
+          <a:p>
+            <a:pPr marL="800100" lvl="1" indent="-342900" algn="just">
+              <a:buFont typeface="Arial" panose="020B0604020202020204" pitchFamily="34" charset="0"/>
+              <a:buChar char="•"/>
+            </a:pPr>
+            <a:r>
+              <a:rPr lang="it-IT" sz="2000" dirty="0">
+                <a:latin typeface="Cmu serif" panose="02000603000000000000" pitchFamily="2" charset="0"/>
+                <a:ea typeface="Cmu serif" panose="02000603000000000000" pitchFamily="2" charset="0"/>
+                <a:cs typeface="Cmu serif" panose="02000603000000000000" pitchFamily="2" charset="0"/>
+              </a:rPr>
+              <a:t>Il modello finora utilizzato per la stima della potenza disponibile generata dal blocco motore-elica non è sufficientemente accurato per la progettazione preliminare. In assenza della disponibilità di una galleria del vento, una possibile soluzione potrebbe utilizzare i dati di spinta statica (al banco prova), per correggere il modello utilizzato (eCalc + datasheet).</a:t>
+            </a:r>
+          </a:p>
+          <a:p>
+            <a:pPr marL="800100" lvl="1" indent="-342900" algn="just">
+              <a:buFont typeface="Arial" panose="020B0604020202020204" pitchFamily="34" charset="0"/>
+              <a:buChar char="•"/>
+            </a:pPr>
+            <a:r>
+              <a:rPr lang="it-IT" sz="2000" dirty="0">
+                <a:latin typeface="Cmu serif" panose="02000603000000000000" pitchFamily="2" charset="0"/>
+                <a:ea typeface="Cmu serif" panose="02000603000000000000" pitchFamily="2" charset="0"/>
+                <a:cs typeface="Cmu serif" panose="02000603000000000000" pitchFamily="2" charset="0"/>
+              </a:rPr>
+              <a:t>A causa della non trascurabilità delle forze resistenti al decollo, l’implementazione di un processo iterativo per l’ottenimento del progetto preliminare potrebbe permettere di considerare il drag aerodinamico nel computo delle forze. L’attrito volvente del carrello invece andrebbe quantificato tramite le espressioni note.</a:t>
+            </a:r>
+          </a:p>
+          <a:p>
+            <a:pPr marL="800100" lvl="1" indent="-342900" algn="just">
+              <a:buFont typeface="Arial" panose="020B0604020202020204" pitchFamily="34" charset="0"/>
+              <a:buChar char="•"/>
+            </a:pPr>
+            <a:r>
+              <a:rPr lang="it-IT" sz="2000" dirty="0">
+                <a:latin typeface="Cmu serif" panose="02000603000000000000" pitchFamily="2" charset="0"/>
+                <a:ea typeface="Cmu serif" panose="02000603000000000000" pitchFamily="2" charset="0"/>
+                <a:cs typeface="Cmu serif" panose="02000603000000000000" pitchFamily="2" charset="0"/>
+              </a:rPr>
+              <a:t>La calibrazione del tubo di Pitot potrebbe essere affinata con modelli più complessi che considerino il cambio di assetto del velivolo e/o i dati di temperatura e pressione locale (da sensori) per determinare la densità dell’aria in quota.</a:t>
+            </a:r>
+          </a:p>
+        </p:txBody>
+      </p:sp>
+    </p:spTree>
+    <p:extLst>
+      <p:ext uri="{BB962C8B-B14F-4D97-AF65-F5344CB8AC3E}">
+        <p14:creationId xmlns:p14="http://schemas.microsoft.com/office/powerpoint/2010/main" val="2149626292"/>
+      </p:ext>
+    </p:extLst>
+  </p:cSld>
+  <p:clrMapOvr>
+    <a:masterClrMapping/>
+  </p:clrMapOvr>
+</p:sld>
+</file>
+
 <file path=ppt/slides/slide2.xml><?xml version="1.0" encoding="utf-8"?>
 <p:sld xmlns:a="http://schemas.openxmlformats.org/drawingml/2006/main" xmlns:r="http://schemas.openxmlformats.org/officeDocument/2006/relationships" xmlns:p="http://schemas.openxmlformats.org/presentationml/2006/main">
   <p:cSld>
@@ -6631,23 +6827,7 @@
                 <a:ea typeface="Cmu serif" panose="02000603000000000000" pitchFamily="2" charset="0"/>
                 <a:cs typeface="Cmu serif" panose="02000603000000000000" pitchFamily="2" charset="0"/>
               </a:rPr>
-              <a:t>La potenza disponibile fornita dal sistema propulsivo viene prevista attraverso un modello che combina i dati </a:t>
-            </a:r>
-            <a:r>
-              <a:rPr lang="it-IT" sz="2000" dirty="0" err="1">
-                <a:latin typeface="Cmu serif" panose="02000603000000000000" pitchFamily="2" charset="0"/>
-                <a:ea typeface="Cmu serif" panose="02000603000000000000" pitchFamily="2" charset="0"/>
-                <a:cs typeface="Cmu serif" panose="02000603000000000000" pitchFamily="2" charset="0"/>
-              </a:rPr>
-              <a:t>eCalc</a:t>
-            </a:r>
-            <a:r>
-              <a:rPr lang="it-IT" sz="2000" dirty="0">
-                <a:latin typeface="Cmu serif" panose="02000603000000000000" pitchFamily="2" charset="0"/>
-                <a:ea typeface="Cmu serif" panose="02000603000000000000" pitchFamily="2" charset="0"/>
-                <a:cs typeface="Cmu serif" panose="02000603000000000000" pitchFamily="2" charset="0"/>
-              </a:rPr>
-              <a:t> sul motore, con quelli del datasheet dell’elica.</a:t>
+              <a:t>La potenza disponibile fornita dal sistema propulsivo viene prevista attraverso un modello che combina i dati eCalc sul motore, con quelli del datasheet dell’elica.</a:t>
             </a:r>
           </a:p>
           <a:p>

</xml_diff>